<commit_message>
New Soundfiles and presentation stuff
</commit_message>
<xml_diff>
--- a/Praesentation/FMSynthese-Julius.pptx
+++ b/Praesentation/FMSynthese-Julius.pptx
@@ -5,7 +5,7 @@
     <p:sldMasterId id="2147483648" r:id="rId1"/>
   </p:sldMasterIdLst>
   <p:notesMasterIdLst>
-    <p:notesMasterId r:id="rId7"/>
+    <p:notesMasterId r:id="rId13"/>
   </p:notesMasterIdLst>
   <p:sldIdLst>
     <p:sldId id="257" r:id="rId2"/>
@@ -13,6 +13,12 @@
     <p:sldId id="258" r:id="rId4"/>
     <p:sldId id="259" r:id="rId5"/>
     <p:sldId id="260" r:id="rId6"/>
+    <p:sldId id="261" r:id="rId7"/>
+    <p:sldId id="262" r:id="rId8"/>
+    <p:sldId id="263" r:id="rId9"/>
+    <p:sldId id="264" r:id="rId10"/>
+    <p:sldId id="265" r:id="rId11"/>
+    <p:sldId id="266" r:id="rId12"/>
   </p:sldIdLst>
   <p:sldSz cx="9144000" cy="5143500" type="screen16x9"/>
   <p:notesSz cx="6858000" cy="9144000"/>
@@ -197,7 +203,7 @@
             <a:fld id="{364A5697-ABCF-455C-8519-931EFDD64AAA}" type="datetimeFigureOut">
               <a:rPr lang="de-DE" smtClean="0"/>
               <a:pPr/>
-              <a:t>11.06.2015</a:t>
+              <a:t>13.06.2015</a:t>
             </a:fld>
             <a:endParaRPr lang="de-DE"/>
           </a:p>
@@ -645,7 +651,7 @@
             <a:fld id="{D1973D6C-51AD-4508-B508-FD358C94A360}" type="datetime1">
               <a:rPr lang="de-DE" smtClean="0"/>
               <a:pPr/>
-              <a:t>11.06.2015</a:t>
+              <a:t>13.06.2015</a:t>
             </a:fld>
             <a:endParaRPr lang="de-DE"/>
           </a:p>
@@ -816,7 +822,7 @@
             <a:fld id="{16CA1741-E8C7-4D32-930D-2CBEC658BBE9}" type="datetime1">
               <a:rPr lang="de-DE" smtClean="0"/>
               <a:pPr/>
-              <a:t>11.06.2015</a:t>
+              <a:t>13.06.2015</a:t>
             </a:fld>
             <a:endParaRPr lang="de-DE"/>
           </a:p>
@@ -997,7 +1003,7 @@
             <a:fld id="{BA20089B-28E9-4E3D-8F82-6328AE8CACA6}" type="datetime1">
               <a:rPr lang="de-DE" smtClean="0"/>
               <a:pPr/>
-              <a:t>11.06.2015</a:t>
+              <a:t>13.06.2015</a:t>
             </a:fld>
             <a:endParaRPr lang="de-DE"/>
           </a:p>
@@ -1168,7 +1174,7 @@
             <a:fld id="{1C72BD4E-61B2-40A3-A75C-5FDEDE8E5EC5}" type="datetime1">
               <a:rPr lang="de-DE" smtClean="0"/>
               <a:pPr/>
-              <a:t>11.06.2015</a:t>
+              <a:t>13.06.2015</a:t>
             </a:fld>
             <a:endParaRPr lang="de-DE"/>
           </a:p>
@@ -1415,7 +1421,7 @@
             <a:fld id="{48E855D6-EEBE-45BF-8BB5-776601FA5085}" type="datetime1">
               <a:rPr lang="de-DE" smtClean="0"/>
               <a:pPr/>
-              <a:t>11.06.2015</a:t>
+              <a:t>13.06.2015</a:t>
             </a:fld>
             <a:endParaRPr lang="de-DE"/>
           </a:p>
@@ -1704,7 +1710,7 @@
             <a:fld id="{EF380378-A65B-4494-A5A7-886B50CB4937}" type="datetime1">
               <a:rPr lang="de-DE" smtClean="0"/>
               <a:pPr/>
-              <a:t>11.06.2015</a:t>
+              <a:t>13.06.2015</a:t>
             </a:fld>
             <a:endParaRPr lang="de-DE"/>
           </a:p>
@@ -2127,7 +2133,7 @@
             <a:fld id="{BF9B2ACF-C63C-45AF-B5D6-56753CCBEEC7}" type="datetime1">
               <a:rPr lang="de-DE" smtClean="0"/>
               <a:pPr/>
-              <a:t>11.06.2015</a:t>
+              <a:t>13.06.2015</a:t>
             </a:fld>
             <a:endParaRPr lang="de-DE"/>
           </a:p>
@@ -2246,7 +2252,7 @@
             <a:fld id="{782C60A8-75F3-45EE-8F68-824804B9A36B}" type="datetime1">
               <a:rPr lang="de-DE" smtClean="0"/>
               <a:pPr/>
-              <a:t>11.06.2015</a:t>
+              <a:t>13.06.2015</a:t>
             </a:fld>
             <a:endParaRPr lang="de-DE"/>
           </a:p>
@@ -2342,7 +2348,7 @@
             <a:fld id="{AC76AE4E-B847-44C0-9E80-FADAC514238D}" type="datetime1">
               <a:rPr lang="de-DE" smtClean="0"/>
               <a:pPr/>
-              <a:t>11.06.2015</a:t>
+              <a:t>13.06.2015</a:t>
             </a:fld>
             <a:endParaRPr lang="de-DE"/>
           </a:p>
@@ -2620,7 +2626,7 @@
             <a:fld id="{93EB1BC4-DA1F-4C44-8E36-1B9FD72AD58E}" type="datetime1">
               <a:rPr lang="de-DE" smtClean="0"/>
               <a:pPr/>
-              <a:t>11.06.2015</a:t>
+              <a:t>13.06.2015</a:t>
             </a:fld>
             <a:endParaRPr lang="de-DE"/>
           </a:p>
@@ -2874,7 +2880,7 @@
             <a:fld id="{E23DD280-69E3-4A3C-8762-77BE68C0FDBF}" type="datetime1">
               <a:rPr lang="de-DE" smtClean="0"/>
               <a:pPr/>
-              <a:t>11.06.2015</a:t>
+              <a:t>13.06.2015</a:t>
             </a:fld>
             <a:endParaRPr lang="de-DE"/>
           </a:p>
@@ -3088,7 +3094,7 @@
             <a:fld id="{A1830189-BAB1-4688-8766-4D2AC2DF7C33}" type="datetime1">
               <a:rPr lang="de-DE" smtClean="0"/>
               <a:pPr/>
-              <a:t>11.06.2015</a:t>
+              <a:t>13.06.2015</a:t>
             </a:fld>
             <a:endParaRPr lang="de-DE" dirty="0"/>
           </a:p>
@@ -3563,7 +3569,7 @@
             <a:fld id="{1C72BD4E-61B2-40A3-A75C-5FDEDE8E5EC5}" type="datetime1">
               <a:rPr lang="de-DE" smtClean="0"/>
               <a:pPr/>
-              <a:t>11.06.2015</a:t>
+              <a:t>13.06.2015</a:t>
             </a:fld>
             <a:endParaRPr lang="de-DE"/>
           </a:p>
@@ -3628,6 +3634,424 @@
       </p:par>
     </p:tnLst>
   </p:timing>
+</p:sld>
+</file>
+
+<file path=ppt/slides/slide10.xml><?xml version="1.0" encoding="utf-8"?>
+<p:sld xmlns:a="http://schemas.openxmlformats.org/drawingml/2006/main" xmlns:r="http://schemas.openxmlformats.org/officeDocument/2006/relationships" xmlns:p="http://schemas.openxmlformats.org/presentationml/2006/main">
+  <p:cSld>
+    <p:spTree>
+      <p:nvGrpSpPr>
+        <p:cNvPr id="1" name=""/>
+        <p:cNvGrpSpPr/>
+        <p:nvPr/>
+      </p:nvGrpSpPr>
+      <p:grpSpPr>
+        <a:xfrm>
+          <a:off x="0" y="0"/>
+          <a:ext cx="0" cy="0"/>
+          <a:chOff x="0" y="0"/>
+          <a:chExt cx="0" cy="0"/>
+        </a:xfrm>
+      </p:grpSpPr>
+      <p:sp>
+        <p:nvSpPr>
+          <p:cNvPr id="2" name="Titel 1"/>
+          <p:cNvSpPr>
+            <a:spLocks noGrp="1"/>
+          </p:cNvSpPr>
+          <p:nvPr>
+            <p:ph type="title"/>
+          </p:nvPr>
+        </p:nvSpPr>
+        <p:spPr/>
+        <p:txBody>
+          <a:bodyPr>
+            <a:normAutofit/>
+          </a:bodyPr>
+          <a:lstStyle/>
+          <a:p>
+            <a:r>
+              <a:rPr lang="de-DE" sz="2800" dirty="0" smtClean="0">
+                <a:latin typeface="Lato" pitchFamily="34" charset="0"/>
+              </a:rPr>
+              <a:t>Geschichte der FM-Synthese</a:t>
+            </a:r>
+            <a:endParaRPr lang="de-DE" sz="2800" dirty="0">
+              <a:latin typeface="Lato" pitchFamily="34" charset="0"/>
+            </a:endParaRPr>
+          </a:p>
+        </p:txBody>
+      </p:sp>
+      <p:sp>
+        <p:nvSpPr>
+          <p:cNvPr id="3" name="Inhaltsplatzhalter 2"/>
+          <p:cNvSpPr>
+            <a:spLocks noGrp="1"/>
+          </p:cNvSpPr>
+          <p:nvPr>
+            <p:ph idx="1"/>
+          </p:nvPr>
+        </p:nvSpPr>
+        <p:spPr/>
+        <p:txBody>
+          <a:bodyPr>
+            <a:normAutofit/>
+          </a:bodyPr>
+          <a:lstStyle/>
+          <a:p>
+            <a:r>
+              <a:rPr lang="de-DE" sz="2000" dirty="0" smtClean="0"/>
+              <a:t>John </a:t>
+            </a:r>
+            <a:r>
+              <a:rPr lang="de-DE" sz="2000" dirty="0" err="1" smtClean="0"/>
+              <a:t>Chowning</a:t>
+            </a:r>
+            <a:r>
+              <a:rPr lang="de-DE" sz="2000" dirty="0" smtClean="0"/>
+              <a:t> 2005 in einem Interview:</a:t>
+            </a:r>
+          </a:p>
+          <a:p>
+            <a:pPr>
+              <a:buNone/>
+            </a:pPr>
+            <a:r>
+              <a:rPr lang="en-US" sz="2000" dirty="0" smtClean="0"/>
+              <a:t>	</a:t>
+            </a:r>
+          </a:p>
+          <a:p>
+            <a:pPr>
+              <a:buNone/>
+            </a:pPr>
+            <a:r>
+              <a:rPr lang="en-US" sz="2000" dirty="0" smtClean="0"/>
+              <a:t>	</a:t>
+            </a:r>
+            <a:r>
+              <a:rPr lang="en-US" sz="2000" dirty="0" smtClean="0"/>
+              <a:t>“</a:t>
+            </a:r>
+            <a:r>
+              <a:rPr lang="en-US" sz="2000" i="1" dirty="0" smtClean="0"/>
+              <a:t>I was experimenting with just a sinusoid and kept increasing the vibrato </a:t>
+            </a:r>
+            <a:r>
+              <a:rPr lang="en-US" sz="2000" i="1" dirty="0" smtClean="0"/>
+              <a:t>rate, so </a:t>
+            </a:r>
+            <a:r>
+              <a:rPr lang="en-US" sz="2000" i="1" dirty="0" smtClean="0"/>
+              <a:t>all of </a:t>
+            </a:r>
+            <a:r>
+              <a:rPr lang="en-US" sz="2000" i="1" dirty="0" smtClean="0"/>
+              <a:t>a sudden </a:t>
+            </a:r>
+            <a:r>
+              <a:rPr lang="en-US" sz="2000" i="1" dirty="0" smtClean="0"/>
+              <a:t>it didn’t sound like listening to a change in pitch in time, but rather </a:t>
+            </a:r>
+            <a:r>
+              <a:rPr lang="en-US" sz="2000" i="1" dirty="0" err="1" smtClean="0"/>
+              <a:t>i</a:t>
+            </a:r>
+            <a:r>
+              <a:rPr lang="en-US" sz="2000" i="1" dirty="0" smtClean="0"/>
+              <a:t> began to hear </a:t>
+            </a:r>
+            <a:r>
+              <a:rPr lang="en-US" sz="2000" i="1" dirty="0" err="1" smtClean="0"/>
+              <a:t>timbral</a:t>
+            </a:r>
+            <a:r>
+              <a:rPr lang="en-US" sz="2000" i="1" dirty="0" smtClean="0"/>
+              <a:t> </a:t>
+            </a:r>
+            <a:r>
+              <a:rPr lang="en-US" sz="2000" i="1" dirty="0" err="1" smtClean="0"/>
+              <a:t>diﬀerences</a:t>
+            </a:r>
+            <a:r>
+              <a:rPr lang="en-US" sz="2000" i="1" dirty="0" smtClean="0"/>
+              <a:t>. So the </a:t>
+            </a:r>
+            <a:r>
+              <a:rPr lang="en-US" sz="2000" i="1" dirty="0" err="1" smtClean="0"/>
+              <a:t>vibratio</a:t>
+            </a:r>
+            <a:r>
+              <a:rPr lang="en-US" sz="2000" i="1" dirty="0" smtClean="0"/>
+              <a:t> became very, very fast, hundreds of times per second, and very, </a:t>
+            </a:r>
+            <a:r>
+              <a:rPr lang="en-US" sz="2000" i="1" dirty="0" smtClean="0"/>
+              <a:t>very deep</a:t>
+            </a:r>
+            <a:r>
+              <a:rPr lang="en-US" sz="2000" i="1" dirty="0" smtClean="0"/>
+              <a:t>, as if the violinist had a </a:t>
+            </a:r>
+            <a:r>
+              <a:rPr lang="en-US" sz="2000" i="1" dirty="0" err="1" smtClean="0"/>
+              <a:t>diﬀerent</a:t>
+            </a:r>
+            <a:r>
+              <a:rPr lang="en-US" sz="2000" i="1" dirty="0" smtClean="0"/>
+              <a:t> </a:t>
+            </a:r>
+            <a:r>
+              <a:rPr lang="en-US" sz="2000" i="1" dirty="0" err="1" smtClean="0"/>
+              <a:t>ﬁngerboard</a:t>
+            </a:r>
+            <a:r>
+              <a:rPr lang="en-US" sz="2000" i="1" dirty="0" smtClean="0"/>
+              <a:t>, and the </a:t>
+            </a:r>
+            <a:r>
+              <a:rPr lang="en-US" sz="2000" i="1" dirty="0" err="1" smtClean="0"/>
+              <a:t>ﬁnger</a:t>
+            </a:r>
+            <a:r>
+              <a:rPr lang="en-US" sz="2000" i="1" dirty="0" smtClean="0"/>
+              <a:t> was whipping up </a:t>
+            </a:r>
+            <a:r>
+              <a:rPr lang="en-US" sz="2000" i="1" dirty="0" smtClean="0"/>
+              <a:t>and down at very </a:t>
+            </a:r>
+            <a:r>
+              <a:rPr lang="en-US" sz="2000" i="1" dirty="0" smtClean="0"/>
+              <a:t>high rates and very great distances. That would be sort of a physical metaphor for this.”</a:t>
+            </a:r>
+            <a:endParaRPr lang="de-DE" sz="2000" i="1" dirty="0" smtClean="0"/>
+          </a:p>
+        </p:txBody>
+      </p:sp>
+      <p:sp>
+        <p:nvSpPr>
+          <p:cNvPr id="4" name="Datumsplatzhalter 3"/>
+          <p:cNvSpPr>
+            <a:spLocks noGrp="1"/>
+          </p:cNvSpPr>
+          <p:nvPr>
+            <p:ph type="dt" sz="half" idx="10"/>
+          </p:nvPr>
+        </p:nvSpPr>
+        <p:spPr/>
+        <p:txBody>
+          <a:bodyPr/>
+          <a:lstStyle/>
+          <a:p>
+            <a:fld id="{1C72BD4E-61B2-40A3-A75C-5FDEDE8E5EC5}" type="datetime1">
+              <a:rPr lang="de-DE" smtClean="0"/>
+              <a:pPr/>
+              <a:t>13.06.2015</a:t>
+            </a:fld>
+            <a:endParaRPr lang="de-DE"/>
+          </a:p>
+        </p:txBody>
+      </p:sp>
+      <p:sp>
+        <p:nvSpPr>
+          <p:cNvPr id="5" name="Fußzeilenplatzhalter 4"/>
+          <p:cNvSpPr>
+            <a:spLocks noGrp="1"/>
+          </p:cNvSpPr>
+          <p:nvPr>
+            <p:ph type="ftr" sz="quarter" idx="11"/>
+          </p:nvPr>
+        </p:nvSpPr>
+        <p:spPr/>
+        <p:txBody>
+          <a:bodyPr/>
+          <a:lstStyle/>
+          <a:p>
+            <a:r>
+              <a:rPr lang="de-DE" dirty="0" smtClean="0"/>
+              <a:t>FM-Synthese</a:t>
+            </a:r>
+            <a:endParaRPr lang="de-DE" dirty="0"/>
+          </a:p>
+        </p:txBody>
+      </p:sp>
+      <p:sp>
+        <p:nvSpPr>
+          <p:cNvPr id="6" name="Foliennummernplatzhalter 5"/>
+          <p:cNvSpPr>
+            <a:spLocks noGrp="1"/>
+          </p:cNvSpPr>
+          <p:nvPr>
+            <p:ph type="sldNum" sz="quarter" idx="12"/>
+          </p:nvPr>
+        </p:nvSpPr>
+        <p:spPr/>
+        <p:txBody>
+          <a:bodyPr/>
+          <a:lstStyle/>
+          <a:p>
+            <a:fld id="{6C6AE60A-B69C-4790-82F7-3882EDF23186}" type="slidenum">
+              <a:rPr lang="de-DE" smtClean="0"/>
+              <a:pPr/>
+              <a:t>10</a:t>
+            </a:fld>
+            <a:endParaRPr lang="de-DE" dirty="0"/>
+          </a:p>
+        </p:txBody>
+      </p:sp>
+    </p:spTree>
+  </p:cSld>
+  <p:clrMapOvr>
+    <a:masterClrMapping/>
+  </p:clrMapOvr>
+</p:sld>
+</file>
+
+<file path=ppt/slides/slide11.xml><?xml version="1.0" encoding="utf-8"?>
+<p:sld xmlns:a="http://schemas.openxmlformats.org/drawingml/2006/main" xmlns:r="http://schemas.openxmlformats.org/officeDocument/2006/relationships" xmlns:p="http://schemas.openxmlformats.org/presentationml/2006/main">
+  <p:cSld>
+    <p:spTree>
+      <p:nvGrpSpPr>
+        <p:cNvPr id="1" name=""/>
+        <p:cNvGrpSpPr/>
+        <p:nvPr/>
+      </p:nvGrpSpPr>
+      <p:grpSpPr>
+        <a:xfrm>
+          <a:off x="0" y="0"/>
+          <a:ext cx="0" cy="0"/>
+          <a:chOff x="0" y="0"/>
+          <a:chExt cx="0" cy="0"/>
+        </a:xfrm>
+      </p:grpSpPr>
+      <p:sp>
+        <p:nvSpPr>
+          <p:cNvPr id="2" name="Titel 1"/>
+          <p:cNvSpPr>
+            <a:spLocks noGrp="1"/>
+          </p:cNvSpPr>
+          <p:nvPr>
+            <p:ph type="title"/>
+          </p:nvPr>
+        </p:nvSpPr>
+        <p:spPr/>
+        <p:txBody>
+          <a:bodyPr>
+            <a:normAutofit/>
+          </a:bodyPr>
+          <a:lstStyle/>
+          <a:p>
+            <a:r>
+              <a:rPr lang="de-DE" sz="2800" dirty="0" smtClean="0">
+                <a:latin typeface="Lato" pitchFamily="34" charset="0"/>
+              </a:rPr>
+              <a:t>Geschichte der FM-Synthese</a:t>
+            </a:r>
+            <a:endParaRPr lang="de-DE" sz="2800" dirty="0">
+              <a:latin typeface="Lato" pitchFamily="34" charset="0"/>
+            </a:endParaRPr>
+          </a:p>
+        </p:txBody>
+      </p:sp>
+      <p:sp>
+        <p:nvSpPr>
+          <p:cNvPr id="3" name="Inhaltsplatzhalter 2"/>
+          <p:cNvSpPr>
+            <a:spLocks noGrp="1"/>
+          </p:cNvSpPr>
+          <p:nvPr>
+            <p:ph idx="1"/>
+          </p:nvPr>
+        </p:nvSpPr>
+        <p:spPr/>
+        <p:txBody>
+          <a:bodyPr>
+            <a:normAutofit/>
+          </a:bodyPr>
+          <a:lstStyle/>
+          <a:p>
+            <a:endParaRPr lang="de-DE" sz="2000" dirty="0" smtClean="0"/>
+          </a:p>
+        </p:txBody>
+      </p:sp>
+      <p:sp>
+        <p:nvSpPr>
+          <p:cNvPr id="4" name="Datumsplatzhalter 3"/>
+          <p:cNvSpPr>
+            <a:spLocks noGrp="1"/>
+          </p:cNvSpPr>
+          <p:nvPr>
+            <p:ph type="dt" sz="half" idx="10"/>
+          </p:nvPr>
+        </p:nvSpPr>
+        <p:spPr/>
+        <p:txBody>
+          <a:bodyPr/>
+          <a:lstStyle/>
+          <a:p>
+            <a:fld id="{1C72BD4E-61B2-40A3-A75C-5FDEDE8E5EC5}" type="datetime1">
+              <a:rPr lang="de-DE" smtClean="0"/>
+              <a:pPr/>
+              <a:t>13.06.2015</a:t>
+            </a:fld>
+            <a:endParaRPr lang="de-DE"/>
+          </a:p>
+        </p:txBody>
+      </p:sp>
+      <p:sp>
+        <p:nvSpPr>
+          <p:cNvPr id="5" name="Fußzeilenplatzhalter 4"/>
+          <p:cNvSpPr>
+            <a:spLocks noGrp="1"/>
+          </p:cNvSpPr>
+          <p:nvPr>
+            <p:ph type="ftr" sz="quarter" idx="11"/>
+          </p:nvPr>
+        </p:nvSpPr>
+        <p:spPr/>
+        <p:txBody>
+          <a:bodyPr/>
+          <a:lstStyle/>
+          <a:p>
+            <a:r>
+              <a:rPr lang="de-DE" smtClean="0"/>
+              <a:t>FM-Synthese</a:t>
+            </a:r>
+            <a:endParaRPr lang="de-DE"/>
+          </a:p>
+        </p:txBody>
+      </p:sp>
+      <p:sp>
+        <p:nvSpPr>
+          <p:cNvPr id="6" name="Foliennummernplatzhalter 5"/>
+          <p:cNvSpPr>
+            <a:spLocks noGrp="1"/>
+          </p:cNvSpPr>
+          <p:nvPr>
+            <p:ph type="sldNum" sz="quarter" idx="12"/>
+          </p:nvPr>
+        </p:nvSpPr>
+        <p:spPr/>
+        <p:txBody>
+          <a:bodyPr/>
+          <a:lstStyle/>
+          <a:p>
+            <a:fld id="{6C6AE60A-B69C-4790-82F7-3882EDF23186}" type="slidenum">
+              <a:rPr lang="de-DE" smtClean="0"/>
+              <a:pPr/>
+              <a:t>11</a:t>
+            </a:fld>
+            <a:endParaRPr lang="de-DE" dirty="0"/>
+          </a:p>
+        </p:txBody>
+      </p:sp>
+    </p:spTree>
+  </p:cSld>
+  <p:clrMapOvr>
+    <a:masterClrMapping/>
+  </p:clrMapOvr>
 </p:sld>
 </file>
 
@@ -3695,7 +4119,7 @@
         </p:spPr>
         <p:txBody>
           <a:bodyPr>
-            <a:normAutofit fontScale="92500" lnSpcReduction="10000"/>
+            <a:normAutofit/>
           </a:bodyPr>
           <a:lstStyle/>
           <a:p>
@@ -3703,10 +4127,67 @@
               <a:buNone/>
             </a:pPr>
             <a:r>
-              <a:rPr lang="de-DE" sz="2800" dirty="0" smtClean="0">
+              <a:rPr lang="de-DE" sz="2000" dirty="0" smtClean="0">
                 <a:latin typeface="Lato" pitchFamily="34" charset="0"/>
               </a:rPr>
               <a:t>1. Julius Hackel	</a:t>
+            </a:r>
+          </a:p>
+          <a:p>
+            <a:pPr>
+              <a:buNone/>
+            </a:pPr>
+            <a:endParaRPr lang="de-DE" sz="2000" dirty="0" smtClean="0">
+              <a:latin typeface="Lato" pitchFamily="34" charset="0"/>
+            </a:endParaRPr>
+          </a:p>
+          <a:p>
+            <a:pPr>
+              <a:buNone/>
+            </a:pPr>
+            <a:r>
+              <a:rPr lang="de-DE" sz="2000" dirty="0" smtClean="0">
+                <a:latin typeface="Lato" pitchFamily="34" charset="0"/>
+              </a:rPr>
+              <a:t>2. Markus Bullmann</a:t>
+            </a:r>
+          </a:p>
+          <a:p>
+            <a:pPr>
+              <a:buNone/>
+            </a:pPr>
+            <a:endParaRPr lang="de-DE" sz="2000" dirty="0" smtClean="0">
+              <a:latin typeface="Lato" pitchFamily="34" charset="0"/>
+            </a:endParaRPr>
+          </a:p>
+          <a:p>
+            <a:pPr>
+              <a:buNone/>
+            </a:pPr>
+            <a:r>
+              <a:rPr lang="de-DE" sz="2000" dirty="0" smtClean="0">
+                <a:latin typeface="Lato" pitchFamily="34" charset="0"/>
+              </a:rPr>
+              <a:t>3. Matthias Kemmer</a:t>
+            </a:r>
+          </a:p>
+          <a:p>
+            <a:pPr>
+              <a:buNone/>
+            </a:pPr>
+            <a:endParaRPr lang="de-DE" sz="2000" dirty="0" smtClean="0">
+              <a:latin typeface="Lato" pitchFamily="34" charset="0"/>
+            </a:endParaRPr>
+          </a:p>
+          <a:p>
+            <a:pPr>
+              <a:buNone/>
+            </a:pPr>
+            <a:r>
+              <a:rPr lang="de-DE" sz="2000" dirty="0" smtClean="0">
+                <a:latin typeface="Lato" pitchFamily="34" charset="0"/>
+              </a:rPr>
+              <a:t>4. Stefan Gerasch</a:t>
             </a:r>
           </a:p>
           <a:p>
@@ -3717,63 +4198,6 @@
               <a:latin typeface="Lato" pitchFamily="34" charset="0"/>
             </a:endParaRPr>
           </a:p>
-          <a:p>
-            <a:pPr>
-              <a:buNone/>
-            </a:pPr>
-            <a:r>
-              <a:rPr lang="de-DE" sz="2800" dirty="0" smtClean="0">
-                <a:latin typeface="Lato" pitchFamily="34" charset="0"/>
-              </a:rPr>
-              <a:t>2. Markus Bullmann</a:t>
-            </a:r>
-          </a:p>
-          <a:p>
-            <a:pPr>
-              <a:buNone/>
-            </a:pPr>
-            <a:endParaRPr lang="de-DE" sz="2800" dirty="0" smtClean="0">
-              <a:latin typeface="Lato" pitchFamily="34" charset="0"/>
-            </a:endParaRPr>
-          </a:p>
-          <a:p>
-            <a:pPr>
-              <a:buNone/>
-            </a:pPr>
-            <a:r>
-              <a:rPr lang="de-DE" sz="2800" dirty="0" smtClean="0">
-                <a:latin typeface="Lato" pitchFamily="34" charset="0"/>
-              </a:rPr>
-              <a:t>3. Matthias Kemmer</a:t>
-            </a:r>
-          </a:p>
-          <a:p>
-            <a:pPr>
-              <a:buNone/>
-            </a:pPr>
-            <a:endParaRPr lang="de-DE" sz="2800" dirty="0" smtClean="0">
-              <a:latin typeface="Lato" pitchFamily="34" charset="0"/>
-            </a:endParaRPr>
-          </a:p>
-          <a:p>
-            <a:pPr>
-              <a:buNone/>
-            </a:pPr>
-            <a:r>
-              <a:rPr lang="de-DE" sz="2800" dirty="0" smtClean="0">
-                <a:latin typeface="Lato" pitchFamily="34" charset="0"/>
-              </a:rPr>
-              <a:t>4. Stefan Gerasch</a:t>
-            </a:r>
-          </a:p>
-          <a:p>
-            <a:pPr>
-              <a:buNone/>
-            </a:pPr>
-            <a:endParaRPr lang="de-DE" sz="2800" dirty="0" smtClean="0">
-              <a:latin typeface="Lato" pitchFamily="34" charset="0"/>
-            </a:endParaRPr>
-          </a:p>
         </p:txBody>
       </p:sp>
       <p:sp>
@@ -3794,7 +4218,7 @@
             <a:fld id="{35C1FD4D-52EB-42CB-85F2-3F104058EAED}" type="datetime1">
               <a:rPr lang="de-DE" smtClean="0"/>
               <a:pPr/>
-              <a:t>11.06.2015</a:t>
+              <a:t>13.06.2015</a:t>
             </a:fld>
             <a:endParaRPr lang="de-DE"/>
           </a:p>
@@ -3855,8 +4279,8 @@
         </p:nvSpPr>
         <p:spPr>
           <a:xfrm>
-            <a:off x="5436096" y="1134888"/>
-            <a:ext cx="3168352" cy="3754874"/>
+            <a:off x="5364088" y="1059582"/>
+            <a:ext cx="3600400" cy="3754874"/>
           </a:xfrm>
           <a:prstGeom prst="rect">
             <a:avLst/>
@@ -3874,7 +4298,34 @@
               <a:rPr lang="de-DE" sz="1400" dirty="0" smtClean="0">
                 <a:latin typeface="Lato" pitchFamily="34" charset="0"/>
               </a:rPr>
-              <a:t>1. 	- Prinzip</a:t>
+              <a:t>1. 	</a:t>
+            </a:r>
+            <a:r>
+              <a:rPr lang="de-DE" sz="1400" dirty="0" smtClean="0">
+                <a:latin typeface="Lato" pitchFamily="34" charset="0"/>
+              </a:rPr>
+              <a:t>Einführung</a:t>
+            </a:r>
+          </a:p>
+          <a:p>
+            <a:pPr marL="342900" indent="-342900"/>
+            <a:r>
+              <a:rPr lang="de-DE" sz="1400" dirty="0" smtClean="0">
+                <a:latin typeface="Lato" pitchFamily="34" charset="0"/>
+              </a:rPr>
+              <a:t>	</a:t>
+            </a:r>
+            <a:r>
+              <a:rPr lang="de-DE" sz="1400" dirty="0" smtClean="0">
+                <a:latin typeface="Lato" pitchFamily="34" charset="0"/>
+              </a:rPr>
+              <a:t>- </a:t>
+            </a:r>
+            <a:r>
+              <a:rPr lang="de-DE" sz="1400" dirty="0" smtClean="0">
+                <a:latin typeface="Lato" pitchFamily="34" charset="0"/>
+              </a:rPr>
+              <a:t>Prinzip</a:t>
             </a:r>
           </a:p>
           <a:p>
@@ -4115,17 +4566,8 @@
               <a:rPr lang="de-DE" sz="2800" dirty="0" smtClean="0">
                 <a:latin typeface="Lato" pitchFamily="34" charset="0"/>
               </a:rPr>
-              <a:t>Prinzip der </a:t>
-            </a:r>
-            <a:r>
-              <a:rPr lang="de-DE" sz="2800" dirty="0" smtClean="0">
-                <a:latin typeface="Lato" pitchFamily="34" charset="0"/>
-              </a:rPr>
-              <a:t>FM-Synthese</a:t>
-            </a:r>
-            <a:endParaRPr lang="de-DE" sz="2800" dirty="0" smtClean="0">
-              <a:latin typeface="Lato" pitchFamily="34" charset="0"/>
-            </a:endParaRPr>
+              <a:t>Prinzip der FM-Synthese</a:t>
+            </a:r>
           </a:p>
           <a:p>
             <a:endParaRPr lang="de-DE" sz="2000" dirty="0" smtClean="0">
@@ -4155,6 +4597,17 @@
               </a:rPr>
               <a:t>Formel: </a:t>
             </a:r>
+            <a:endParaRPr lang="de-DE" sz="2000" dirty="0" smtClean="0">
+              <a:latin typeface="Lato" pitchFamily="34" charset="0"/>
+            </a:endParaRPr>
+          </a:p>
+          <a:p>
+            <a:r>
+              <a:rPr lang="de-DE" sz="2000" dirty="0" smtClean="0">
+                <a:latin typeface="Lato" pitchFamily="34" charset="0"/>
+              </a:rPr>
+              <a:t>Funktioniert analog mit Cosinus</a:t>
+            </a:r>
             <a:endParaRPr lang="de-DE" sz="2000" dirty="0">
               <a:latin typeface="Lato" pitchFamily="34" charset="0"/>
             </a:endParaRPr>
@@ -4179,7 +4632,7 @@
             <a:fld id="{1C72BD4E-61B2-40A3-A75C-5FDEDE8E5EC5}" type="datetime1">
               <a:rPr lang="de-DE" smtClean="0"/>
               <a:pPr/>
-              <a:t>11.06.2015</a:t>
+              <a:t>13.06.2015</a:t>
             </a:fld>
             <a:endParaRPr lang="de-DE"/>
           </a:p>
@@ -4302,7 +4755,7 @@
             <a:fld id="{1C72BD4E-61B2-40A3-A75C-5FDEDE8E5EC5}" type="datetime1">
               <a:rPr lang="de-DE" smtClean="0"/>
               <a:pPr/>
-              <a:t>11.06.2015</a:t>
+              <a:t>13.06.2015</a:t>
             </a:fld>
             <a:endParaRPr lang="de-DE"/>
           </a:p>
@@ -4363,8 +4816,8 @@
         </p:nvSpPr>
         <p:spPr>
           <a:xfrm>
-            <a:off x="467544" y="555526"/>
-            <a:ext cx="4896544" cy="2739211"/>
+            <a:off x="467544" y="411510"/>
+            <a:ext cx="4896544" cy="2308324"/>
           </a:xfrm>
           <a:prstGeom prst="rect">
             <a:avLst/>
@@ -4390,16 +4843,17 @@
             </a:endParaRPr>
           </a:p>
           <a:p>
-            <a:endParaRPr lang="de-DE" sz="2800" dirty="0" smtClean="0">
-              <a:latin typeface="Lato" pitchFamily="34" charset="0"/>
-            </a:endParaRPr>
-          </a:p>
-          <a:p>
             <a:r>
               <a:rPr lang="de-DE" sz="2800" dirty="0" smtClean="0">
                 <a:latin typeface="Lato" pitchFamily="34" charset="0"/>
               </a:rPr>
-              <a:t>Besonderheit:</a:t>
+              <a:t>Besonderheit</a:t>
+            </a:r>
+            <a:r>
+              <a:rPr lang="de-DE" sz="2800" dirty="0" smtClean="0">
+                <a:latin typeface="Lato" pitchFamily="34" charset="0"/>
+              </a:rPr>
+              <a:t>:</a:t>
             </a:r>
           </a:p>
           <a:p>
@@ -4416,13 +4870,7 @@
               <a:rPr lang="de-DE" sz="2000" dirty="0" smtClean="0">
                 <a:latin typeface="Lato" pitchFamily="34" charset="0"/>
               </a:rPr>
-              <a:t> </a:t>
-            </a:r>
-            <a:r>
-              <a:rPr lang="de-DE" sz="2000" dirty="0" smtClean="0">
-                <a:latin typeface="Lato" pitchFamily="34" charset="0"/>
-              </a:rPr>
-              <a:t>Einfach zu erzeugen</a:t>
+              <a:t> Einfach zu erzeugen</a:t>
             </a:r>
           </a:p>
           <a:p>
@@ -4434,13 +4882,7 @@
               <a:rPr lang="de-DE" sz="2000" dirty="0" smtClean="0">
                 <a:latin typeface="Lato" pitchFamily="34" charset="0"/>
               </a:rPr>
-              <a:t> </a:t>
-            </a:r>
-            <a:r>
-              <a:rPr lang="de-DE" sz="2000" dirty="0" smtClean="0">
-                <a:latin typeface="Lato" pitchFamily="34" charset="0"/>
-              </a:rPr>
-              <a:t>Schwer zu verstehen </a:t>
+              <a:t> Schwer zu verstehen </a:t>
             </a:r>
           </a:p>
         </p:txBody>
@@ -4455,15 +4897,14 @@
         </p:nvPicPr>
         <p:blipFill>
           <a:blip r:embed="rId3" cstate="print"/>
-          <a:srcRect/>
           <a:stretch>
             <a:fillRect/>
           </a:stretch>
         </p:blipFill>
         <p:spPr bwMode="auto">
           <a:xfrm>
-            <a:off x="3851920" y="1275606"/>
-            <a:ext cx="4546923" cy="3244583"/>
+            <a:off x="3852010" y="1275606"/>
+            <a:ext cx="4546742" cy="3244583"/>
           </a:xfrm>
           <a:prstGeom prst="rect">
             <a:avLst/>
@@ -4540,29 +4981,20 @@
         </p:nvSpPr>
         <p:spPr/>
         <p:txBody>
-          <a:bodyPr/>
-          <a:lstStyle/>
-          <a:p>
-            <a:endParaRPr lang="de-DE"/>
-          </a:p>
-        </p:txBody>
-      </p:sp>
-      <p:sp>
-        <p:nvSpPr>
-          <p:cNvPr id="3" name="Inhaltsplatzhalter 2"/>
-          <p:cNvSpPr>
-            <a:spLocks noGrp="1"/>
-          </p:cNvSpPr>
-          <p:nvPr>
-            <p:ph idx="1"/>
-          </p:nvPr>
-        </p:nvSpPr>
-        <p:spPr/>
-        <p:txBody>
-          <a:bodyPr/>
-          <a:lstStyle/>
-          <a:p>
-            <a:endParaRPr lang="de-DE"/>
+          <a:bodyPr>
+            <a:normAutofit/>
+          </a:bodyPr>
+          <a:lstStyle/>
+          <a:p>
+            <a:r>
+              <a:rPr lang="de-DE" sz="2800" dirty="0" smtClean="0">
+                <a:latin typeface="Lato" pitchFamily="34" charset="0"/>
+              </a:rPr>
+              <a:t>Beispiele</a:t>
+            </a:r>
+            <a:endParaRPr lang="de-DE" sz="2800" dirty="0">
+              <a:latin typeface="Lato" pitchFamily="34" charset="0"/>
+            </a:endParaRPr>
           </a:p>
         </p:txBody>
       </p:sp>
@@ -4584,7 +5016,7 @@
             <a:fld id="{1C72BD4E-61B2-40A3-A75C-5FDEDE8E5EC5}" type="datetime1">
               <a:rPr lang="de-DE" smtClean="0"/>
               <a:pPr/>
-              <a:t>11.06.2015</a:t>
+              <a:t>13.06.2015</a:t>
             </a:fld>
             <a:endParaRPr lang="de-DE"/>
           </a:p>
@@ -4637,6 +5069,186 @@
           </a:p>
         </p:txBody>
       </p:sp>
+      <p:pic>
+        <p:nvPicPr>
+          <p:cNvPr id="11" name="Picture 2" descr="D:\Julius\Documents\GitHub\VSeminar\Dok\Kapitel\img\Prinzip.png"/>
+          <p:cNvPicPr>
+            <a:picLocks noChangeAspect="1" noChangeArrowheads="1"/>
+          </p:cNvPicPr>
+          <p:nvPr/>
+        </p:nvPicPr>
+        <p:blipFill>
+          <a:blip r:embed="rId3" cstate="print"/>
+          <a:stretch>
+            <a:fillRect/>
+          </a:stretch>
+        </p:blipFill>
+        <p:spPr bwMode="auto">
+          <a:xfrm>
+            <a:off x="3852010" y="1276378"/>
+            <a:ext cx="4546742" cy="3243039"/>
+          </a:xfrm>
+          <a:prstGeom prst="rect">
+            <a:avLst/>
+          </a:prstGeom>
+          <a:noFill/>
+          <a:ln w="3175">
+            <a:solidFill>
+              <a:schemeClr val="tx1"/>
+            </a:solidFill>
+          </a:ln>
+        </p:spPr>
+      </p:pic>
+      <p:sp>
+        <p:nvSpPr>
+          <p:cNvPr id="12" name="Textfeld 11"/>
+          <p:cNvSpPr txBox="1"/>
+          <p:nvPr/>
+        </p:nvSpPr>
+        <p:spPr>
+          <a:xfrm>
+            <a:off x="539552" y="1203598"/>
+            <a:ext cx="3168352" cy="3447098"/>
+          </a:xfrm>
+          <a:prstGeom prst="rect">
+            <a:avLst/>
+          </a:prstGeom>
+          <a:noFill/>
+        </p:spPr>
+        <p:txBody>
+          <a:bodyPr wrap="square" rtlCol="0">
+            <a:spAutoFit/>
+          </a:bodyPr>
+          <a:lstStyle/>
+          <a:p>
+            <a:r>
+              <a:rPr lang="de-DE" sz="2800" dirty="0" smtClean="0">
+                <a:latin typeface="Lato" pitchFamily="34" charset="0"/>
+              </a:rPr>
+              <a:t>Beispiel 1. </a:t>
+            </a:r>
+          </a:p>
+          <a:p>
+            <a:endParaRPr lang="de-DE" dirty="0" smtClean="0">
+              <a:latin typeface="Lato" pitchFamily="34" charset="0"/>
+            </a:endParaRPr>
+          </a:p>
+          <a:p>
+            <a:r>
+              <a:rPr lang="de-DE" sz="2000" dirty="0" smtClean="0">
+                <a:latin typeface="Lato" pitchFamily="34" charset="0"/>
+              </a:rPr>
+              <a:t>Träger</a:t>
+            </a:r>
+          </a:p>
+          <a:p>
+            <a:endParaRPr lang="de-DE" dirty="0" smtClean="0">
+              <a:latin typeface="Lato" pitchFamily="34" charset="0"/>
+            </a:endParaRPr>
+          </a:p>
+          <a:p>
+            <a:endParaRPr lang="de-DE" dirty="0" smtClean="0">
+              <a:latin typeface="Lato" pitchFamily="34" charset="0"/>
+            </a:endParaRPr>
+          </a:p>
+          <a:p>
+            <a:r>
+              <a:rPr lang="de-DE" sz="2000" dirty="0" smtClean="0">
+                <a:latin typeface="Lato" pitchFamily="34" charset="0"/>
+              </a:rPr>
+              <a:t>Modulator</a:t>
+            </a:r>
+          </a:p>
+          <a:p>
+            <a:endParaRPr lang="de-DE" dirty="0" smtClean="0">
+              <a:latin typeface="Lato" pitchFamily="34" charset="0"/>
+            </a:endParaRPr>
+          </a:p>
+          <a:p>
+            <a:endParaRPr lang="de-DE" dirty="0" smtClean="0">
+              <a:latin typeface="Lato" pitchFamily="34" charset="0"/>
+            </a:endParaRPr>
+          </a:p>
+          <a:p>
+            <a:r>
+              <a:rPr lang="de-DE" sz="2000" dirty="0" smtClean="0">
+                <a:latin typeface="Lato" pitchFamily="34" charset="0"/>
+              </a:rPr>
+              <a:t>Resultierendes Signal</a:t>
+            </a:r>
+          </a:p>
+          <a:p>
+            <a:endParaRPr lang="de-DE" dirty="0" smtClean="0">
+              <a:latin typeface="Lato" pitchFamily="34" charset="0"/>
+            </a:endParaRPr>
+          </a:p>
+          <a:p>
+            <a:endParaRPr lang="de-DE" dirty="0">
+              <a:latin typeface="Lato" pitchFamily="34" charset="0"/>
+            </a:endParaRPr>
+          </a:p>
+        </p:txBody>
+      </p:sp>
+      <p:graphicFrame>
+        <p:nvGraphicFramePr>
+          <p:cNvPr id="18437" name="Object 5"/>
+          <p:cNvGraphicFramePr>
+            <a:graphicFrameLocks noChangeAspect="1"/>
+          </p:cNvGraphicFramePr>
+          <p:nvPr/>
+        </p:nvGraphicFramePr>
+        <p:xfrm>
+          <a:off x="683568" y="2283718"/>
+          <a:ext cx="1244600" cy="203200"/>
+        </p:xfrm>
+        <a:graphic>
+          <a:graphicData uri="http://schemas.openxmlformats.org/presentationml/2006/ole">
+            <p:oleObj spid="_x0000_s18437" name="Formel" r:id="rId4" imgW="1244520" imgH="203040" progId="Equation.3">
+              <p:embed/>
+            </p:oleObj>
+          </a:graphicData>
+        </a:graphic>
+      </p:graphicFrame>
+      <p:graphicFrame>
+        <p:nvGraphicFramePr>
+          <p:cNvPr id="15" name="Objekt 14"/>
+          <p:cNvGraphicFramePr>
+            <a:graphicFrameLocks noChangeAspect="1"/>
+          </p:cNvGraphicFramePr>
+          <p:nvPr/>
+        </p:nvGraphicFramePr>
+        <p:xfrm>
+          <a:off x="683568" y="3147814"/>
+          <a:ext cx="1257300" cy="203200"/>
+        </p:xfrm>
+        <a:graphic>
+          <a:graphicData uri="http://schemas.openxmlformats.org/presentationml/2006/ole">
+            <p:oleObj spid="_x0000_s18438" name="Formel" r:id="rId5" imgW="1257120" imgH="203040" progId="Equation.3">
+              <p:embed/>
+            </p:oleObj>
+          </a:graphicData>
+        </a:graphic>
+      </p:graphicFrame>
+      <p:graphicFrame>
+        <p:nvGraphicFramePr>
+          <p:cNvPr id="16" name="Objekt 15"/>
+          <p:cNvGraphicFramePr>
+            <a:graphicFrameLocks noChangeAspect="1"/>
+          </p:cNvGraphicFramePr>
+          <p:nvPr/>
+        </p:nvGraphicFramePr>
+        <p:xfrm>
+          <a:off x="683568" y="4011910"/>
+          <a:ext cx="2146300" cy="203200"/>
+        </p:xfrm>
+        <a:graphic>
+          <a:graphicData uri="http://schemas.openxmlformats.org/presentationml/2006/ole">
+            <p:oleObj spid="_x0000_s18439" name="Formel" r:id="rId6" imgW="2145960" imgH="203040" progId="Equation.3">
+              <p:embed/>
+            </p:oleObj>
+          </a:graphicData>
+        </a:graphic>
+      </p:graphicFrame>
     </p:spTree>
   </p:cSld>
   <p:clrMapOvr>
@@ -4649,6 +5261,932 @@
       </p:par>
     </p:tnLst>
   </p:timing>
+</p:sld>
+</file>
+
+<file path=ppt/slides/slide6.xml><?xml version="1.0" encoding="utf-8"?>
+<p:sld xmlns:a="http://schemas.openxmlformats.org/drawingml/2006/main" xmlns:r="http://schemas.openxmlformats.org/officeDocument/2006/relationships" xmlns:p="http://schemas.openxmlformats.org/presentationml/2006/main">
+  <p:cSld>
+    <p:spTree>
+      <p:nvGrpSpPr>
+        <p:cNvPr id="1" name=""/>
+        <p:cNvGrpSpPr/>
+        <p:nvPr/>
+      </p:nvGrpSpPr>
+      <p:grpSpPr>
+        <a:xfrm>
+          <a:off x="0" y="0"/>
+          <a:ext cx="0" cy="0"/>
+          <a:chOff x="0" y="0"/>
+          <a:chExt cx="0" cy="0"/>
+        </a:xfrm>
+      </p:grpSpPr>
+      <p:sp>
+        <p:nvSpPr>
+          <p:cNvPr id="2" name="Titel 1"/>
+          <p:cNvSpPr>
+            <a:spLocks noGrp="1"/>
+          </p:cNvSpPr>
+          <p:nvPr>
+            <p:ph type="title"/>
+          </p:nvPr>
+        </p:nvSpPr>
+        <p:spPr/>
+        <p:txBody>
+          <a:bodyPr>
+            <a:normAutofit/>
+          </a:bodyPr>
+          <a:lstStyle/>
+          <a:p>
+            <a:r>
+              <a:rPr lang="de-DE" sz="2800" dirty="0" smtClean="0">
+                <a:latin typeface="Lato" pitchFamily="34" charset="0"/>
+              </a:rPr>
+              <a:t>Beispiele</a:t>
+            </a:r>
+            <a:endParaRPr lang="de-DE" sz="2800" dirty="0">
+              <a:latin typeface="Lato" pitchFamily="34" charset="0"/>
+            </a:endParaRPr>
+          </a:p>
+        </p:txBody>
+      </p:sp>
+      <p:sp>
+        <p:nvSpPr>
+          <p:cNvPr id="4" name="Datumsplatzhalter 3"/>
+          <p:cNvSpPr>
+            <a:spLocks noGrp="1"/>
+          </p:cNvSpPr>
+          <p:nvPr>
+            <p:ph type="dt" sz="half" idx="10"/>
+          </p:nvPr>
+        </p:nvSpPr>
+        <p:spPr/>
+        <p:txBody>
+          <a:bodyPr/>
+          <a:lstStyle/>
+          <a:p>
+            <a:fld id="{1C72BD4E-61B2-40A3-A75C-5FDEDE8E5EC5}" type="datetime1">
+              <a:rPr lang="de-DE" smtClean="0"/>
+              <a:pPr/>
+              <a:t>13.06.2015</a:t>
+            </a:fld>
+            <a:endParaRPr lang="de-DE"/>
+          </a:p>
+        </p:txBody>
+      </p:sp>
+      <p:sp>
+        <p:nvSpPr>
+          <p:cNvPr id="5" name="Fußzeilenplatzhalter 4"/>
+          <p:cNvSpPr>
+            <a:spLocks noGrp="1"/>
+          </p:cNvSpPr>
+          <p:nvPr>
+            <p:ph type="ftr" sz="quarter" idx="11"/>
+          </p:nvPr>
+        </p:nvSpPr>
+        <p:spPr/>
+        <p:txBody>
+          <a:bodyPr/>
+          <a:lstStyle/>
+          <a:p>
+            <a:r>
+              <a:rPr lang="de-DE" smtClean="0"/>
+              <a:t>FM-Synthese</a:t>
+            </a:r>
+            <a:endParaRPr lang="de-DE"/>
+          </a:p>
+        </p:txBody>
+      </p:sp>
+      <p:sp>
+        <p:nvSpPr>
+          <p:cNvPr id="6" name="Foliennummernplatzhalter 5"/>
+          <p:cNvSpPr>
+            <a:spLocks noGrp="1"/>
+          </p:cNvSpPr>
+          <p:nvPr>
+            <p:ph type="sldNum" sz="quarter" idx="12"/>
+          </p:nvPr>
+        </p:nvSpPr>
+        <p:spPr/>
+        <p:txBody>
+          <a:bodyPr/>
+          <a:lstStyle/>
+          <a:p>
+            <a:fld id="{6C6AE60A-B69C-4790-82F7-3882EDF23186}" type="slidenum">
+              <a:rPr lang="de-DE" smtClean="0"/>
+              <a:pPr/>
+              <a:t>6</a:t>
+            </a:fld>
+            <a:endParaRPr lang="de-DE" dirty="0"/>
+          </a:p>
+        </p:txBody>
+      </p:sp>
+      <p:pic>
+        <p:nvPicPr>
+          <p:cNvPr id="11" name="Picture 2" descr="D:\Julius\Documents\GitHub\VSeminar\Dok\Kapitel\img\Prinzip.png"/>
+          <p:cNvPicPr>
+            <a:picLocks noChangeAspect="1" noChangeArrowheads="1"/>
+          </p:cNvPicPr>
+          <p:nvPr/>
+        </p:nvPicPr>
+        <p:blipFill>
+          <a:blip r:embed="rId3" cstate="print"/>
+          <a:stretch>
+            <a:fillRect/>
+          </a:stretch>
+        </p:blipFill>
+        <p:spPr bwMode="auto">
+          <a:xfrm>
+            <a:off x="3853092" y="1276378"/>
+            <a:ext cx="4544578" cy="3243039"/>
+          </a:xfrm>
+          <a:prstGeom prst="rect">
+            <a:avLst/>
+          </a:prstGeom>
+          <a:noFill/>
+          <a:ln w="3175">
+            <a:solidFill>
+              <a:schemeClr val="tx1"/>
+            </a:solidFill>
+          </a:ln>
+        </p:spPr>
+      </p:pic>
+      <p:sp>
+        <p:nvSpPr>
+          <p:cNvPr id="12" name="Textfeld 11"/>
+          <p:cNvSpPr txBox="1"/>
+          <p:nvPr/>
+        </p:nvSpPr>
+        <p:spPr>
+          <a:xfrm>
+            <a:off x="539552" y="1203598"/>
+            <a:ext cx="3168352" cy="3354765"/>
+          </a:xfrm>
+          <a:prstGeom prst="rect">
+            <a:avLst/>
+          </a:prstGeom>
+          <a:noFill/>
+        </p:spPr>
+        <p:txBody>
+          <a:bodyPr wrap="square" rtlCol="0">
+            <a:spAutoFit/>
+          </a:bodyPr>
+          <a:lstStyle/>
+          <a:p>
+            <a:r>
+              <a:rPr lang="de-DE" sz="2800" dirty="0" smtClean="0">
+                <a:latin typeface="Lato" pitchFamily="34" charset="0"/>
+              </a:rPr>
+              <a:t>Beispiel 2. </a:t>
+            </a:r>
+          </a:p>
+          <a:p>
+            <a:endParaRPr lang="de-DE" dirty="0" smtClean="0">
+              <a:latin typeface="Lato" pitchFamily="34" charset="0"/>
+            </a:endParaRPr>
+          </a:p>
+          <a:p>
+            <a:r>
+              <a:rPr lang="de-DE" sz="2000" dirty="0" smtClean="0">
+                <a:latin typeface="Lato" pitchFamily="34" charset="0"/>
+              </a:rPr>
+              <a:t>Träger</a:t>
+            </a:r>
+          </a:p>
+          <a:p>
+            <a:endParaRPr lang="de-DE" dirty="0" smtClean="0">
+              <a:latin typeface="Lato" pitchFamily="34" charset="0"/>
+            </a:endParaRPr>
+          </a:p>
+          <a:p>
+            <a:endParaRPr lang="de-DE" dirty="0" smtClean="0">
+              <a:latin typeface="Lato" pitchFamily="34" charset="0"/>
+            </a:endParaRPr>
+          </a:p>
+          <a:p>
+            <a:r>
+              <a:rPr lang="de-DE" sz="2000" dirty="0" smtClean="0">
+                <a:latin typeface="Lato" pitchFamily="34" charset="0"/>
+              </a:rPr>
+              <a:t>Modulator</a:t>
+            </a:r>
+          </a:p>
+          <a:p>
+            <a:endParaRPr lang="de-DE" dirty="0" smtClean="0">
+              <a:latin typeface="Lato" pitchFamily="34" charset="0"/>
+            </a:endParaRPr>
+          </a:p>
+          <a:p>
+            <a:endParaRPr lang="de-DE" dirty="0" smtClean="0">
+              <a:latin typeface="Lato" pitchFamily="34" charset="0"/>
+            </a:endParaRPr>
+          </a:p>
+          <a:p>
+            <a:r>
+              <a:rPr lang="de-DE" sz="2000" dirty="0" smtClean="0">
+                <a:latin typeface="Lato" pitchFamily="34" charset="0"/>
+              </a:rPr>
+              <a:t>Resultierendes Signal</a:t>
+            </a:r>
+          </a:p>
+          <a:p>
+            <a:endParaRPr lang="de-DE" dirty="0" smtClean="0">
+              <a:latin typeface="Lato" pitchFamily="34" charset="0"/>
+            </a:endParaRPr>
+          </a:p>
+          <a:p>
+            <a:endParaRPr lang="de-DE" dirty="0">
+              <a:latin typeface="Lato" pitchFamily="34" charset="0"/>
+            </a:endParaRPr>
+          </a:p>
+        </p:txBody>
+      </p:sp>
+      <p:graphicFrame>
+        <p:nvGraphicFramePr>
+          <p:cNvPr id="18437" name="Object 5"/>
+          <p:cNvGraphicFramePr>
+            <a:graphicFrameLocks noChangeAspect="1"/>
+          </p:cNvGraphicFramePr>
+          <p:nvPr/>
+        </p:nvGraphicFramePr>
+        <p:xfrm>
+          <a:off x="683568" y="2283718"/>
+          <a:ext cx="1244600" cy="203200"/>
+        </p:xfrm>
+        <a:graphic>
+          <a:graphicData uri="http://schemas.openxmlformats.org/presentationml/2006/ole">
+            <p:oleObj spid="_x0000_s19458" name="Formel" r:id="rId4" imgW="1244520" imgH="203040" progId="Equation.3">
+              <p:embed/>
+            </p:oleObj>
+          </a:graphicData>
+        </a:graphic>
+      </p:graphicFrame>
+      <p:graphicFrame>
+        <p:nvGraphicFramePr>
+          <p:cNvPr id="15" name="Objekt 14"/>
+          <p:cNvGraphicFramePr>
+            <a:graphicFrameLocks noChangeAspect="1"/>
+          </p:cNvGraphicFramePr>
+          <p:nvPr/>
+        </p:nvGraphicFramePr>
+        <p:xfrm>
+          <a:off x="652463" y="3148013"/>
+          <a:ext cx="1320800" cy="203200"/>
+        </p:xfrm>
+        <a:graphic>
+          <a:graphicData uri="http://schemas.openxmlformats.org/presentationml/2006/ole">
+            <p:oleObj spid="_x0000_s19459" name="Formel" r:id="rId5" imgW="1320480" imgH="203040" progId="Equation.3">
+              <p:embed/>
+            </p:oleObj>
+          </a:graphicData>
+        </a:graphic>
+      </p:graphicFrame>
+      <p:graphicFrame>
+        <p:nvGraphicFramePr>
+          <p:cNvPr id="16" name="Objekt 15"/>
+          <p:cNvGraphicFramePr>
+            <a:graphicFrameLocks noChangeAspect="1"/>
+          </p:cNvGraphicFramePr>
+          <p:nvPr/>
+        </p:nvGraphicFramePr>
+        <p:xfrm>
+          <a:off x="652463" y="4011613"/>
+          <a:ext cx="2209800" cy="203200"/>
+        </p:xfrm>
+        <a:graphic>
+          <a:graphicData uri="http://schemas.openxmlformats.org/presentationml/2006/ole">
+            <p:oleObj spid="_x0000_s19460" name="Formel" r:id="rId6" imgW="2209680" imgH="203040" progId="Equation.3">
+              <p:embed/>
+            </p:oleObj>
+          </a:graphicData>
+        </a:graphic>
+      </p:graphicFrame>
+    </p:spTree>
+  </p:cSld>
+  <p:clrMapOvr>
+    <a:masterClrMapping/>
+  </p:clrMapOvr>
+  <p:timing>
+    <p:tnLst>
+      <p:par>
+        <p:cTn id="1" dur="indefinite" restart="never" nodeType="tmRoot"/>
+      </p:par>
+    </p:tnLst>
+  </p:timing>
+</p:sld>
+</file>
+
+<file path=ppt/slides/slide7.xml><?xml version="1.0" encoding="utf-8"?>
+<p:sld xmlns:a="http://schemas.openxmlformats.org/drawingml/2006/main" xmlns:r="http://schemas.openxmlformats.org/officeDocument/2006/relationships" xmlns:p="http://schemas.openxmlformats.org/presentationml/2006/main">
+  <p:cSld>
+    <p:spTree>
+      <p:nvGrpSpPr>
+        <p:cNvPr id="1" name=""/>
+        <p:cNvGrpSpPr/>
+        <p:nvPr/>
+      </p:nvGrpSpPr>
+      <p:grpSpPr>
+        <a:xfrm>
+          <a:off x="0" y="0"/>
+          <a:ext cx="0" cy="0"/>
+          <a:chOff x="0" y="0"/>
+          <a:chExt cx="0" cy="0"/>
+        </a:xfrm>
+      </p:grpSpPr>
+      <p:sp>
+        <p:nvSpPr>
+          <p:cNvPr id="2" name="Titel 1"/>
+          <p:cNvSpPr>
+            <a:spLocks noGrp="1"/>
+          </p:cNvSpPr>
+          <p:nvPr>
+            <p:ph type="title"/>
+          </p:nvPr>
+        </p:nvSpPr>
+        <p:spPr/>
+        <p:txBody>
+          <a:bodyPr>
+            <a:normAutofit/>
+          </a:bodyPr>
+          <a:lstStyle/>
+          <a:p>
+            <a:r>
+              <a:rPr lang="de-DE" sz="2800" dirty="0" smtClean="0">
+                <a:latin typeface="Lato" pitchFamily="34" charset="0"/>
+              </a:rPr>
+              <a:t>Songbeispiele</a:t>
+            </a:r>
+            <a:endParaRPr lang="de-DE" sz="2800" dirty="0">
+              <a:latin typeface="Lato" pitchFamily="34" charset="0"/>
+            </a:endParaRPr>
+          </a:p>
+        </p:txBody>
+      </p:sp>
+      <p:sp>
+        <p:nvSpPr>
+          <p:cNvPr id="3" name="Inhaltsplatzhalter 2"/>
+          <p:cNvSpPr>
+            <a:spLocks noGrp="1"/>
+          </p:cNvSpPr>
+          <p:nvPr>
+            <p:ph idx="1"/>
+          </p:nvPr>
+        </p:nvSpPr>
+        <p:spPr/>
+        <p:txBody>
+          <a:bodyPr/>
+          <a:lstStyle/>
+          <a:p>
+            <a:r>
+              <a:rPr lang="de-DE" sz="2000" dirty="0" smtClean="0">
+                <a:latin typeface="Lato" pitchFamily="34" charset="0"/>
+              </a:rPr>
+              <a:t>Erste, mit FM-Synthese erstellte Stücke</a:t>
+            </a:r>
+          </a:p>
+          <a:p>
+            <a:r>
+              <a:rPr lang="de-DE" sz="2000" dirty="0" smtClean="0">
+                <a:latin typeface="Lato" pitchFamily="34" charset="0"/>
+              </a:rPr>
+              <a:t>Von John </a:t>
+            </a:r>
+            <a:r>
+              <a:rPr lang="de-DE" sz="2000" dirty="0" err="1" smtClean="0">
+                <a:latin typeface="Lato" pitchFamily="34" charset="0"/>
+              </a:rPr>
+              <a:t>Chowning</a:t>
+            </a:r>
+            <a:r>
+              <a:rPr lang="de-DE" sz="2000" dirty="0" smtClean="0">
+                <a:latin typeface="Lato" pitchFamily="34" charset="0"/>
+              </a:rPr>
+              <a:t> selbst</a:t>
+            </a:r>
+          </a:p>
+          <a:p>
+            <a:endParaRPr lang="de-DE" sz="2000" dirty="0" smtClean="0">
+              <a:latin typeface="Lato" pitchFamily="34" charset="0"/>
+            </a:endParaRPr>
+          </a:p>
+          <a:p>
+            <a:r>
+              <a:rPr lang="de-DE" sz="2000" dirty="0" smtClean="0">
+                <a:latin typeface="Lato" pitchFamily="34" charset="0"/>
+              </a:rPr>
+              <a:t>„</a:t>
+            </a:r>
+            <a:r>
+              <a:rPr lang="de-DE" sz="2000" dirty="0" err="1" smtClean="0">
+                <a:latin typeface="Lato" pitchFamily="34" charset="0"/>
+              </a:rPr>
+              <a:t>Sabelithe</a:t>
+            </a:r>
+            <a:r>
+              <a:rPr lang="de-DE" sz="2000" dirty="0" smtClean="0">
+                <a:latin typeface="Lato" pitchFamily="34" charset="0"/>
+              </a:rPr>
+              <a:t>“ (1971)</a:t>
+            </a:r>
+          </a:p>
+          <a:p>
+            <a:endParaRPr lang="de-DE" sz="2000" dirty="0" smtClean="0">
+              <a:latin typeface="Lato" pitchFamily="34" charset="0"/>
+            </a:endParaRPr>
+          </a:p>
+          <a:p>
+            <a:r>
+              <a:rPr lang="de-DE" sz="2000" dirty="0" smtClean="0">
+                <a:latin typeface="Lato" pitchFamily="34" charset="0"/>
+              </a:rPr>
+              <a:t>„</a:t>
+            </a:r>
+            <a:r>
+              <a:rPr lang="de-DE" sz="2000" dirty="0" err="1" smtClean="0">
+                <a:latin typeface="Lato" pitchFamily="34" charset="0"/>
+              </a:rPr>
+              <a:t>Turenas</a:t>
+            </a:r>
+            <a:r>
+              <a:rPr lang="de-DE" sz="2000" dirty="0" smtClean="0">
+                <a:latin typeface="Lato" pitchFamily="34" charset="0"/>
+              </a:rPr>
+              <a:t>“ (1972)</a:t>
+            </a:r>
+            <a:endParaRPr lang="de-DE" sz="2000" dirty="0" smtClean="0">
+              <a:latin typeface="Lato" pitchFamily="34" charset="0"/>
+            </a:endParaRPr>
+          </a:p>
+          <a:p>
+            <a:endParaRPr lang="de-DE" dirty="0">
+              <a:latin typeface="Lato" pitchFamily="34" charset="0"/>
+            </a:endParaRPr>
+          </a:p>
+        </p:txBody>
+      </p:sp>
+      <p:sp>
+        <p:nvSpPr>
+          <p:cNvPr id="4" name="Datumsplatzhalter 3"/>
+          <p:cNvSpPr>
+            <a:spLocks noGrp="1"/>
+          </p:cNvSpPr>
+          <p:nvPr>
+            <p:ph type="dt" sz="half" idx="10"/>
+          </p:nvPr>
+        </p:nvSpPr>
+        <p:spPr/>
+        <p:txBody>
+          <a:bodyPr/>
+          <a:lstStyle/>
+          <a:p>
+            <a:fld id="{1C72BD4E-61B2-40A3-A75C-5FDEDE8E5EC5}" type="datetime1">
+              <a:rPr lang="de-DE" smtClean="0"/>
+              <a:pPr/>
+              <a:t>13.06.2015</a:t>
+            </a:fld>
+            <a:endParaRPr lang="de-DE"/>
+          </a:p>
+        </p:txBody>
+      </p:sp>
+      <p:sp>
+        <p:nvSpPr>
+          <p:cNvPr id="5" name="Fußzeilenplatzhalter 4"/>
+          <p:cNvSpPr>
+            <a:spLocks noGrp="1"/>
+          </p:cNvSpPr>
+          <p:nvPr>
+            <p:ph type="ftr" sz="quarter" idx="11"/>
+          </p:nvPr>
+        </p:nvSpPr>
+        <p:spPr/>
+        <p:txBody>
+          <a:bodyPr/>
+          <a:lstStyle/>
+          <a:p>
+            <a:r>
+              <a:rPr lang="de-DE" smtClean="0"/>
+              <a:t>FM-Synthese</a:t>
+            </a:r>
+            <a:endParaRPr lang="de-DE"/>
+          </a:p>
+        </p:txBody>
+      </p:sp>
+      <p:sp>
+        <p:nvSpPr>
+          <p:cNvPr id="6" name="Foliennummernplatzhalter 5"/>
+          <p:cNvSpPr>
+            <a:spLocks noGrp="1"/>
+          </p:cNvSpPr>
+          <p:nvPr>
+            <p:ph type="sldNum" sz="quarter" idx="12"/>
+          </p:nvPr>
+        </p:nvSpPr>
+        <p:spPr/>
+        <p:txBody>
+          <a:bodyPr/>
+          <a:lstStyle/>
+          <a:p>
+            <a:fld id="{6C6AE60A-B69C-4790-82F7-3882EDF23186}" type="slidenum">
+              <a:rPr lang="de-DE" smtClean="0"/>
+              <a:pPr/>
+              <a:t>7</a:t>
+            </a:fld>
+            <a:endParaRPr lang="de-DE" dirty="0"/>
+          </a:p>
+        </p:txBody>
+      </p:sp>
+    </p:spTree>
+  </p:cSld>
+  <p:clrMapOvr>
+    <a:masterClrMapping/>
+  </p:clrMapOvr>
+  <p:timing>
+    <p:tnLst>
+      <p:par>
+        <p:cTn id="1" dur="indefinite" restart="never" nodeType="tmRoot"/>
+      </p:par>
+    </p:tnLst>
+  </p:timing>
+</p:sld>
+</file>
+
+<file path=ppt/slides/slide8.xml><?xml version="1.0" encoding="utf-8"?>
+<p:sld xmlns:a="http://schemas.openxmlformats.org/drawingml/2006/main" xmlns:r="http://schemas.openxmlformats.org/officeDocument/2006/relationships" xmlns:p="http://schemas.openxmlformats.org/presentationml/2006/main">
+  <p:cSld>
+    <p:spTree>
+      <p:nvGrpSpPr>
+        <p:cNvPr id="1" name=""/>
+        <p:cNvGrpSpPr/>
+        <p:nvPr/>
+      </p:nvGrpSpPr>
+      <p:grpSpPr>
+        <a:xfrm>
+          <a:off x="0" y="0"/>
+          <a:ext cx="0" cy="0"/>
+          <a:chOff x="0" y="0"/>
+          <a:chExt cx="0" cy="0"/>
+        </a:xfrm>
+      </p:grpSpPr>
+      <p:sp>
+        <p:nvSpPr>
+          <p:cNvPr id="2" name="Titel 1"/>
+          <p:cNvSpPr>
+            <a:spLocks noGrp="1"/>
+          </p:cNvSpPr>
+          <p:nvPr>
+            <p:ph type="title"/>
+          </p:nvPr>
+        </p:nvSpPr>
+        <p:spPr/>
+        <p:txBody>
+          <a:bodyPr>
+            <a:normAutofit/>
+          </a:bodyPr>
+          <a:lstStyle/>
+          <a:p>
+            <a:r>
+              <a:rPr lang="de-DE" sz="2800" dirty="0" smtClean="0">
+                <a:latin typeface="Lato" pitchFamily="34" charset="0"/>
+              </a:rPr>
+              <a:t>Geschichte der FM-Synthese</a:t>
+            </a:r>
+            <a:endParaRPr lang="de-DE" sz="2800" dirty="0">
+              <a:latin typeface="Lato" pitchFamily="34" charset="0"/>
+            </a:endParaRPr>
+          </a:p>
+        </p:txBody>
+      </p:sp>
+      <p:sp>
+        <p:nvSpPr>
+          <p:cNvPr id="3" name="Inhaltsplatzhalter 2"/>
+          <p:cNvSpPr>
+            <a:spLocks noGrp="1"/>
+          </p:cNvSpPr>
+          <p:nvPr>
+            <p:ph idx="1"/>
+          </p:nvPr>
+        </p:nvSpPr>
+        <p:spPr/>
+        <p:txBody>
+          <a:bodyPr>
+            <a:normAutofit/>
+          </a:bodyPr>
+          <a:lstStyle/>
+          <a:p>
+            <a:r>
+              <a:rPr lang="de-DE" sz="2000" dirty="0" smtClean="0"/>
+              <a:t>Grundlage: Frequenzmodulation</a:t>
+            </a:r>
+          </a:p>
+          <a:p>
+            <a:r>
+              <a:rPr lang="de-DE" sz="2000" dirty="0" smtClean="0"/>
+              <a:t>Bekannt aus Nachrichtentechnik</a:t>
+            </a:r>
+          </a:p>
+          <a:p>
+            <a:r>
+              <a:rPr lang="de-DE" sz="2000" dirty="0" smtClean="0"/>
+              <a:t>Erfinder FM-Synthese: </a:t>
+            </a:r>
+          </a:p>
+          <a:p>
+            <a:pPr>
+              <a:buNone/>
+            </a:pPr>
+            <a:r>
+              <a:rPr lang="de-DE" sz="2000" dirty="0" smtClean="0"/>
+              <a:t>	Prof. Dr. John </a:t>
+            </a:r>
+            <a:r>
+              <a:rPr lang="de-DE" sz="2000" dirty="0" err="1" smtClean="0"/>
+              <a:t>Chowning</a:t>
+            </a:r>
+            <a:endParaRPr lang="de-DE" sz="2000" dirty="0" smtClean="0"/>
+          </a:p>
+          <a:p>
+            <a:endParaRPr lang="de-DE" sz="2000" dirty="0"/>
+          </a:p>
+        </p:txBody>
+      </p:sp>
+      <p:sp>
+        <p:nvSpPr>
+          <p:cNvPr id="4" name="Datumsplatzhalter 3"/>
+          <p:cNvSpPr>
+            <a:spLocks noGrp="1"/>
+          </p:cNvSpPr>
+          <p:nvPr>
+            <p:ph type="dt" sz="half" idx="10"/>
+          </p:nvPr>
+        </p:nvSpPr>
+        <p:spPr/>
+        <p:txBody>
+          <a:bodyPr/>
+          <a:lstStyle/>
+          <a:p>
+            <a:fld id="{1C72BD4E-61B2-40A3-A75C-5FDEDE8E5EC5}" type="datetime1">
+              <a:rPr lang="de-DE" smtClean="0"/>
+              <a:pPr/>
+              <a:t>13.06.2015</a:t>
+            </a:fld>
+            <a:endParaRPr lang="de-DE"/>
+          </a:p>
+        </p:txBody>
+      </p:sp>
+      <p:sp>
+        <p:nvSpPr>
+          <p:cNvPr id="5" name="Fußzeilenplatzhalter 4"/>
+          <p:cNvSpPr>
+            <a:spLocks noGrp="1"/>
+          </p:cNvSpPr>
+          <p:nvPr>
+            <p:ph type="ftr" sz="quarter" idx="11"/>
+          </p:nvPr>
+        </p:nvSpPr>
+        <p:spPr/>
+        <p:txBody>
+          <a:bodyPr/>
+          <a:lstStyle/>
+          <a:p>
+            <a:r>
+              <a:rPr lang="de-DE" smtClean="0"/>
+              <a:t>FM-Synthese</a:t>
+            </a:r>
+            <a:endParaRPr lang="de-DE"/>
+          </a:p>
+        </p:txBody>
+      </p:sp>
+      <p:sp>
+        <p:nvSpPr>
+          <p:cNvPr id="6" name="Foliennummernplatzhalter 5"/>
+          <p:cNvSpPr>
+            <a:spLocks noGrp="1"/>
+          </p:cNvSpPr>
+          <p:nvPr>
+            <p:ph type="sldNum" sz="quarter" idx="12"/>
+          </p:nvPr>
+        </p:nvSpPr>
+        <p:spPr/>
+        <p:txBody>
+          <a:bodyPr/>
+          <a:lstStyle/>
+          <a:p>
+            <a:fld id="{6C6AE60A-B69C-4790-82F7-3882EDF23186}" type="slidenum">
+              <a:rPr lang="de-DE" smtClean="0"/>
+              <a:pPr/>
+              <a:t>8</a:t>
+            </a:fld>
+            <a:endParaRPr lang="de-DE" dirty="0"/>
+          </a:p>
+        </p:txBody>
+      </p:sp>
+      <p:pic>
+        <p:nvPicPr>
+          <p:cNvPr id="20482" name="Picture 2" descr="D:\Julius\Documents\GitHub\VSeminar\Dok\Kapitel\img\chowning_CCRMA.png"/>
+          <p:cNvPicPr>
+            <a:picLocks noChangeAspect="1" noChangeArrowheads="1"/>
+          </p:cNvPicPr>
+          <p:nvPr/>
+        </p:nvPicPr>
+        <p:blipFill>
+          <a:blip r:embed="rId2" cstate="print"/>
+          <a:srcRect/>
+          <a:stretch>
+            <a:fillRect/>
+          </a:stretch>
+        </p:blipFill>
+        <p:spPr bwMode="auto">
+          <a:xfrm>
+            <a:off x="4860032" y="1995686"/>
+            <a:ext cx="3096344" cy="2486068"/>
+          </a:xfrm>
+          <a:prstGeom prst="rect">
+            <a:avLst/>
+          </a:prstGeom>
+          <a:noFill/>
+        </p:spPr>
+      </p:pic>
+    </p:spTree>
+  </p:cSld>
+  <p:clrMapOvr>
+    <a:masterClrMapping/>
+  </p:clrMapOvr>
+</p:sld>
+</file>
+
+<file path=ppt/slides/slide9.xml><?xml version="1.0" encoding="utf-8"?>
+<p:sld xmlns:a="http://schemas.openxmlformats.org/drawingml/2006/main" xmlns:r="http://schemas.openxmlformats.org/officeDocument/2006/relationships" xmlns:p="http://schemas.openxmlformats.org/presentationml/2006/main">
+  <p:cSld>
+    <p:spTree>
+      <p:nvGrpSpPr>
+        <p:cNvPr id="1" name=""/>
+        <p:cNvGrpSpPr/>
+        <p:nvPr/>
+      </p:nvGrpSpPr>
+      <p:grpSpPr>
+        <a:xfrm>
+          <a:off x="0" y="0"/>
+          <a:ext cx="0" cy="0"/>
+          <a:chOff x="0" y="0"/>
+          <a:chExt cx="0" cy="0"/>
+        </a:xfrm>
+      </p:grpSpPr>
+      <p:sp>
+        <p:nvSpPr>
+          <p:cNvPr id="2" name="Titel 1"/>
+          <p:cNvSpPr>
+            <a:spLocks noGrp="1"/>
+          </p:cNvSpPr>
+          <p:nvPr>
+            <p:ph type="title"/>
+          </p:nvPr>
+        </p:nvSpPr>
+        <p:spPr/>
+        <p:txBody>
+          <a:bodyPr>
+            <a:normAutofit/>
+          </a:bodyPr>
+          <a:lstStyle/>
+          <a:p>
+            <a:r>
+              <a:rPr lang="de-DE" sz="2800" dirty="0" smtClean="0">
+                <a:latin typeface="Lato" pitchFamily="34" charset="0"/>
+              </a:rPr>
+              <a:t>Geschichte der FM-Synthese</a:t>
+            </a:r>
+            <a:endParaRPr lang="de-DE" sz="2800" dirty="0">
+              <a:latin typeface="Lato" pitchFamily="34" charset="0"/>
+            </a:endParaRPr>
+          </a:p>
+        </p:txBody>
+      </p:sp>
+      <p:sp>
+        <p:nvSpPr>
+          <p:cNvPr id="3" name="Inhaltsplatzhalter 2"/>
+          <p:cNvSpPr>
+            <a:spLocks noGrp="1"/>
+          </p:cNvSpPr>
+          <p:nvPr>
+            <p:ph idx="1"/>
+          </p:nvPr>
+        </p:nvSpPr>
+        <p:spPr/>
+        <p:txBody>
+          <a:bodyPr>
+            <a:normAutofit/>
+          </a:bodyPr>
+          <a:lstStyle/>
+          <a:p>
+            <a:r>
+              <a:rPr lang="de-DE" sz="2000" dirty="0" smtClean="0"/>
+              <a:t>Erste Entdeckung im Jahre 1967</a:t>
+            </a:r>
+          </a:p>
+          <a:p>
+            <a:r>
+              <a:rPr lang="de-DE" sz="2000" dirty="0" err="1" smtClean="0"/>
+              <a:t>Chowning</a:t>
+            </a:r>
+            <a:r>
+              <a:rPr lang="de-DE" sz="2000" dirty="0" smtClean="0"/>
+              <a:t> experimentierte mit </a:t>
+            </a:r>
+            <a:r>
+              <a:rPr lang="de-DE" sz="2000" dirty="0" err="1" smtClean="0"/>
+              <a:t>Vibratos</a:t>
+            </a:r>
+            <a:endParaRPr lang="de-DE" sz="2000" dirty="0" smtClean="0"/>
+          </a:p>
+          <a:p>
+            <a:r>
+              <a:rPr lang="de-DE" sz="2000" dirty="0" smtClean="0"/>
+              <a:t>Vibrato: Periodische Änderung eines Tons</a:t>
+            </a:r>
+          </a:p>
+          <a:p>
+            <a:r>
+              <a:rPr lang="de-DE" sz="2000" dirty="0" smtClean="0"/>
+              <a:t>Neue Obertöne bei höheren Modulationsfrequenzen</a:t>
+            </a:r>
+          </a:p>
+        </p:txBody>
+      </p:sp>
+      <p:sp>
+        <p:nvSpPr>
+          <p:cNvPr id="4" name="Datumsplatzhalter 3"/>
+          <p:cNvSpPr>
+            <a:spLocks noGrp="1"/>
+          </p:cNvSpPr>
+          <p:nvPr>
+            <p:ph type="dt" sz="half" idx="10"/>
+          </p:nvPr>
+        </p:nvSpPr>
+        <p:spPr/>
+        <p:txBody>
+          <a:bodyPr/>
+          <a:lstStyle/>
+          <a:p>
+            <a:fld id="{1C72BD4E-61B2-40A3-A75C-5FDEDE8E5EC5}" type="datetime1">
+              <a:rPr lang="de-DE" smtClean="0"/>
+              <a:pPr/>
+              <a:t>13.06.2015</a:t>
+            </a:fld>
+            <a:endParaRPr lang="de-DE"/>
+          </a:p>
+        </p:txBody>
+      </p:sp>
+      <p:sp>
+        <p:nvSpPr>
+          <p:cNvPr id="5" name="Fußzeilenplatzhalter 4"/>
+          <p:cNvSpPr>
+            <a:spLocks noGrp="1"/>
+          </p:cNvSpPr>
+          <p:nvPr>
+            <p:ph type="ftr" sz="quarter" idx="11"/>
+          </p:nvPr>
+        </p:nvSpPr>
+        <p:spPr/>
+        <p:txBody>
+          <a:bodyPr/>
+          <a:lstStyle/>
+          <a:p>
+            <a:r>
+              <a:rPr lang="de-DE" smtClean="0"/>
+              <a:t>FM-Synthese</a:t>
+            </a:r>
+            <a:endParaRPr lang="de-DE"/>
+          </a:p>
+        </p:txBody>
+      </p:sp>
+      <p:sp>
+        <p:nvSpPr>
+          <p:cNvPr id="6" name="Foliennummernplatzhalter 5"/>
+          <p:cNvSpPr>
+            <a:spLocks noGrp="1"/>
+          </p:cNvSpPr>
+          <p:nvPr>
+            <p:ph type="sldNum" sz="quarter" idx="12"/>
+          </p:nvPr>
+        </p:nvSpPr>
+        <p:spPr/>
+        <p:txBody>
+          <a:bodyPr/>
+          <a:lstStyle/>
+          <a:p>
+            <a:fld id="{6C6AE60A-B69C-4790-82F7-3882EDF23186}" type="slidenum">
+              <a:rPr lang="de-DE" smtClean="0"/>
+              <a:pPr/>
+              <a:t>9</a:t>
+            </a:fld>
+            <a:endParaRPr lang="de-DE" dirty="0"/>
+          </a:p>
+        </p:txBody>
+      </p:sp>
+    </p:spTree>
+  </p:cSld>
+  <p:clrMapOvr>
+    <a:masterClrMapping/>
+  </p:clrMapOvr>
 </p:sld>
 </file>
 

</xml_diff>

<commit_message>
Some small changes in text and presentation
</commit_message>
<xml_diff>
--- a/Praesentation/FMSynthese-Julius.pptx
+++ b/Praesentation/FMSynthese-Julius.pptx
@@ -255,7 +255,7 @@
             <a:fld id="{364A5697-ABCF-455C-8519-931EFDD64AAA}" type="datetimeFigureOut">
               <a:rPr lang="de-DE" smtClean="0"/>
               <a:pPr/>
-              <a:t>20.06.2015</a:t>
+              <a:t>21.06.2015</a:t>
             </a:fld>
             <a:endParaRPr lang="de-DE"/>
           </a:p>
@@ -570,7 +570,7 @@
           <a:bodyPr/>
           <a:lstStyle/>
           <a:p>
-            <a:endParaRPr lang="de-DE"/>
+            <a:endParaRPr lang="de-DE" dirty="0"/>
           </a:p>
         </p:txBody>
       </p:sp>
@@ -594,7 +594,7 @@
               <a:pPr/>
               <a:t>2</a:t>
             </a:fld>
-            <a:endParaRPr lang="de-DE"/>
+            <a:endParaRPr lang="de-DE" dirty="0"/>
           </a:p>
         </p:txBody>
       </p:sp>
@@ -655,7 +655,7 @@
           <a:bodyPr/>
           <a:lstStyle/>
           <a:p>
-            <a:endParaRPr lang="de-DE"/>
+            <a:endParaRPr lang="de-DE" dirty="0"/>
           </a:p>
         </p:txBody>
       </p:sp>
@@ -679,7 +679,7 @@
               <a:pPr/>
               <a:t>3</a:t>
             </a:fld>
-            <a:endParaRPr lang="de-DE"/>
+            <a:endParaRPr lang="de-DE" dirty="0"/>
           </a:p>
         </p:txBody>
       </p:sp>
@@ -687,6 +687,188 @@
     <p:extLst>
       <p:ext uri="{BB962C8B-B14F-4D97-AF65-F5344CB8AC3E}">
         <p14:creationId xmlns:p14="http://schemas.microsoft.com/office/powerpoint/2010/main" val="2673098597"/>
+      </p:ext>
+    </p:extLst>
+  </p:cSld>
+  <p:clrMapOvr>
+    <a:masterClrMapping/>
+  </p:clrMapOvr>
+</p:notes>
+</file>
+
+<file path=ppt/notesSlides/notesSlide3.xml><?xml version="1.0" encoding="utf-8"?>
+<p:notes xmlns:a="http://schemas.openxmlformats.org/drawingml/2006/main" xmlns:r="http://schemas.openxmlformats.org/officeDocument/2006/relationships" xmlns:p="http://schemas.openxmlformats.org/presentationml/2006/main">
+  <p:cSld>
+    <p:spTree>
+      <p:nvGrpSpPr>
+        <p:cNvPr id="1" name=""/>
+        <p:cNvGrpSpPr/>
+        <p:nvPr/>
+      </p:nvGrpSpPr>
+      <p:grpSpPr>
+        <a:xfrm>
+          <a:off x="0" y="0"/>
+          <a:ext cx="0" cy="0"/>
+          <a:chOff x="0" y="0"/>
+          <a:chExt cx="0" cy="0"/>
+        </a:xfrm>
+      </p:grpSpPr>
+      <p:sp>
+        <p:nvSpPr>
+          <p:cNvPr id="2" name="Folienbildplatzhalter 1"/>
+          <p:cNvSpPr>
+            <a:spLocks noGrp="1" noRot="1" noChangeAspect="1"/>
+          </p:cNvSpPr>
+          <p:nvPr>
+            <p:ph type="sldImg"/>
+          </p:nvPr>
+        </p:nvSpPr>
+        <p:spPr/>
+      </p:sp>
+      <p:sp>
+        <p:nvSpPr>
+          <p:cNvPr id="3" name="Notizenplatzhalter 2"/>
+          <p:cNvSpPr>
+            <a:spLocks noGrp="1"/>
+          </p:cNvSpPr>
+          <p:nvPr>
+            <p:ph type="body" idx="1"/>
+          </p:nvPr>
+        </p:nvSpPr>
+        <p:spPr/>
+        <p:txBody>
+          <a:bodyPr/>
+          <a:lstStyle/>
+          <a:p>
+            <a:r>
+              <a:rPr lang="de-DE" dirty="0" smtClean="0"/>
+              <a:t>Hier</a:t>
+            </a:r>
+            <a:r>
+              <a:rPr lang="de-DE" baseline="0" dirty="0" smtClean="0"/>
+              <a:t> bei 20 Minuten sein!!</a:t>
+            </a:r>
+            <a:endParaRPr lang="de-DE" dirty="0"/>
+          </a:p>
+        </p:txBody>
+      </p:sp>
+      <p:sp>
+        <p:nvSpPr>
+          <p:cNvPr id="4" name="Foliennummernplatzhalter 3"/>
+          <p:cNvSpPr>
+            <a:spLocks noGrp="1"/>
+          </p:cNvSpPr>
+          <p:nvPr>
+            <p:ph type="sldNum" sz="quarter" idx="10"/>
+          </p:nvPr>
+        </p:nvSpPr>
+        <p:spPr/>
+        <p:txBody>
+          <a:bodyPr/>
+          <a:lstStyle/>
+          <a:p>
+            <a:fld id="{B162E40F-E87F-4C0D-9DAF-92DD7B84B6D5}" type="slidenum">
+              <a:rPr lang="de-DE" smtClean="0"/>
+              <a:pPr/>
+              <a:t>21</a:t>
+            </a:fld>
+            <a:endParaRPr lang="de-DE"/>
+          </a:p>
+        </p:txBody>
+      </p:sp>
+    </p:spTree>
+    <p:extLst>
+      <p:ext uri="{BB962C8B-B14F-4D97-AF65-F5344CB8AC3E}">
+        <p14:creationId xmlns:p14="http://schemas.microsoft.com/office/powerpoint/2010/main" val="2824656199"/>
+      </p:ext>
+    </p:extLst>
+  </p:cSld>
+  <p:clrMapOvr>
+    <a:masterClrMapping/>
+  </p:clrMapOvr>
+</p:notes>
+</file>
+
+<file path=ppt/notesSlides/notesSlide4.xml><?xml version="1.0" encoding="utf-8"?>
+<p:notes xmlns:a="http://schemas.openxmlformats.org/drawingml/2006/main" xmlns:r="http://schemas.openxmlformats.org/officeDocument/2006/relationships" xmlns:p="http://schemas.openxmlformats.org/presentationml/2006/main">
+  <p:cSld>
+    <p:spTree>
+      <p:nvGrpSpPr>
+        <p:cNvPr id="1" name=""/>
+        <p:cNvGrpSpPr/>
+        <p:nvPr/>
+      </p:nvGrpSpPr>
+      <p:grpSpPr>
+        <a:xfrm>
+          <a:off x="0" y="0"/>
+          <a:ext cx="0" cy="0"/>
+          <a:chOff x="0" y="0"/>
+          <a:chExt cx="0" cy="0"/>
+        </a:xfrm>
+      </p:grpSpPr>
+      <p:sp>
+        <p:nvSpPr>
+          <p:cNvPr id="2" name="Folienbildplatzhalter 1"/>
+          <p:cNvSpPr>
+            <a:spLocks noGrp="1" noRot="1" noChangeAspect="1"/>
+          </p:cNvSpPr>
+          <p:nvPr>
+            <p:ph type="sldImg"/>
+          </p:nvPr>
+        </p:nvSpPr>
+        <p:spPr/>
+      </p:sp>
+      <p:sp>
+        <p:nvSpPr>
+          <p:cNvPr id="3" name="Notizenplatzhalter 2"/>
+          <p:cNvSpPr>
+            <a:spLocks noGrp="1"/>
+          </p:cNvSpPr>
+          <p:nvPr>
+            <p:ph type="body" idx="1"/>
+          </p:nvPr>
+        </p:nvSpPr>
+        <p:spPr/>
+        <p:txBody>
+          <a:bodyPr/>
+          <a:lstStyle/>
+          <a:p>
+            <a:r>
+              <a:rPr lang="de-DE" dirty="0" smtClean="0"/>
+              <a:t>Hier spätestens 25 Min!!</a:t>
+            </a:r>
+            <a:endParaRPr lang="de-DE" dirty="0"/>
+          </a:p>
+        </p:txBody>
+      </p:sp>
+      <p:sp>
+        <p:nvSpPr>
+          <p:cNvPr id="4" name="Foliennummernplatzhalter 3"/>
+          <p:cNvSpPr>
+            <a:spLocks noGrp="1"/>
+          </p:cNvSpPr>
+          <p:nvPr>
+            <p:ph type="sldNum" sz="quarter" idx="10"/>
+          </p:nvPr>
+        </p:nvSpPr>
+        <p:spPr/>
+        <p:txBody>
+          <a:bodyPr/>
+          <a:lstStyle/>
+          <a:p>
+            <a:fld id="{B162E40F-E87F-4C0D-9DAF-92DD7B84B6D5}" type="slidenum">
+              <a:rPr lang="de-DE" smtClean="0"/>
+              <a:pPr/>
+              <a:t>24</a:t>
+            </a:fld>
+            <a:endParaRPr lang="de-DE" dirty="0"/>
+          </a:p>
+        </p:txBody>
+      </p:sp>
+    </p:spTree>
+    <p:extLst>
+      <p:ext uri="{BB962C8B-B14F-4D97-AF65-F5344CB8AC3E}">
+        <p14:creationId xmlns:p14="http://schemas.microsoft.com/office/powerpoint/2010/main" val="3976513062"/>
       </p:ext>
     </p:extLst>
   </p:cSld>
@@ -1018,7 +1200,7 @@
             <a:fld id="{16CA1741-E8C7-4D32-930D-2CBEC658BBE9}" type="datetime1">
               <a:rPr lang="de-DE" smtClean="0"/>
               <a:pPr/>
-              <a:t>20.06.2015</a:t>
+              <a:t>21.06.2015</a:t>
             </a:fld>
             <a:endParaRPr lang="de-DE"/>
           </a:p>
@@ -1207,7 +1389,7 @@
             <a:fld id="{BA20089B-28E9-4E3D-8F82-6328AE8CACA6}" type="datetime1">
               <a:rPr lang="de-DE" smtClean="0"/>
               <a:pPr/>
-              <a:t>20.06.2015</a:t>
+              <a:t>21.06.2015</a:t>
             </a:fld>
             <a:endParaRPr lang="de-DE"/>
           </a:p>
@@ -1402,7 +1584,7 @@
           <a:p>
             <a:fld id="{9369858E-D1D1-4BAC-A564-46FF792CFAC7}" type="datetime1">
               <a:rPr lang="de-DE" smtClean="0"/>
-              <a:t>20.06.2015</a:t>
+              <a:t>21.06.2015</a:t>
             </a:fld>
             <a:endParaRPr lang="de-DE" dirty="0"/>
           </a:p>
@@ -1669,7 +1851,7 @@
             <a:fld id="{48E855D6-EEBE-45BF-8BB5-776601FA5085}" type="datetime1">
               <a:rPr lang="de-DE" smtClean="0"/>
               <a:pPr/>
-              <a:t>20.06.2015</a:t>
+              <a:t>21.06.2015</a:t>
             </a:fld>
             <a:endParaRPr lang="de-DE"/>
           </a:p>
@@ -1966,7 +2148,7 @@
             <a:fld id="{EF380378-A65B-4494-A5A7-886B50CB4937}" type="datetime1">
               <a:rPr lang="de-DE" smtClean="0"/>
               <a:pPr/>
-              <a:t>20.06.2015</a:t>
+              <a:t>21.06.2015</a:t>
             </a:fld>
             <a:endParaRPr lang="de-DE"/>
           </a:p>
@@ -2397,7 +2579,7 @@
             <a:fld id="{BF9B2ACF-C63C-45AF-B5D6-56753CCBEEC7}" type="datetime1">
               <a:rPr lang="de-DE" smtClean="0"/>
               <a:pPr/>
-              <a:t>20.06.2015</a:t>
+              <a:t>21.06.2015</a:t>
             </a:fld>
             <a:endParaRPr lang="de-DE"/>
           </a:p>
@@ -2524,7 +2706,7 @@
             <a:fld id="{782C60A8-75F3-45EE-8F68-824804B9A36B}" type="datetime1">
               <a:rPr lang="de-DE" smtClean="0"/>
               <a:pPr/>
-              <a:t>20.06.2015</a:t>
+              <a:t>21.06.2015</a:t>
             </a:fld>
             <a:endParaRPr lang="de-DE"/>
           </a:p>
@@ -2628,7 +2810,7 @@
             <a:fld id="{AC76AE4E-B847-44C0-9E80-FADAC514238D}" type="datetime1">
               <a:rPr lang="de-DE" smtClean="0"/>
               <a:pPr/>
-              <a:t>20.06.2015</a:t>
+              <a:t>21.06.2015</a:t>
             </a:fld>
             <a:endParaRPr lang="de-DE"/>
           </a:p>
@@ -2914,7 +3096,7 @@
             <a:fld id="{93EB1BC4-DA1F-4C44-8E36-1B9FD72AD58E}" type="datetime1">
               <a:rPr lang="de-DE" smtClean="0"/>
               <a:pPr/>
-              <a:t>20.06.2015</a:t>
+              <a:t>21.06.2015</a:t>
             </a:fld>
             <a:endParaRPr lang="de-DE"/>
           </a:p>
@@ -3176,7 +3358,7 @@
             <a:fld id="{E23DD280-69E3-4A3C-8762-77BE68C0FDBF}" type="datetime1">
               <a:rPr lang="de-DE" smtClean="0"/>
               <a:pPr/>
-              <a:t>20.06.2015</a:t>
+              <a:t>21.06.2015</a:t>
             </a:fld>
             <a:endParaRPr lang="de-DE"/>
           </a:p>
@@ -3398,7 +3580,7 @@
             <a:fld id="{A1830189-BAB1-4688-8766-4D2AC2DF7C33}" type="datetime1">
               <a:rPr lang="de-DE" smtClean="0"/>
               <a:pPr/>
-              <a:t>20.06.2015</a:t>
+              <a:t>21.06.2015</a:t>
             </a:fld>
             <a:endParaRPr lang="de-DE" dirty="0"/>
           </a:p>
@@ -4265,7 +4447,7 @@
           <a:p>
             <a:fld id="{825920CB-9CFE-4FB0-A074-BEBA46422A5B}" type="datetime1">
               <a:rPr lang="de-DE" smtClean="0"/>
-              <a:t>20.06.2015</a:t>
+              <a:t>21.06.2015</a:t>
             </a:fld>
             <a:endParaRPr lang="de-DE"/>
           </a:p>
@@ -4714,7 +4896,7 @@
           <a:p>
             <a:fld id="{711E0BBA-85CE-4567-A3EB-570B826ED505}" type="datetime1">
               <a:rPr lang="de-DE" smtClean="0"/>
-              <a:t>20.06.2015</a:t>
+              <a:t>21.06.2015</a:t>
             </a:fld>
             <a:endParaRPr lang="de-DE"/>
           </a:p>
@@ -5333,7 +5515,7 @@
           <a:p>
             <a:fld id="{1BA9CB46-1999-48FE-934D-6C67DE059830}" type="datetime1">
               <a:rPr lang="de-DE" smtClean="0"/>
-              <a:t>20.06.2015</a:t>
+              <a:t>21.06.2015</a:t>
             </a:fld>
             <a:endParaRPr lang="de-DE"/>
           </a:p>
@@ -5852,7 +6034,7 @@
           <a:p>
             <a:fld id="{72653B21-52A1-4C85-A953-1B3DFEDFDB08}" type="datetime1">
               <a:rPr lang="de-DE" smtClean="0"/>
-              <a:t>20.06.2015</a:t>
+              <a:t>21.06.2015</a:t>
             </a:fld>
             <a:endParaRPr lang="de-DE"/>
           </a:p>
@@ -6006,7 +6188,7 @@
           <a:p>
             <a:fld id="{860830F5-49E7-4889-AA1F-2CB69E8126AF}" type="datetime1">
               <a:rPr lang="de-DE" smtClean="0"/>
-              <a:t>20.06.2015</a:t>
+              <a:t>21.06.2015</a:t>
             </a:fld>
             <a:endParaRPr lang="de-DE"/>
           </a:p>
@@ -6488,7 +6670,7 @@
           <a:p>
             <a:fld id="{5A27912C-CDDD-45BB-A172-315B1F38A094}" type="datetime1">
               <a:rPr lang="de-DE" smtClean="0"/>
-              <a:t>20.06.2015</a:t>
+              <a:t>21.06.2015</a:t>
             </a:fld>
             <a:endParaRPr lang="de-DE"/>
           </a:p>
@@ -6854,49 +7036,6 @@
                                   </p:childTnLst>
                                 </p:cTn>
                               </p:par>
-                              <p:par>
-                                <p:cTn id="16" presetID="10" presetClass="entr" presetSubtype="0" fill="hold" nodeType="withEffect">
-                                  <p:stCondLst>
-                                    <p:cond delay="0"/>
-                                  </p:stCondLst>
-                                  <p:childTnLst>
-                                    <p:set>
-                                      <p:cBhvr>
-                                        <p:cTn id="17" dur="1" fill="hold">
-                                          <p:stCondLst>
-                                            <p:cond delay="0"/>
-                                          </p:stCondLst>
-                                        </p:cTn>
-                                        <p:tgtEl>
-                                          <p:spTgt spid="7">
-                                            <p:txEl>
-                                              <p:pRg st="3" end="3"/>
-                                            </p:txEl>
-                                          </p:spTgt>
-                                        </p:tgtEl>
-                                        <p:attrNameLst>
-                                          <p:attrName>style.visibility</p:attrName>
-                                        </p:attrNameLst>
-                                      </p:cBhvr>
-                                      <p:to>
-                                        <p:strVal val="visible"/>
-                                      </p:to>
-                                    </p:set>
-                                    <p:animEffect transition="in" filter="fade">
-                                      <p:cBhvr>
-                                        <p:cTn id="18" dur="500"/>
-                                        <p:tgtEl>
-                                          <p:spTgt spid="7">
-                                            <p:txEl>
-                                              <p:pRg st="3" end="3"/>
-                                            </p:txEl>
-                                          </p:spTgt>
-                                        </p:tgtEl>
-                                      </p:cBhvr>
-                                    </p:animEffect>
-                                  </p:childTnLst>
-                                </p:cTn>
-                              </p:par>
                             </p:childTnLst>
                           </p:cTn>
                         </p:par>
@@ -6904,19 +7043,62 @@
                     </p:cTn>
                   </p:par>
                   <p:par>
-                    <p:cTn id="19" fill="hold">
+                    <p:cTn id="16" fill="hold">
                       <p:stCondLst>
                         <p:cond delay="indefinite"/>
                       </p:stCondLst>
                       <p:childTnLst>
                         <p:par>
-                          <p:cTn id="20" fill="hold">
+                          <p:cTn id="17" fill="hold">
                             <p:stCondLst>
                               <p:cond delay="0"/>
                             </p:stCondLst>
                             <p:childTnLst>
                               <p:par>
-                                <p:cTn id="21" presetID="10" presetClass="entr" presetSubtype="0" fill="hold" nodeType="clickEffect">
+                                <p:cTn id="18" presetID="10" presetClass="entr" presetSubtype="0" fill="hold" nodeType="clickEffect">
+                                  <p:stCondLst>
+                                    <p:cond delay="0"/>
+                                  </p:stCondLst>
+                                  <p:childTnLst>
+                                    <p:set>
+                                      <p:cBhvr>
+                                        <p:cTn id="19" dur="1" fill="hold">
+                                          <p:stCondLst>
+                                            <p:cond delay="0"/>
+                                          </p:stCondLst>
+                                        </p:cTn>
+                                        <p:tgtEl>
+                                          <p:spTgt spid="7">
+                                            <p:txEl>
+                                              <p:pRg st="3" end="3"/>
+                                            </p:txEl>
+                                          </p:spTgt>
+                                        </p:tgtEl>
+                                        <p:attrNameLst>
+                                          <p:attrName>style.visibility</p:attrName>
+                                        </p:attrNameLst>
+                                      </p:cBhvr>
+                                      <p:to>
+                                        <p:strVal val="visible"/>
+                                      </p:to>
+                                    </p:set>
+                                    <p:animEffect transition="in" filter="fade">
+                                      <p:cBhvr>
+                                        <p:cTn id="20" dur="500"/>
+                                        <p:tgtEl>
+                                          <p:spTgt spid="7">
+                                            <p:txEl>
+                                              <p:pRg st="3" end="3"/>
+                                            </p:txEl>
+                                          </p:spTgt>
+                                        </p:tgtEl>
+                                      </p:cBhvr>
+                                    </p:animEffect>
+                                  </p:childTnLst>
+                                </p:cTn>
+                              </p:par>
+                              <p:par>
+                                <p:cTn id="21" presetID="10" presetClass="entr" presetSubtype="0" fill="hold" nodeType="withEffect">
                                   <p:stCondLst>
                                     <p:cond delay="0"/>
                                   </p:stCondLst>
@@ -7071,7 +7253,7 @@
           <a:p>
             <a:fld id="{00B76B82-E15A-4F92-B838-853BA8CDA07B}" type="datetime1">
               <a:rPr lang="de-DE" smtClean="0"/>
-              <a:t>20.06.2015</a:t>
+              <a:t>21.06.2015</a:t>
             </a:fld>
             <a:endParaRPr lang="de-DE"/>
           </a:p>
@@ -7789,7 +7971,7 @@
           <a:p>
             <a:fld id="{CBD29002-DD08-4B8B-8D0E-E18685283E8F}" type="datetime1">
               <a:rPr lang="de-DE" smtClean="0"/>
-              <a:t>20.06.2015</a:t>
+              <a:t>21.06.2015</a:t>
             </a:fld>
             <a:endParaRPr lang="de-DE"/>
           </a:p>
@@ -7996,7 +8178,7 @@
           <a:p>
             <a:fld id="{D7189504-FB42-40CE-B2BB-CA1D3CB1B385}" type="datetime1">
               <a:rPr lang="de-DE" smtClean="0"/>
-              <a:t>20.06.2015</a:t>
+              <a:t>21.06.2015</a:t>
             </a:fld>
             <a:endParaRPr lang="de-DE"/>
           </a:p>
@@ -8472,7 +8654,7 @@
           <a:p>
             <a:fld id="{8C72BFCD-6DDC-4F0C-B207-AE3CB62F0D09}" type="datetime1">
               <a:rPr lang="de-DE" smtClean="0"/>
-              <a:t>20.06.2015</a:t>
+              <a:t>21.06.2015</a:t>
             </a:fld>
             <a:endParaRPr lang="de-DE"/>
           </a:p>
@@ -9206,7 +9388,7 @@
           <a:p>
             <a:fld id="{9369858E-D1D1-4BAC-A564-46FF792CFAC7}" type="datetime1">
               <a:rPr lang="de-DE" smtClean="0"/>
-              <a:t>20.06.2015</a:t>
+              <a:t>21.06.2015</a:t>
             </a:fld>
             <a:endParaRPr lang="de-DE" dirty="0"/>
           </a:p>
@@ -9751,7 +9933,7 @@
           <a:p>
             <a:fld id="{9369858E-D1D1-4BAC-A564-46FF792CFAC7}" type="datetime1">
               <a:rPr lang="de-DE" smtClean="0"/>
-              <a:t>20.06.2015</a:t>
+              <a:t>21.06.2015</a:t>
             </a:fld>
             <a:endParaRPr lang="de-DE" dirty="0"/>
           </a:p>
@@ -9846,7 +10028,7 @@
           <p:nvPr/>
         </p:nvPicPr>
         <p:blipFill rotWithShape="1">
-          <a:blip r:embed="rId2">
+          <a:blip r:embed="rId3">
             <a:extLst>
               <a:ext uri="{28A0092B-C50C-407E-A947-70E740481C1C}">
                 <a14:useLocalDpi xmlns:a14="http://schemas.microsoft.com/office/drawing/2010/main" val="0"/>
@@ -9875,7 +10057,7 @@
           <p:nvPr/>
         </p:nvPicPr>
         <p:blipFill rotWithShape="1">
-          <a:blip r:embed="rId3">
+          <a:blip r:embed="rId4">
             <a:extLst>
               <a:ext uri="{28A0092B-C50C-407E-A947-70E740481C1C}">
                 <a14:useLocalDpi xmlns:a14="http://schemas.microsoft.com/office/drawing/2010/main" val="0"/>
@@ -10022,7 +10204,7 @@
           <a:p>
             <a:fld id="{CF17882A-01A4-40E1-8E7C-E4DC1CDE6C7E}" type="datetime1">
               <a:rPr lang="de-DE" smtClean="0"/>
-              <a:t>20.06.2015</a:t>
+              <a:t>21.06.2015</a:t>
             </a:fld>
             <a:endParaRPr lang="de-DE"/>
           </a:p>
@@ -10143,7 +10325,7 @@
               <a:rPr lang="de-DE" sz="2000" dirty="0" smtClean="0">
                 <a:latin typeface="Lato" pitchFamily="34" charset="0"/>
               </a:rPr>
-              <a:t>Native Instruments FM8: Nachbildung des DX7</a:t>
+              <a:t>Native Instruments FM7: Nachbildung des DX7</a:t>
             </a:r>
           </a:p>
           <a:p>
@@ -10567,7 +10749,7 @@
           <a:p>
             <a:fld id="{6FD35CB8-BD90-447C-AB06-561BC3962411}" type="datetime1">
               <a:rPr lang="de-DE" smtClean="0"/>
-              <a:t>20.06.2015</a:t>
+              <a:t>21.06.2015</a:t>
             </a:fld>
             <a:endParaRPr lang="de-DE"/>
           </a:p>
@@ -11067,7 +11249,7 @@
           <a:p>
             <a:fld id="{6D7D0E66-EFAE-4305-BA7A-6348E48A8036}" type="datetime1">
               <a:rPr lang="de-DE" smtClean="0"/>
-              <a:t>20.06.2015</a:t>
+              <a:t>21.06.2015</a:t>
             </a:fld>
             <a:endParaRPr lang="de-DE"/>
           </a:p>
@@ -11139,7 +11321,7 @@
           <p:nvPr/>
         </p:nvPicPr>
         <p:blipFill rotWithShape="1">
-          <a:blip r:embed="rId5" cstate="print"/>
+          <a:blip r:embed="rId6" cstate="print"/>
           <a:srcRect l="5387" t="3572"/>
           <a:stretch/>
         </p:blipFill>
@@ -11261,12 +11443,12 @@
           <a:graphicData uri="http://schemas.openxmlformats.org/presentationml/2006/ole">
             <mc:AlternateContent xmlns:mc="http://schemas.openxmlformats.org/markup-compatibility/2006">
               <mc:Choice xmlns:v="urn:schemas-microsoft-com:vml" Requires="v">
-                <p:oleObj spid="_x0000_s31940" name="Formel" r:id="rId6" imgW="114120" imgH="215640" progId="Equation.3">
+                <p:oleObj spid="_x0000_s31947" name="Formel" r:id="rId7" imgW="114120" imgH="215640" progId="Equation.3">
                   <p:embed/>
                 </p:oleObj>
               </mc:Choice>
               <mc:Fallback>
-                <p:oleObj name="Formel" r:id="rId6" imgW="114120" imgH="215640" progId="Equation.3">
+                <p:oleObj name="Formel" r:id="rId7" imgW="114120" imgH="215640" progId="Equation.3">
                   <p:embed/>
                   <p:pic>
                     <p:nvPicPr>
@@ -11277,7 +11459,7 @@
                       <p:nvPr/>
                     </p:nvPicPr>
                     <p:blipFill>
-                      <a:blip r:embed="rId7">
+                      <a:blip r:embed="rId8">
                         <a:extLst>
                           <a:ext uri="{28A0092B-C50C-407E-A947-70E740481C1C}">
                             <a14:useLocalDpi xmlns:a14="http://schemas.microsoft.com/office/drawing/2010/main" val="0"/>
@@ -11328,7 +11510,7 @@
           </p:nvPr>
         </p:nvPicPr>
         <p:blipFill>
-          <a:blip r:embed="rId8" cstate="print">
+          <a:blip r:embed="rId9" cstate="print">
             <a:extLst>
               <a:ext uri="{28A0092B-C50C-407E-A947-70E740481C1C}">
                 <a14:useLocalDpi xmlns:a14="http://schemas.microsoft.com/office/drawing/2010/main" val="0"/>
@@ -11362,7 +11544,7 @@
           </p:nvPr>
         </p:nvPicPr>
         <p:blipFill>
-          <a:blip r:embed="rId9" cstate="print">
+          <a:blip r:embed="rId10" cstate="print">
             <a:extLst>
               <a:ext uri="{28A0092B-C50C-407E-A947-70E740481C1C}">
                 <a14:useLocalDpi xmlns:a14="http://schemas.microsoft.com/office/drawing/2010/main" val="0"/>
@@ -11392,7 +11574,7 @@
           <p:nvPr/>
         </p:nvPicPr>
         <p:blipFill>
-          <a:blip r:embed="rId10"/>
+          <a:blip r:embed="rId11"/>
           <a:stretch>
             <a:fillRect/>
           </a:stretch>
@@ -11684,9 +11866,9 @@
           <a:p>
             <a:fld id="{39A556A3-A96F-4A29-B9F8-6AE2A559B586}" type="datetime1">
               <a:rPr lang="de-DE" smtClean="0"/>
-              <a:t>20.06.2015</a:t>
+              <a:t>21.06.2015</a:t>
             </a:fld>
-            <a:endParaRPr lang="de-DE"/>
+            <a:endParaRPr lang="de-DE" dirty="0"/>
           </a:p>
         </p:txBody>
       </p:sp>
@@ -11795,7 +11977,7 @@
           <a:graphicData uri="http://schemas.openxmlformats.org/presentationml/2006/ole">
             <mc:AlternateContent xmlns:mc="http://schemas.openxmlformats.org/markup-compatibility/2006">
               <mc:Choice xmlns:v="urn:schemas-microsoft-com:vml" Requires="v">
-                <p:oleObj spid="_x0000_s33098" name="Formel" r:id="rId5" imgW="114120" imgH="215640" progId="Equation.3">
+                <p:oleObj spid="_x0000_s33112" name="Formel" r:id="rId5" imgW="114120" imgH="215640" progId="Equation.3">
                   <p:embed/>
                 </p:oleObj>
               </mc:Choice>
@@ -11865,7 +12047,7 @@
           <a:graphicData uri="http://schemas.openxmlformats.org/presentationml/2006/ole">
             <mc:AlternateContent xmlns:mc="http://schemas.openxmlformats.org/markup-compatibility/2006">
               <mc:Choice xmlns:v="urn:schemas-microsoft-com:vml" Requires="v">
-                <p:oleObj spid="_x0000_s33099" name="Formel" r:id="rId7" imgW="114120" imgH="215640" progId="Equation.3">
+                <p:oleObj spid="_x0000_s33113" name="Formel" r:id="rId7" imgW="114120" imgH="215640" progId="Equation.3">
                   <p:embed/>
                 </p:oleObj>
               </mc:Choice>
@@ -12809,9 +12991,9 @@
           <a:p>
             <a:fld id="{C4F4BF9B-9A36-46DE-8B65-E62FB4C30526}" type="datetime1">
               <a:rPr lang="de-DE" smtClean="0"/>
-              <a:t>20.06.2015</a:t>
+              <a:t>21.06.2015</a:t>
             </a:fld>
-            <a:endParaRPr lang="de-DE"/>
+            <a:endParaRPr lang="de-DE" dirty="0"/>
           </a:p>
         </p:txBody>
       </p:sp>
@@ -13465,9 +13647,9 @@
           <a:p>
             <a:fld id="{FF1488C6-348F-4901-AAB2-1EC6CED6BE40}" type="datetime1">
               <a:rPr lang="de-DE" smtClean="0"/>
-              <a:t>20.06.2015</a:t>
+              <a:t>21.06.2015</a:t>
             </a:fld>
-            <a:endParaRPr lang="de-DE"/>
+            <a:endParaRPr lang="de-DE" dirty="0"/>
           </a:p>
         </p:txBody>
       </p:sp>
@@ -13492,10 +13674,10 @@
           <a:lstStyle/>
           <a:p>
             <a:r>
-              <a:rPr lang="de-DE" smtClean="0"/>
+              <a:rPr lang="de-DE" dirty="0" smtClean="0"/>
               <a:t>FM-Synthese</a:t>
             </a:r>
-            <a:endParaRPr lang="de-DE"/>
+            <a:endParaRPr lang="de-DE" dirty="0"/>
           </a:p>
         </p:txBody>
       </p:sp>
@@ -14833,9 +15015,9 @@
           <a:p>
             <a:fld id="{4987A347-352C-4B4F-B3D9-7FF070EB9D55}" type="datetime1">
               <a:rPr lang="de-DE" smtClean="0"/>
-              <a:t>20.06.2015</a:t>
+              <a:t>21.06.2015</a:t>
             </a:fld>
-            <a:endParaRPr lang="de-DE"/>
+            <a:endParaRPr lang="de-DE" dirty="0"/>
           </a:p>
         </p:txBody>
       </p:sp>
@@ -14860,10 +15042,10 @@
           <a:lstStyle/>
           <a:p>
             <a:r>
-              <a:rPr lang="de-DE" smtClean="0"/>
+              <a:rPr lang="de-DE" dirty="0" smtClean="0"/>
               <a:t>FM-Synthese</a:t>
             </a:r>
-            <a:endParaRPr lang="de-DE"/>
+            <a:endParaRPr lang="de-DE" dirty="0"/>
           </a:p>
         </p:txBody>
       </p:sp>
@@ -15112,25 +15294,13 @@
               <a:rPr lang="de-DE" sz="2000" smtClean="0">
                 <a:latin typeface="Lato" pitchFamily="34" charset="0"/>
               </a:rPr>
-              <a:t> </a:t>
-            </a:r>
-            <a:r>
-              <a:rPr lang="de-DE" sz="2000" smtClean="0">
-                <a:latin typeface="Lato" pitchFamily="34" charset="0"/>
-              </a:rPr>
-              <a:t>Frequency</a:t>
+              <a:t> Frequency</a:t>
             </a:r>
             <a:r>
               <a:rPr lang="de-DE" sz="2000" dirty="0" smtClean="0">
                 <a:latin typeface="Lato" pitchFamily="34" charset="0"/>
               </a:rPr>
-              <a:t> </a:t>
-            </a:r>
-            <a:r>
-              <a:rPr lang="de-DE" sz="2000" dirty="0" smtClean="0">
-                <a:latin typeface="Lato" pitchFamily="34" charset="0"/>
-              </a:rPr>
-              <a:t>Modulation“ von 1973</a:t>
+              <a:t> Modulation“ von 1973</a:t>
             </a:r>
           </a:p>
           <a:p>
@@ -15648,7 +15818,7 @@
           <a:p>
             <a:fld id="{3639999C-1D72-4812-9BEC-6A84F856EB5A}" type="datetime1">
               <a:rPr lang="de-DE" smtClean="0"/>
-              <a:t>20.06.2015</a:t>
+              <a:t>21.06.2015</a:t>
             </a:fld>
             <a:endParaRPr lang="de-DE"/>
           </a:p>
@@ -16933,7 +17103,7 @@
           <a:p>
             <a:fld id="{7609E643-4D96-4DED-8C33-CC201D580F3D}" type="datetime1">
               <a:rPr lang="de-DE" smtClean="0"/>
-              <a:t>20.06.2015</a:t>
+              <a:t>21.06.2015</a:t>
             </a:fld>
             <a:endParaRPr lang="de-DE"/>
           </a:p>
@@ -17846,7 +18016,7 @@
           <a:p>
             <a:fld id="{4076B8EE-21E0-40B1-8970-CDA6027CB94F}" type="datetime1">
               <a:rPr lang="de-DE" smtClean="0"/>
-              <a:t>20.06.2015</a:t>
+              <a:t>21.06.2015</a:t>
             </a:fld>
             <a:endParaRPr lang="de-DE"/>
           </a:p>
@@ -18221,7 +18391,7 @@
           <a:p>
             <a:fld id="{9369858E-D1D1-4BAC-A564-46FF792CFAC7}" type="datetime1">
               <a:rPr lang="de-DE" smtClean="0"/>
-              <a:t>20.06.2015</a:t>
+              <a:t>21.06.2015</a:t>
             </a:fld>
             <a:endParaRPr lang="de-DE" dirty="0"/>
           </a:p>
@@ -18483,7 +18653,7 @@
           <a:p>
             <a:fld id="{9369858E-D1D1-4BAC-A564-46FF792CFAC7}" type="datetime1">
               <a:rPr lang="de-DE" smtClean="0"/>
-              <a:t>20.06.2015</a:t>
+              <a:t>21.06.2015</a:t>
             </a:fld>
             <a:endParaRPr lang="de-DE" dirty="0"/>
           </a:p>
@@ -18759,7 +18929,7 @@
           <a:p>
             <a:fld id="{9369858E-D1D1-4BAC-A564-46FF792CFAC7}" type="datetime1">
               <a:rPr lang="de-DE" smtClean="0"/>
-              <a:t>20.06.2015</a:t>
+              <a:t>21.06.2015</a:t>
             </a:fld>
             <a:endParaRPr lang="de-DE" dirty="0"/>
           </a:p>
@@ -18883,7 +19053,7 @@
           <a:p>
             <a:fld id="{73EBDB3D-1284-4703-8FAB-D9B5400C77DD}" type="datetime1">
               <a:rPr lang="de-DE" smtClean="0"/>
-              <a:t>20.06.2015</a:t>
+              <a:t>21.06.2015</a:t>
             </a:fld>
             <a:endParaRPr lang="de-DE"/>
           </a:p>
@@ -19438,7 +19608,7 @@
           <a:p>
             <a:fld id="{57104889-ED7B-46E1-A53D-000D0D04FFF0}" type="datetime1">
               <a:rPr lang="de-DE" smtClean="0"/>
-              <a:t>20.06.2015</a:t>
+              <a:t>21.06.2015</a:t>
             </a:fld>
             <a:endParaRPr lang="de-DE"/>
           </a:p>
@@ -20256,7 +20426,7 @@
           <a:p>
             <a:fld id="{7863A709-473A-488B-BD2D-9CF65648D40C}" type="datetime1">
               <a:rPr lang="de-DE" smtClean="0"/>
-              <a:t>20.06.2015</a:t>
+              <a:t>21.06.2015</a:t>
             </a:fld>
             <a:endParaRPr lang="de-DE"/>
           </a:p>
@@ -20439,7 +20609,7 @@
           <a:graphicData uri="http://schemas.openxmlformats.org/presentationml/2006/ole">
             <mc:AlternateContent xmlns:mc="http://schemas.openxmlformats.org/markup-compatibility/2006">
               <mc:Choice xmlns:v="urn:schemas-microsoft-com:vml" Requires="v">
-                <p:oleObj spid="_x0000_s2212" name="Formel" r:id="rId10" imgW="114120" imgH="215640" progId="Equation.3">
+                <p:oleObj spid="_x0000_s2219" name="Formel" r:id="rId10" imgW="114120" imgH="215640" progId="Equation.3">
                   <p:embed/>
                 </p:oleObj>
               </mc:Choice>
@@ -21095,7 +21265,7 @@
               </p:nextCondLst>
             </p:seq>
             <p:audio>
-              <p:cMediaNode vol="56061">
+              <p:cMediaNode vol="21212">
                 <p:cTn id="34" fill="hold" display="0">
                   <p:stCondLst>
                     <p:cond delay="indefinite"/>
@@ -21114,7 +21284,7 @@
               </p:cMediaNode>
             </p:audio>
             <p:audio>
-              <p:cMediaNode vol="63636">
+              <p:cMediaNode vol="19697">
                 <p:cTn id="35" fill="hold" display="0">
                   <p:stCondLst>
                     <p:cond delay="indefinite"/>
@@ -21133,7 +21303,7 @@
               </p:cMediaNode>
             </p:audio>
             <p:audio>
-              <p:cMediaNode vol="56061">
+              <p:cMediaNode vol="18182">
                 <p:cTn id="36" fill="hold" display="0">
                   <p:stCondLst>
                     <p:cond delay="indefinite"/>
@@ -21232,7 +21402,7 @@
           <a:p>
             <a:fld id="{CFA19918-AC84-41E1-B740-FB8B3337DCD7}" type="datetime1">
               <a:rPr lang="de-DE" smtClean="0"/>
-              <a:t>20.06.2015</a:t>
+              <a:t>21.06.2015</a:t>
             </a:fld>
             <a:endParaRPr lang="de-DE"/>
           </a:p>
@@ -22001,7 +22171,7 @@
               </p:nextCondLst>
             </p:seq>
             <p:audio>
-              <p:cMediaNode vol="62121">
+              <p:cMediaNode vol="45455">
                 <p:cTn id="32" fill="hold" display="0">
                   <p:stCondLst>
                     <p:cond delay="indefinite"/>
@@ -22078,7 +22248,7 @@
               </p:nextCondLst>
             </p:seq>
             <p:audio>
-              <p:cMediaNode vol="80303">
+              <p:cMediaNode vol="60606">
                 <p:cTn id="38" fill="hold" display="0">
                   <p:stCondLst>
                     <p:cond delay="indefinite"/>
@@ -22155,7 +22325,7 @@
               </p:nextCondLst>
             </p:seq>
             <p:audio>
-              <p:cMediaNode vol="60606">
+              <p:cMediaNode vol="42424">
                 <p:cTn id="44" fill="hold" display="0">
                   <p:stCondLst>
                     <p:cond delay="indefinite"/>
@@ -22249,7 +22419,7 @@
           <a:p>
             <a:fld id="{4E144442-ACC1-484B-8553-97F56778C777}" type="datetime1">
               <a:rPr lang="de-DE" smtClean="0"/>
-              <a:t>20.06.2015</a:t>
+              <a:t>21.06.2015</a:t>
             </a:fld>
             <a:endParaRPr lang="de-DE"/>
           </a:p>
@@ -23029,7 +23199,7 @@
               </p:nextCondLst>
             </p:seq>
             <p:audio>
-              <p:cMediaNode vol="57576">
+              <p:cMediaNode vol="37879">
                 <p:cTn id="32" fill="hold" display="0">
                   <p:stCondLst>
                     <p:cond delay="indefinite"/>
@@ -23106,7 +23276,7 @@
               </p:nextCondLst>
             </p:seq>
             <p:audio>
-              <p:cMediaNode vol="57576">
+              <p:cMediaNode vol="42424">
                 <p:cTn id="38" fill="hold" display="0">
                   <p:stCondLst>
                     <p:cond delay="indefinite"/>
@@ -23183,7 +23353,7 @@
               </p:nextCondLst>
             </p:seq>
             <p:audio>
-              <p:cMediaNode vol="66667">
+              <p:cMediaNode vol="46970">
                 <p:cTn id="44" fill="hold" display="0">
                   <p:stCondLst>
                     <p:cond delay="indefinite"/>

</xml_diff>

<commit_message>
Typos fixed und präsi-pdf
</commit_message>
<xml_diff>
--- a/Praesentation/FMSynthese-Julius.pptx
+++ b/Praesentation/FMSynthese-Julius.pptx
@@ -10040,7 +10040,7 @@
         </p:blipFill>
         <p:spPr>
           <a:xfrm>
-            <a:off x="217139" y="1341660"/>
+            <a:off x="253908" y="1341660"/>
             <a:ext cx="4750140" cy="2238202"/>
           </a:xfrm>
           <a:prstGeom prst="rect">
@@ -10069,7 +10069,7 @@
         </p:blipFill>
         <p:spPr>
           <a:xfrm>
-            <a:off x="5220071" y="1341660"/>
+            <a:off x="5292080" y="1341660"/>
             <a:ext cx="3564097" cy="2238202"/>
           </a:xfrm>
           <a:prstGeom prst="rect">
@@ -10309,7 +10309,19 @@
               <a:rPr lang="de-DE" sz="2000" dirty="0" smtClean="0">
                 <a:latin typeface="Lato" pitchFamily="34" charset="0"/>
               </a:rPr>
-              <a:t>Ab Mitte der 90er: Leistungsfähige personal Computer</a:t>
+              <a:t>Ab Mitte der 90er: Leistungsfähige </a:t>
+            </a:r>
+            <a:r>
+              <a:rPr lang="de-DE" sz="2000" dirty="0" smtClean="0">
+                <a:latin typeface="Lato" pitchFamily="34" charset="0"/>
+              </a:rPr>
+              <a:t>Personal </a:t>
+            </a:r>
+            <a:r>
+              <a:rPr lang="de-DE" sz="2000" dirty="0" smtClean="0">
+                <a:latin typeface="Lato" pitchFamily="34" charset="0"/>
+              </a:rPr>
+              <a:t>Computer</a:t>
             </a:r>
           </a:p>
           <a:p>
@@ -11443,7 +11455,7 @@
           <a:graphicData uri="http://schemas.openxmlformats.org/presentationml/2006/ole">
             <mc:AlternateContent xmlns:mc="http://schemas.openxmlformats.org/markup-compatibility/2006">
               <mc:Choice xmlns:v="urn:schemas-microsoft-com:vml" Requires="v">
-                <p:oleObj spid="_x0000_s31952" name="Formel" r:id="rId7" imgW="114120" imgH="215640" progId="Equation.3">
+                <p:oleObj spid="_x0000_s31957" name="Formel" r:id="rId7" imgW="114120" imgH="215640" progId="Equation.3">
                   <p:embed/>
                 </p:oleObj>
               </mc:Choice>
@@ -11977,7 +11989,7 @@
           <a:graphicData uri="http://schemas.openxmlformats.org/presentationml/2006/ole">
             <mc:AlternateContent xmlns:mc="http://schemas.openxmlformats.org/markup-compatibility/2006">
               <mc:Choice xmlns:v="urn:schemas-microsoft-com:vml" Requires="v">
-                <p:oleObj spid="_x0000_s33122" name="Formel" r:id="rId5" imgW="114120" imgH="215640" progId="Equation.3">
+                <p:oleObj spid="_x0000_s33132" name="Formel" r:id="rId5" imgW="114120" imgH="215640" progId="Equation.3">
                   <p:embed/>
                 </p:oleObj>
               </mc:Choice>
@@ -12047,7 +12059,7 @@
           <a:graphicData uri="http://schemas.openxmlformats.org/presentationml/2006/ole">
             <mc:AlternateContent xmlns:mc="http://schemas.openxmlformats.org/markup-compatibility/2006">
               <mc:Choice xmlns:v="urn:schemas-microsoft-com:vml" Requires="v">
-                <p:oleObj spid="_x0000_s33123" name="Formel" r:id="rId7" imgW="114120" imgH="215640" progId="Equation.3">
+                <p:oleObj spid="_x0000_s33133" name="Formel" r:id="rId7" imgW="114120" imgH="215640" progId="Equation.3">
                   <p:embed/>
                 </p:oleObj>
               </mc:Choice>
@@ -18109,9 +18121,6 @@
               </a:rPr>
               <a:t>Fazit</a:t>
             </a:r>
-            <a:endParaRPr lang="de-DE" sz="2800" dirty="0" smtClean="0">
-              <a:latin typeface="Lato" pitchFamily="34" charset="0"/>
-            </a:endParaRPr>
           </a:p>
         </p:txBody>
       </p:sp>
@@ -19890,7 +19899,7 @@
         </p:blipFill>
         <p:spPr>
           <a:xfrm>
-            <a:off x="5431483" y="2481432"/>
+            <a:off x="5431483" y="2514090"/>
             <a:ext cx="269823" cy="227642"/>
           </a:xfrm>
           <a:prstGeom prst="rect">
@@ -20612,7 +20621,7 @@
           <a:graphicData uri="http://schemas.openxmlformats.org/presentationml/2006/ole">
             <mc:AlternateContent xmlns:mc="http://schemas.openxmlformats.org/markup-compatibility/2006">
               <mc:Choice xmlns:v="urn:schemas-microsoft-com:vml" Requires="v">
-                <p:oleObj spid="_x0000_s2224" name="Formel" r:id="rId10" imgW="114120" imgH="215640" progId="Equation.3">
+                <p:oleObj spid="_x0000_s2229" name="Formel" r:id="rId10" imgW="114120" imgH="215640" progId="Equation.3">
                   <p:embed/>
                 </p:oleObj>
               </mc:Choice>

</xml_diff>

<commit_message>
added some fancy animation
</commit_message>
<xml_diff>
--- a/Praesentation/FMSynthese-Julius.pptx
+++ b/Praesentation/FMSynthese-Julius.pptx
@@ -4785,22 +4785,12 @@
         <p:cTn id="1" dur="indefinite" restart="never" nodeType="tmRoot">
           <p:childTnLst>
             <p:seq concurrent="1" nextAc="seek">
-              <p:cTn id="2" restart="whenNotActive" fill="hold" evtFilter="cancelBubble" nodeType="interactiveSeq">
-                <p:stCondLst>
-                  <p:cond evt="onClick" delay="0">
-                    <p:tgtEl>
-                      <p:spTgt spid="7"/>
-                    </p:tgtEl>
-                  </p:cond>
-                </p:stCondLst>
-                <p:endSync evt="end" delay="0">
-                  <p:rtn val="all"/>
-                </p:endSync>
+              <p:cTn id="2" dur="indefinite" nodeType="mainSeq">
                 <p:childTnLst>
                   <p:par>
                     <p:cTn id="3" fill="hold">
                       <p:stCondLst>
-                        <p:cond delay="0"/>
+                        <p:cond delay="indefinite"/>
                       </p:stCondLst>
                       <p:childTnLst>
                         <p:par>
@@ -4818,6 +4808,106 @@
                                     <p:cmd type="call" cmd="playFrom(0.0)">
                                       <p:cBhvr>
                                         <p:cTn id="6" dur="13557" fill="hold"/>
+                                        <p:tgtEl>
+                                          <p:spTgt spid="7"/>
+                                        </p:tgtEl>
+                                      </p:cBhvr>
+                                    </p:cmd>
+                                  </p:childTnLst>
+                                </p:cTn>
+                              </p:par>
+                            </p:childTnLst>
+                          </p:cTn>
+                        </p:par>
+                      </p:childTnLst>
+                    </p:cTn>
+                  </p:par>
+                  <p:par>
+                    <p:cTn id="7" fill="hold">
+                      <p:stCondLst>
+                        <p:cond delay="indefinite"/>
+                      </p:stCondLst>
+                      <p:childTnLst>
+                        <p:par>
+                          <p:cTn id="8" fill="hold">
+                            <p:stCondLst>
+                              <p:cond delay="0"/>
+                            </p:stCondLst>
+                            <p:childTnLst>
+                              <p:par>
+                                <p:cTn id="9" presetID="1" presetClass="mediacall" presetSubtype="0" fill="hold" nodeType="clickEffect">
+                                  <p:stCondLst>
+                                    <p:cond delay="0"/>
+                                  </p:stCondLst>
+                                  <p:childTnLst>
+                                    <p:cmd type="call" cmd="playFrom(0.0)">
+                                      <p:cBhvr>
+                                        <p:cTn id="10" dur="21786" fill="hold"/>
+                                        <p:tgtEl>
+                                          <p:spTgt spid="8"/>
+                                        </p:tgtEl>
+                                      </p:cBhvr>
+                                    </p:cmd>
+                                  </p:childTnLst>
+                                </p:cTn>
+                              </p:par>
+                            </p:childTnLst>
+                          </p:cTn>
+                        </p:par>
+                      </p:childTnLst>
+                    </p:cTn>
+                  </p:par>
+                </p:childTnLst>
+              </p:cTn>
+              <p:prevCondLst>
+                <p:cond evt="onPrev" delay="0">
+                  <p:tgtEl>
+                    <p:sldTgt/>
+                  </p:tgtEl>
+                </p:cond>
+              </p:prevCondLst>
+              <p:nextCondLst>
+                <p:cond evt="onNext" delay="0">
+                  <p:tgtEl>
+                    <p:sldTgt/>
+                  </p:tgtEl>
+                </p:cond>
+              </p:nextCondLst>
+            </p:seq>
+            <p:seq concurrent="1" nextAc="seek">
+              <p:cTn id="11" restart="whenNotActive" fill="hold" evtFilter="cancelBubble" nodeType="interactiveSeq">
+                <p:stCondLst>
+                  <p:cond evt="onClick" delay="0">
+                    <p:tgtEl>
+                      <p:spTgt spid="7"/>
+                    </p:tgtEl>
+                  </p:cond>
+                </p:stCondLst>
+                <p:endSync evt="end" delay="0">
+                  <p:rtn val="all"/>
+                </p:endSync>
+                <p:childTnLst>
+                  <p:par>
+                    <p:cTn id="12" fill="hold">
+                      <p:stCondLst>
+                        <p:cond delay="0"/>
+                      </p:stCondLst>
+                      <p:childTnLst>
+                        <p:par>
+                          <p:cTn id="13" fill="hold">
+                            <p:stCondLst>
+                              <p:cond delay="0"/>
+                            </p:stCondLst>
+                            <p:childTnLst>
+                              <p:par>
+                                <p:cTn id="14" presetID="1" presetClass="mediacall" presetSubtype="0" fill="hold" nodeType="clickEffect">
+                                  <p:stCondLst>
+                                    <p:cond delay="0"/>
+                                  </p:stCondLst>
+                                  <p:childTnLst>
+                                    <p:cmd type="call" cmd="playFrom(0.0)">
+                                      <p:cBhvr>
+                                        <p:cTn id="15" dur="13557" fill="hold"/>
                                         <p:tgtEl>
                                           <p:spTgt spid="7"/>
                                         </p:tgtEl>
@@ -4844,7 +4934,7 @@
             </p:seq>
             <p:audio>
               <p:cMediaNode vol="100000">
-                <p:cTn id="7" fill="hold" display="0">
+                <p:cTn id="16" fill="hold" display="0">
                   <p:stCondLst>
                     <p:cond delay="indefinite"/>
                   </p:stCondLst>
@@ -4862,7 +4952,7 @@
               </p:cMediaNode>
             </p:audio>
             <p:seq concurrent="1" nextAc="seek">
-              <p:cTn id="8" restart="whenNotActive" fill="hold" evtFilter="cancelBubble" nodeType="interactiveSeq">
+              <p:cTn id="17" restart="whenNotActive" fill="hold" evtFilter="cancelBubble" nodeType="interactiveSeq">
                 <p:stCondLst>
                   <p:cond evt="onClick" delay="0">
                     <p:tgtEl>
@@ -4875,26 +4965,26 @@
                 </p:endSync>
                 <p:childTnLst>
                   <p:par>
-                    <p:cTn id="9" fill="hold">
+                    <p:cTn id="18" fill="hold">
                       <p:stCondLst>
                         <p:cond delay="0"/>
                       </p:stCondLst>
                       <p:childTnLst>
                         <p:par>
-                          <p:cTn id="10" fill="hold">
+                          <p:cTn id="19" fill="hold">
                             <p:stCondLst>
                               <p:cond delay="0"/>
                             </p:stCondLst>
                             <p:childTnLst>
                               <p:par>
-                                <p:cTn id="11" presetID="1" presetClass="mediacall" presetSubtype="0" fill="hold" nodeType="clickEffect">
+                                <p:cTn id="20" presetID="1" presetClass="mediacall" presetSubtype="0" fill="hold" nodeType="clickEffect">
                                   <p:stCondLst>
                                     <p:cond delay="0"/>
                                   </p:stCondLst>
                                   <p:childTnLst>
                                     <p:cmd type="call" cmd="playFrom(0.0)">
                                       <p:cBhvr>
-                                        <p:cTn id="12" dur="21786" fill="hold"/>
+                                        <p:cTn id="21" dur="21786" fill="hold"/>
                                         <p:tgtEl>
                                           <p:spTgt spid="8"/>
                                         </p:tgtEl>
@@ -4921,7 +5011,7 @@
             </p:seq>
             <p:audio>
               <p:cMediaNode vol="100000">
-                <p:cTn id="13" fill="hold" display="0">
+                <p:cTn id="22" fill="hold" display="0">
                   <p:stCondLst>
                     <p:cond delay="indefinite"/>
                   </p:stCondLst>
@@ -10529,17 +10619,8 @@
               <a:rPr lang="de-DE" sz="2000" dirty="0" smtClean="0">
                 <a:latin typeface="Lato" pitchFamily="34" charset="0"/>
               </a:rPr>
-              <a:t>Softwaresynthesizer mit </a:t>
-            </a:r>
-            <a:r>
-              <a:rPr lang="de-DE" sz="2000" dirty="0" smtClean="0">
-                <a:latin typeface="Lato" pitchFamily="34" charset="0"/>
-              </a:rPr>
-              <a:t>MIDI-Keyboards</a:t>
-            </a:r>
-            <a:endParaRPr lang="de-DE" sz="2000" dirty="0" smtClean="0">
-              <a:latin typeface="Lato" pitchFamily="34" charset="0"/>
-            </a:endParaRPr>
+              <a:t>Softwaresynthesizer mit MIDI-Keyboards</a:t>
+            </a:r>
           </a:p>
           <a:p>
             <a:r>
@@ -11664,7 +11745,7 @@
           <a:graphicData uri="http://schemas.openxmlformats.org/presentationml/2006/ole">
             <mc:AlternateContent xmlns:mc="http://schemas.openxmlformats.org/markup-compatibility/2006">
               <mc:Choice xmlns:v="urn:schemas-microsoft-com:vml" Requires="v">
-                <p:oleObj spid="_x0000_s31973" name="Formel" r:id="rId7" imgW="114120" imgH="215640" progId="Equation.3">
+                <p:oleObj spid="_x0000_s31975" name="Formel" r:id="rId7" imgW="114120" imgH="215640" progId="Equation.3">
                   <p:embed/>
                 </p:oleObj>
               </mc:Choice>
@@ -12198,7 +12279,7 @@
           <a:graphicData uri="http://schemas.openxmlformats.org/presentationml/2006/ole">
             <mc:AlternateContent xmlns:mc="http://schemas.openxmlformats.org/markup-compatibility/2006">
               <mc:Choice xmlns:v="urn:schemas-microsoft-com:vml" Requires="v">
-                <p:oleObj spid="_x0000_s33164" name="Formel" r:id="rId5" imgW="114120" imgH="215640" progId="Equation.3">
+                <p:oleObj spid="_x0000_s33168" name="Formel" r:id="rId5" imgW="114120" imgH="215640" progId="Equation.3">
                   <p:embed/>
                 </p:oleObj>
               </mc:Choice>
@@ -12268,7 +12349,7 @@
           <a:graphicData uri="http://schemas.openxmlformats.org/presentationml/2006/ole">
             <mc:AlternateContent xmlns:mc="http://schemas.openxmlformats.org/markup-compatibility/2006">
               <mc:Choice xmlns:v="urn:schemas-microsoft-com:vml" Requires="v">
-                <p:oleObj spid="_x0000_s33165" name="Formel" r:id="rId7" imgW="114120" imgH="215640" progId="Equation.3">
+                <p:oleObj spid="_x0000_s33169" name="Formel" r:id="rId7" imgW="114120" imgH="215640" progId="Equation.3">
                   <p:embed/>
                 </p:oleObj>
               </mc:Choice>
@@ -13381,236 +13462,221 @@
           </a:p>
         </p:txBody>
       </p:sp>
-      <p:grpSp>
-        <p:nvGrpSpPr>
-          <p:cNvPr id="9" name="Gruppieren 8"/>
-          <p:cNvGrpSpPr/>
+      <p:sp>
+        <p:nvSpPr>
+          <p:cNvPr id="7" name="Inhaltsplatzhalter 2"/>
+          <p:cNvSpPr txBox="1">
+            <a:spLocks/>
+          </p:cNvSpPr>
           <p:nvPr/>
-        </p:nvGrpSpPr>
-        <p:grpSpPr>
+        </p:nvSpPr>
+        <p:spPr>
           <a:xfrm>
             <a:off x="467544" y="1312379"/>
             <a:ext cx="8229600" cy="3595463"/>
-            <a:chOff x="518864" y="1352550"/>
-            <a:chExt cx="8229600" cy="3595463"/>
           </a:xfrm>
-        </p:grpSpPr>
-        <p:sp>
-          <p:nvSpPr>
-            <p:cNvPr id="7" name="Inhaltsplatzhalter 2"/>
-            <p:cNvSpPr txBox="1">
-              <a:spLocks/>
-            </p:cNvSpPr>
-            <p:nvPr/>
-          </p:nvSpPr>
-          <p:spPr>
-            <a:xfrm>
-              <a:off x="518864" y="1352550"/>
-              <a:ext cx="8229600" cy="3595463"/>
-            </a:xfrm>
-            <a:prstGeom prst="rect">
-              <a:avLst/>
-            </a:prstGeom>
-          </p:spPr>
-          <p:txBody>
-            <a:bodyPr vert="horz" lIns="91440" tIns="45720" rIns="91440" bIns="45720" rtlCol="0">
-              <a:normAutofit/>
-            </a:bodyPr>
-            <a:lstStyle/>
-            <a:p>
-              <a:pPr marL="342900" marR="0" lvl="0" indent="-342900" algn="l" defTabSz="914400" rtl="0" eaLnBrk="1" fontAlgn="auto" latinLnBrk="0" hangingPunct="1">
-                <a:lnSpc>
-                  <a:spcPct val="100000"/>
-                </a:lnSpc>
-                <a:spcBef>
-                  <a:spcPct val="20000"/>
-                </a:spcBef>
-                <a:spcAft>
-                  <a:spcPts val="0"/>
-                </a:spcAft>
-                <a:buClrTx/>
-                <a:buSzTx/>
-                <a:buFont typeface="Arial" pitchFamily="34" charset="0"/>
-                <a:buChar char="•"/>
-                <a:tabLst/>
-                <a:defRPr/>
-              </a:pPr>
-              <a:r>
-                <a:rPr lang="de-DE" sz="2000" dirty="0" smtClean="0">
-                  <a:latin typeface="Lato" pitchFamily="34" charset="0"/>
-                </a:rPr>
-                <a:t>Festlegung der Ablaufgeschwindigkeit durch Faktor </a:t>
-              </a:r>
-            </a:p>
-            <a:p>
-              <a:pPr marL="342900" marR="0" lvl="0" indent="-342900" algn="l" defTabSz="914400" rtl="0" eaLnBrk="1" fontAlgn="auto" latinLnBrk="0" hangingPunct="1">
-                <a:lnSpc>
-                  <a:spcPct val="100000"/>
-                </a:lnSpc>
-                <a:spcBef>
-                  <a:spcPct val="20000"/>
-                </a:spcBef>
-                <a:spcAft>
-                  <a:spcPts val="0"/>
-                </a:spcAft>
-                <a:buClrTx/>
-                <a:buSzTx/>
-                <a:buFont typeface="Arial" pitchFamily="34" charset="0"/>
-                <a:buChar char="•"/>
-                <a:tabLst/>
-                <a:defRPr/>
-              </a:pPr>
-              <a:r>
-                <a:rPr lang="de-DE" sz="2000" dirty="0">
-                  <a:latin typeface="Lato" pitchFamily="34" charset="0"/>
-                </a:rPr>
-                <a:t> </a:t>
-              </a:r>
-              <a:r>
-                <a:rPr lang="de-DE" sz="2000" dirty="0" smtClean="0">
-                  <a:latin typeface="Lato" pitchFamily="34" charset="0"/>
-                </a:rPr>
-                <a:t>   = Frequenz</a:t>
-              </a:r>
-            </a:p>
-            <a:p>
-              <a:pPr marL="342900" lvl="0" indent="-342900">
-                <a:spcBef>
-                  <a:spcPct val="20000"/>
-                </a:spcBef>
-                <a:buFont typeface="Arial" pitchFamily="34" charset="0"/>
-                <a:buChar char="•"/>
-              </a:pPr>
-              <a:r>
-                <a:rPr lang="de-DE" sz="2000" dirty="0" smtClean="0">
-                  <a:latin typeface="Lato" pitchFamily="34" charset="0"/>
-                </a:rPr>
-                <a:t>Kreisfrequenz:</a:t>
-              </a:r>
-            </a:p>
-            <a:p>
-              <a:pPr marL="342900" lvl="0" indent="-342900">
-                <a:spcBef>
-                  <a:spcPct val="20000"/>
-                </a:spcBef>
-                <a:buFont typeface="Arial" pitchFamily="34" charset="0"/>
-                <a:buChar char="•"/>
-              </a:pPr>
-              <a:endParaRPr kumimoji="0" lang="de-DE" sz="2000" i="0" u="none" strike="noStrike" kern="1200" cap="none" spc="0" normalizeH="0" baseline="0" noProof="0" dirty="0" smtClean="0">
-                <a:ln>
-                  <a:noFill/>
-                </a:ln>
-                <a:solidFill>
-                  <a:schemeClr val="tx1"/>
-                </a:solidFill>
-                <a:effectLst/>
-                <a:uLnTx/>
-                <a:uFillTx/>
+          <a:prstGeom prst="rect">
+            <a:avLst/>
+          </a:prstGeom>
+        </p:spPr>
+        <p:txBody>
+          <a:bodyPr vert="horz" lIns="91440" tIns="45720" rIns="91440" bIns="45720" rtlCol="0">
+            <a:normAutofit/>
+          </a:bodyPr>
+          <a:lstStyle/>
+          <a:p>
+            <a:pPr marL="342900" marR="0" lvl="0" indent="-342900" algn="l" defTabSz="914400" rtl="0" eaLnBrk="1" fontAlgn="auto" latinLnBrk="0" hangingPunct="1">
+              <a:lnSpc>
+                <a:spcPct val="100000"/>
+              </a:lnSpc>
+              <a:spcBef>
+                <a:spcPct val="20000"/>
+              </a:spcBef>
+              <a:spcAft>
+                <a:spcPts val="0"/>
+              </a:spcAft>
+              <a:buClrTx/>
+              <a:buSzTx/>
+              <a:buFont typeface="Arial" pitchFamily="34" charset="0"/>
+              <a:buChar char="•"/>
+              <a:tabLst/>
+              <a:defRPr/>
+            </a:pPr>
+            <a:r>
+              <a:rPr lang="de-DE" sz="2000" dirty="0" smtClean="0">
                 <a:latin typeface="Lato" pitchFamily="34" charset="0"/>
-              </a:endParaRPr>
-            </a:p>
-            <a:p>
-              <a:pPr marL="342900" marR="0" lvl="0" indent="-342900" algn="l" defTabSz="914400" rtl="0" eaLnBrk="1" fontAlgn="auto" latinLnBrk="0" hangingPunct="1">
-                <a:lnSpc>
-                  <a:spcPct val="100000"/>
-                </a:lnSpc>
-                <a:spcBef>
-                  <a:spcPct val="20000"/>
-                </a:spcBef>
-                <a:spcAft>
-                  <a:spcPts val="0"/>
-                </a:spcAft>
-                <a:buClrTx/>
-                <a:buSzTx/>
-                <a:tabLst/>
-                <a:defRPr/>
-              </a:pPr>
-              <a:endParaRPr kumimoji="0" lang="de-DE" sz="2000" b="0" i="0" u="none" strike="noStrike" kern="1200" cap="none" spc="0" normalizeH="0" baseline="0" noProof="0" dirty="0" smtClean="0">
-                <a:ln>
-                  <a:noFill/>
-                </a:ln>
-                <a:solidFill>
-                  <a:schemeClr val="tx1"/>
-                </a:solidFill>
-                <a:effectLst/>
-                <a:uLnTx/>
-                <a:uFillTx/>
+              </a:rPr>
+              <a:t>Festlegung der Ablaufgeschwindigkeit durch Faktor </a:t>
+            </a:r>
+          </a:p>
+          <a:p>
+            <a:pPr marL="342900" marR="0" lvl="0" indent="-342900" algn="l" defTabSz="914400" rtl="0" eaLnBrk="1" fontAlgn="auto" latinLnBrk="0" hangingPunct="1">
+              <a:lnSpc>
+                <a:spcPct val="100000"/>
+              </a:lnSpc>
+              <a:spcBef>
+                <a:spcPct val="20000"/>
+              </a:spcBef>
+              <a:spcAft>
+                <a:spcPts val="0"/>
+              </a:spcAft>
+              <a:buClrTx/>
+              <a:buSzTx/>
+              <a:buFont typeface="Arial" pitchFamily="34" charset="0"/>
+              <a:buChar char="•"/>
+              <a:tabLst/>
+              <a:defRPr/>
+            </a:pPr>
+            <a:r>
+              <a:rPr lang="de-DE" sz="2000" dirty="0">
                 <a:latin typeface="Lato" pitchFamily="34" charset="0"/>
-                <a:ea typeface="+mn-ea"/>
-                <a:cs typeface="+mn-cs"/>
-              </a:endParaRPr>
-            </a:p>
-          </p:txBody>
-        </p:sp>
-        <p:pic>
-          <p:nvPicPr>
-            <p:cNvPr id="10" name="Grafik 9"/>
-            <p:cNvPicPr>
-              <a:picLocks noChangeAspect="1"/>
-            </p:cNvPicPr>
-            <p:nvPr>
-              <p:custDataLst>
-                <p:tags r:id="rId2"/>
-              </p:custDataLst>
-            </p:nvPr>
-          </p:nvPicPr>
-          <p:blipFill>
-            <a:blip r:embed="rId6" cstate="print">
-              <a:extLst>
-                <a:ext uri="{28A0092B-C50C-407E-A947-70E740481C1C}">
-                  <a14:useLocalDpi xmlns:a14="http://schemas.microsoft.com/office/drawing/2010/main" val="0"/>
-                </a:ext>
-              </a:extLst>
-            </a:blip>
-            <a:stretch>
-              <a:fillRect/>
-            </a:stretch>
-          </p:blipFill>
-          <p:spPr>
-            <a:xfrm>
-              <a:off x="6711552" y="1440888"/>
-              <a:ext cx="126510" cy="230156"/>
-            </a:xfrm>
-            <a:prstGeom prst="rect">
-              <a:avLst/>
-            </a:prstGeom>
-          </p:spPr>
-        </p:pic>
-        <p:pic>
-          <p:nvPicPr>
-            <p:cNvPr id="2" name="Grafik 1"/>
-            <p:cNvPicPr>
-              <a:picLocks noChangeAspect="1"/>
-            </p:cNvPicPr>
-            <p:nvPr>
-              <p:custDataLst>
-                <p:tags r:id="rId3"/>
-              </p:custDataLst>
-            </p:nvPr>
-          </p:nvPicPr>
-          <p:blipFill>
-            <a:blip r:embed="rId6" cstate="print">
-              <a:extLst>
-                <a:ext uri="{28A0092B-C50C-407E-A947-70E740481C1C}">
-                  <a14:useLocalDpi xmlns:a14="http://schemas.microsoft.com/office/drawing/2010/main" val="0"/>
-                </a:ext>
-              </a:extLst>
-            </a:blip>
-            <a:stretch>
-              <a:fillRect/>
-            </a:stretch>
-          </p:blipFill>
-          <p:spPr>
-            <a:xfrm>
-              <a:off x="950912" y="1822828"/>
-              <a:ext cx="126510" cy="230156"/>
-            </a:xfrm>
-            <a:prstGeom prst="rect">
-              <a:avLst/>
-            </a:prstGeom>
-          </p:spPr>
-        </p:pic>
-      </p:grpSp>
+              </a:rPr>
+              <a:t> </a:t>
+            </a:r>
+            <a:r>
+              <a:rPr lang="de-DE" sz="2000" dirty="0" smtClean="0">
+                <a:latin typeface="Lato" pitchFamily="34" charset="0"/>
+              </a:rPr>
+              <a:t>   = Frequenz</a:t>
+            </a:r>
+          </a:p>
+          <a:p>
+            <a:pPr marL="342900" lvl="0" indent="-342900">
+              <a:spcBef>
+                <a:spcPct val="20000"/>
+              </a:spcBef>
+              <a:buFont typeface="Arial" pitchFamily="34" charset="0"/>
+              <a:buChar char="•"/>
+            </a:pPr>
+            <a:r>
+              <a:rPr lang="de-DE" sz="2000" dirty="0" smtClean="0">
+                <a:latin typeface="Lato" pitchFamily="34" charset="0"/>
+              </a:rPr>
+              <a:t>Kreisfrequenz:</a:t>
+            </a:r>
+          </a:p>
+          <a:p>
+            <a:pPr marL="342900" lvl="0" indent="-342900">
+              <a:spcBef>
+                <a:spcPct val="20000"/>
+              </a:spcBef>
+              <a:buFont typeface="Arial" pitchFamily="34" charset="0"/>
+              <a:buChar char="•"/>
+            </a:pPr>
+            <a:endParaRPr kumimoji="0" lang="de-DE" sz="2000" i="0" u="none" strike="noStrike" kern="1200" cap="none" spc="0" normalizeH="0" baseline="0" noProof="0" dirty="0" smtClean="0">
+              <a:ln>
+                <a:noFill/>
+              </a:ln>
+              <a:solidFill>
+                <a:schemeClr val="tx1"/>
+              </a:solidFill>
+              <a:effectLst/>
+              <a:uLnTx/>
+              <a:uFillTx/>
+              <a:latin typeface="Lato" pitchFamily="34" charset="0"/>
+            </a:endParaRPr>
+          </a:p>
+          <a:p>
+            <a:pPr marL="342900" marR="0" lvl="0" indent="-342900" algn="l" defTabSz="914400" rtl="0" eaLnBrk="1" fontAlgn="auto" latinLnBrk="0" hangingPunct="1">
+              <a:lnSpc>
+                <a:spcPct val="100000"/>
+              </a:lnSpc>
+              <a:spcBef>
+                <a:spcPct val="20000"/>
+              </a:spcBef>
+              <a:spcAft>
+                <a:spcPts val="0"/>
+              </a:spcAft>
+              <a:buClrTx/>
+              <a:buSzTx/>
+              <a:tabLst/>
+              <a:defRPr/>
+            </a:pPr>
+            <a:endParaRPr kumimoji="0" lang="de-DE" sz="2000" b="0" i="0" u="none" strike="noStrike" kern="1200" cap="none" spc="0" normalizeH="0" baseline="0" noProof="0" dirty="0" smtClean="0">
+              <a:ln>
+                <a:noFill/>
+              </a:ln>
+              <a:solidFill>
+                <a:schemeClr val="tx1"/>
+              </a:solidFill>
+              <a:effectLst/>
+              <a:uLnTx/>
+              <a:uFillTx/>
+              <a:latin typeface="Lato" pitchFamily="34" charset="0"/>
+              <a:ea typeface="+mn-ea"/>
+              <a:cs typeface="+mn-cs"/>
+            </a:endParaRPr>
+          </a:p>
+        </p:txBody>
+      </p:sp>
+      <p:pic>
+        <p:nvPicPr>
+          <p:cNvPr id="10" name="Grafik 9"/>
+          <p:cNvPicPr>
+            <a:picLocks noChangeAspect="1"/>
+          </p:cNvPicPr>
+          <p:nvPr>
+            <p:custDataLst>
+              <p:tags r:id="rId1"/>
+            </p:custDataLst>
+          </p:nvPr>
+        </p:nvPicPr>
+        <p:blipFill>
+          <a:blip r:embed="rId6" cstate="print">
+            <a:extLst>
+              <a:ext uri="{28A0092B-C50C-407E-A947-70E740481C1C}">
+                <a14:useLocalDpi xmlns:a14="http://schemas.microsoft.com/office/drawing/2010/main" val="0"/>
+              </a:ext>
+            </a:extLst>
+          </a:blip>
+          <a:stretch>
+            <a:fillRect/>
+          </a:stretch>
+        </p:blipFill>
+        <p:spPr>
+          <a:xfrm>
+            <a:off x="6660232" y="1400717"/>
+            <a:ext cx="126510" cy="230156"/>
+          </a:xfrm>
+          <a:prstGeom prst="rect">
+            <a:avLst/>
+          </a:prstGeom>
+        </p:spPr>
+      </p:pic>
+      <p:pic>
+        <p:nvPicPr>
+          <p:cNvPr id="2" name="Grafik 1"/>
+          <p:cNvPicPr>
+            <a:picLocks noChangeAspect="1"/>
+          </p:cNvPicPr>
+          <p:nvPr>
+            <p:custDataLst>
+              <p:tags r:id="rId2"/>
+            </p:custDataLst>
+          </p:nvPr>
+        </p:nvPicPr>
+        <p:blipFill>
+          <a:blip r:embed="rId6" cstate="print">
+            <a:extLst>
+              <a:ext uri="{28A0092B-C50C-407E-A947-70E740481C1C}">
+                <a14:useLocalDpi xmlns:a14="http://schemas.microsoft.com/office/drawing/2010/main" val="0"/>
+              </a:ext>
+            </a:extLst>
+          </a:blip>
+          <a:stretch>
+            <a:fillRect/>
+          </a:stretch>
+        </p:blipFill>
+        <p:spPr>
+          <a:xfrm>
+            <a:off x="899592" y="1782657"/>
+            <a:ext cx="126510" cy="230156"/>
+          </a:xfrm>
+          <a:prstGeom prst="rect">
+            <a:avLst/>
+          </a:prstGeom>
+        </p:spPr>
+      </p:pic>
       <p:sp>
         <p:nvSpPr>
           <p:cNvPr id="12" name="Rechteck 11"/>
@@ -13693,7 +13759,7 @@
           </p:cNvPicPr>
           <p:nvPr>
             <p:custDataLst>
-              <p:tags r:id="rId1"/>
+              <p:tags r:id="rId3"/>
             </p:custDataLst>
           </p:nvPr>
         </p:nvPicPr>
@@ -13766,9 +13832,9 @@
                                           </p:stCondLst>
                                         </p:cTn>
                                         <p:tgtEl>
-                                          <p:spTgt spid="8">
+                                          <p:spTgt spid="7">
                                             <p:txEl>
-                                              <p:charRg st="0" end="0"/>
+                                              <p:pRg st="0" end="0"/>
                                             </p:txEl>
                                           </p:spTgt>
                                         </p:tgtEl>
@@ -13784,9 +13850,122 @@
                                       <p:cBhvr>
                                         <p:cTn id="7" dur="500"/>
                                         <p:tgtEl>
-                                          <p:spTgt spid="8">
+                                          <p:spTgt spid="7">
                                             <p:txEl>
-                                              <p:charRg st="0" end="0"/>
+                                              <p:pRg st="0" end="0"/>
+                                            </p:txEl>
+                                          </p:spTgt>
+                                        </p:tgtEl>
+                                      </p:cBhvr>
+                                    </p:animEffect>
+                                  </p:childTnLst>
+                                </p:cTn>
+                              </p:par>
+                              <p:par>
+                                <p:cTn id="8" presetID="10" presetClass="entr" presetSubtype="0" fill="hold" nodeType="withEffect">
+                                  <p:stCondLst>
+                                    <p:cond delay="0"/>
+                                  </p:stCondLst>
+                                  <p:childTnLst>
+                                    <p:set>
+                                      <p:cBhvr>
+                                        <p:cTn id="9" dur="1" fill="hold">
+                                          <p:stCondLst>
+                                            <p:cond delay="0"/>
+                                          </p:stCondLst>
+                                        </p:cTn>
+                                        <p:tgtEl>
+                                          <p:spTgt spid="10"/>
+                                        </p:tgtEl>
+                                        <p:attrNameLst>
+                                          <p:attrName>style.visibility</p:attrName>
+                                        </p:attrNameLst>
+                                      </p:cBhvr>
+                                      <p:to>
+                                        <p:strVal val="visible"/>
+                                      </p:to>
+                                    </p:set>
+                                    <p:animEffect transition="in" filter="fade">
+                                      <p:cBhvr>
+                                        <p:cTn id="10" dur="500"/>
+                                        <p:tgtEl>
+                                          <p:spTgt spid="10"/>
+                                        </p:tgtEl>
+                                      </p:cBhvr>
+                                    </p:animEffect>
+                                  </p:childTnLst>
+                                </p:cTn>
+                              </p:par>
+                              <p:par>
+                                <p:cTn id="11" presetID="10" presetClass="entr" presetSubtype="0" fill="hold" nodeType="withEffect">
+                                  <p:stCondLst>
+                                    <p:cond delay="0"/>
+                                  </p:stCondLst>
+                                  <p:childTnLst>
+                                    <p:set>
+                                      <p:cBhvr>
+                                        <p:cTn id="12" dur="1" fill="hold">
+                                          <p:stCondLst>
+                                            <p:cond delay="0"/>
+                                          </p:stCondLst>
+                                        </p:cTn>
+                                        <p:tgtEl>
+                                          <p:spTgt spid="2"/>
+                                        </p:tgtEl>
+                                        <p:attrNameLst>
+                                          <p:attrName>style.visibility</p:attrName>
+                                        </p:attrNameLst>
+                                      </p:cBhvr>
+                                      <p:to>
+                                        <p:strVal val="visible"/>
+                                      </p:to>
+                                    </p:set>
+                                    <p:animEffect transition="in" filter="fade">
+                                      <p:cBhvr>
+                                        <p:cTn id="13" dur="500"/>
+                                        <p:tgtEl>
+                                          <p:spTgt spid="2"/>
+                                        </p:tgtEl>
+                                      </p:cBhvr>
+                                    </p:animEffect>
+                                  </p:childTnLst>
+                                </p:cTn>
+                              </p:par>
+                              <p:par>
+                                <p:cTn id="14" presetID="10" presetClass="entr" presetSubtype="0" fill="hold" nodeType="withEffect">
+                                  <p:stCondLst>
+                                    <p:cond delay="0"/>
+                                  </p:stCondLst>
+                                  <p:childTnLst>
+                                    <p:set>
+                                      <p:cBhvr>
+                                        <p:cTn id="15" dur="1" fill="hold">
+                                          <p:stCondLst>
+                                            <p:cond delay="0"/>
+                                          </p:stCondLst>
+                                        </p:cTn>
+                                        <p:tgtEl>
+                                          <p:spTgt spid="7">
+                                            <p:txEl>
+                                              <p:pRg st="1" end="1"/>
+                                            </p:txEl>
+                                          </p:spTgt>
+                                        </p:tgtEl>
+                                        <p:attrNameLst>
+                                          <p:attrName>style.visibility</p:attrName>
+                                        </p:attrNameLst>
+                                      </p:cBhvr>
+                                      <p:to>
+                                        <p:strVal val="visible"/>
+                                      </p:to>
+                                    </p:set>
+                                    <p:animEffect transition="in" filter="fade">
+                                      <p:cBhvr>
+                                        <p:cTn id="16" dur="500"/>
+                                        <p:tgtEl>
+                                          <p:spTgt spid="7">
+                                            <p:txEl>
+                                              <p:pRg st="1" end="1"/>
                                             </p:txEl>
                                           </p:spTgt>
                                         </p:tgtEl>
@@ -13802,32 +13981,36 @@
                     </p:cTn>
                   </p:par>
                   <p:par>
-                    <p:cTn id="8" fill="hold">
+                    <p:cTn id="17" fill="hold">
                       <p:stCondLst>
                         <p:cond delay="indefinite"/>
                       </p:stCondLst>
                       <p:childTnLst>
                         <p:par>
-                          <p:cTn id="9" fill="hold">
+                          <p:cTn id="18" fill="hold">
                             <p:stCondLst>
                               <p:cond delay="0"/>
                             </p:stCondLst>
                             <p:childTnLst>
                               <p:par>
-                                <p:cTn id="10" presetID="10" presetClass="entr" presetSubtype="0" fill="hold" nodeType="clickEffect">
+                                <p:cTn id="19" presetID="10" presetClass="entr" presetSubtype="0" fill="hold" nodeType="clickEffect">
                                   <p:stCondLst>
                                     <p:cond delay="0"/>
                                   </p:stCondLst>
                                   <p:childTnLst>
                                     <p:set>
                                       <p:cBhvr>
-                                        <p:cTn id="11" dur="1" fill="hold">
+                                        <p:cTn id="20" dur="1" fill="hold">
                                           <p:stCondLst>
                                             <p:cond delay="0"/>
                                           </p:stCondLst>
                                         </p:cTn>
                                         <p:tgtEl>
-                                          <p:spTgt spid="33794"/>
+                                          <p:spTgt spid="7">
+                                            <p:txEl>
+                                              <p:pRg st="2" end="2"/>
+                                            </p:txEl>
+                                          </p:spTgt>
                                         </p:tgtEl>
                                         <p:attrNameLst>
                                           <p:attrName>style.visibility</p:attrName>
@@ -13839,9 +14022,13 @@
                                     </p:set>
                                     <p:animEffect transition="in" filter="fade">
                                       <p:cBhvr>
-                                        <p:cTn id="12" dur="500"/>
-                                        <p:tgtEl>
-                                          <p:spTgt spid="33794"/>
+                                        <p:cTn id="21" dur="500"/>
+                                        <p:tgtEl>
+                                          <p:spTgt spid="7">
+                                            <p:txEl>
+                                              <p:pRg st="2" end="2"/>
+                                            </p:txEl>
+                                          </p:spTgt>
                                         </p:tgtEl>
                                       </p:cBhvr>
                                     </p:animEffect>
@@ -13849,20 +14036,20 @@
                                 </p:cTn>
                               </p:par>
                               <p:par>
-                                <p:cTn id="13" presetID="10" presetClass="entr" presetSubtype="0" fill="hold" grpId="0" nodeType="withEffect">
+                                <p:cTn id="22" presetID="10" presetClass="entr" presetSubtype="0" fill="hold" nodeType="withEffect">
                                   <p:stCondLst>
                                     <p:cond delay="0"/>
                                   </p:stCondLst>
                                   <p:childTnLst>
                                     <p:set>
                                       <p:cBhvr>
-                                        <p:cTn id="14" dur="1" fill="hold">
+                                        <p:cTn id="23" dur="1" fill="hold">
                                           <p:stCondLst>
                                             <p:cond delay="0"/>
                                           </p:stCondLst>
                                         </p:cTn>
                                         <p:tgtEl>
-                                          <p:spTgt spid="13"/>
+                                          <p:spTgt spid="15"/>
                                         </p:tgtEl>
                                         <p:attrNameLst>
                                           <p:attrName>style.visibility</p:attrName>
@@ -13874,7 +14061,95 @@
                                     </p:set>
                                     <p:animEffect transition="in" filter="fade">
                                       <p:cBhvr>
-                                        <p:cTn id="15" dur="500"/>
+                                        <p:cTn id="24" dur="500"/>
+                                        <p:tgtEl>
+                                          <p:spTgt spid="15"/>
+                                        </p:tgtEl>
+                                      </p:cBhvr>
+                                    </p:animEffect>
+                                  </p:childTnLst>
+                                </p:cTn>
+                              </p:par>
+                            </p:childTnLst>
+                          </p:cTn>
+                        </p:par>
+                      </p:childTnLst>
+                    </p:cTn>
+                  </p:par>
+                  <p:par>
+                    <p:cTn id="25" fill="hold">
+                      <p:stCondLst>
+                        <p:cond delay="indefinite"/>
+                      </p:stCondLst>
+                      <p:childTnLst>
+                        <p:par>
+                          <p:cTn id="26" fill="hold">
+                            <p:stCondLst>
+                              <p:cond delay="0"/>
+                            </p:stCondLst>
+                            <p:childTnLst>
+                              <p:par>
+                                <p:cTn id="27" presetID="10" presetClass="entr" presetSubtype="0" fill="hold" nodeType="clickEffect">
+                                  <p:stCondLst>
+                                    <p:cond delay="0"/>
+                                  </p:stCondLst>
+                                  <p:childTnLst>
+                                    <p:set>
+                                      <p:cBhvr>
+                                        <p:cTn id="28" dur="1" fill="hold">
+                                          <p:stCondLst>
+                                            <p:cond delay="0"/>
+                                          </p:stCondLst>
+                                        </p:cTn>
+                                        <p:tgtEl>
+                                          <p:spTgt spid="33794"/>
+                                        </p:tgtEl>
+                                        <p:attrNameLst>
+                                          <p:attrName>style.visibility</p:attrName>
+                                        </p:attrNameLst>
+                                      </p:cBhvr>
+                                      <p:to>
+                                        <p:strVal val="visible"/>
+                                      </p:to>
+                                    </p:set>
+                                    <p:animEffect transition="in" filter="fade">
+                                      <p:cBhvr>
+                                        <p:cTn id="29" dur="500"/>
+                                        <p:tgtEl>
+                                          <p:spTgt spid="33794"/>
+                                        </p:tgtEl>
+                                      </p:cBhvr>
+                                    </p:animEffect>
+                                  </p:childTnLst>
+                                </p:cTn>
+                              </p:par>
+                              <p:par>
+                                <p:cTn id="30" presetID="10" presetClass="entr" presetSubtype="0" fill="hold" grpId="0" nodeType="withEffect">
+                                  <p:stCondLst>
+                                    <p:cond delay="0"/>
+                                  </p:stCondLst>
+                                  <p:childTnLst>
+                                    <p:set>
+                                      <p:cBhvr>
+                                        <p:cTn id="31" dur="1" fill="hold">
+                                          <p:stCondLst>
+                                            <p:cond delay="0"/>
+                                          </p:stCondLst>
+                                        </p:cTn>
+                                        <p:tgtEl>
+                                          <p:spTgt spid="13"/>
+                                        </p:tgtEl>
+                                        <p:attrNameLst>
+                                          <p:attrName>style.visibility</p:attrName>
+                                        </p:attrNameLst>
+                                      </p:cBhvr>
+                                      <p:to>
+                                        <p:strVal val="visible"/>
+                                      </p:to>
+                                    </p:set>
+                                    <p:animEffect transition="in" filter="fade">
+                                      <p:cBhvr>
+                                        <p:cTn id="32" dur="500"/>
                                         <p:tgtEl>
                                           <p:spTgt spid="13"/>
                                         </p:tgtEl>
@@ -20918,7 +21193,7 @@
           <a:graphicData uri="http://schemas.openxmlformats.org/presentationml/2006/ole">
             <mc:AlternateContent xmlns:mc="http://schemas.openxmlformats.org/markup-compatibility/2006">
               <mc:Choice xmlns:v="urn:schemas-microsoft-com:vml" Requires="v">
-                <p:oleObj spid="_x0000_s2245" name="Formel" r:id="rId10" imgW="114120" imgH="215640" progId="Equation.3">
+                <p:oleObj spid="_x0000_s2247" name="Formel" r:id="rId10" imgW="114120" imgH="215640" progId="Equation.3">
                   <p:embed/>
                 </p:oleObj>
               </mc:Choice>
@@ -21556,6 +21831,111 @@
                       </p:childTnLst>
                     </p:cTn>
                   </p:par>
+                  <p:par>
+                    <p:cTn id="34" fill="hold">
+                      <p:stCondLst>
+                        <p:cond delay="indefinite"/>
+                      </p:stCondLst>
+                      <p:childTnLst>
+                        <p:par>
+                          <p:cTn id="35" fill="hold">
+                            <p:stCondLst>
+                              <p:cond delay="0"/>
+                            </p:stCondLst>
+                            <p:childTnLst>
+                              <p:par>
+                                <p:cTn id="36" presetID="1" presetClass="mediacall" presetSubtype="0" fill="hold" nodeType="clickEffect">
+                                  <p:stCondLst>
+                                    <p:cond delay="0"/>
+                                  </p:stCondLst>
+                                  <p:childTnLst>
+                                    <p:cmd type="call" cmd="playFrom(0.0)">
+                                      <p:cBhvr>
+                                        <p:cTn id="37" dur="1000" fill="hold"/>
+                                        <p:tgtEl>
+                                          <p:spTgt spid="2"/>
+                                        </p:tgtEl>
+                                      </p:cBhvr>
+                                    </p:cmd>
+                                  </p:childTnLst>
+                                </p:cTn>
+                              </p:par>
+                            </p:childTnLst>
+                          </p:cTn>
+                        </p:par>
+                      </p:childTnLst>
+                    </p:cTn>
+                  </p:par>
+                  <p:par>
+                    <p:cTn id="38" fill="hold">
+                      <p:stCondLst>
+                        <p:cond delay="indefinite"/>
+                      </p:stCondLst>
+                      <p:childTnLst>
+                        <p:par>
+                          <p:cTn id="39" fill="hold">
+                            <p:stCondLst>
+                              <p:cond delay="0"/>
+                            </p:stCondLst>
+                            <p:childTnLst>
+                              <p:par>
+                                <p:cTn id="40" presetID="1" presetClass="mediacall" presetSubtype="0" fill="hold" nodeType="clickEffect">
+                                  <p:stCondLst>
+                                    <p:cond delay="0"/>
+                                  </p:stCondLst>
+                                  <p:childTnLst>
+                                    <p:cmd type="call" cmd="playFrom(0.0)">
+                                      <p:cBhvr>
+                                        <p:cTn id="41" dur="1000" fill="hold"/>
+                                        <p:tgtEl>
+                                          <p:spTgt spid="3"/>
+                                        </p:tgtEl>
+                                      </p:cBhvr>
+                                    </p:cmd>
+                                  </p:childTnLst>
+                                </p:cTn>
+                              </p:par>
+                            </p:childTnLst>
+                          </p:cTn>
+                        </p:par>
+                      </p:childTnLst>
+                    </p:cTn>
+                  </p:par>
+                  <p:par>
+                    <p:cTn id="42" fill="hold">
+                      <p:stCondLst>
+                        <p:cond delay="indefinite"/>
+                      </p:stCondLst>
+                      <p:childTnLst>
+                        <p:par>
+                          <p:cTn id="43" fill="hold">
+                            <p:stCondLst>
+                              <p:cond delay="0"/>
+                            </p:stCondLst>
+                            <p:childTnLst>
+                              <p:par>
+                                <p:cTn id="44" presetID="1" presetClass="mediacall" presetSubtype="0" fill="hold" nodeType="clickEffect">
+                                  <p:stCondLst>
+                                    <p:cond delay="0"/>
+                                  </p:stCondLst>
+                                  <p:childTnLst>
+                                    <p:cmd type="call" cmd="playFrom(0.0)">
+                                      <p:cBhvr>
+                                        <p:cTn id="45" dur="1000" fill="hold"/>
+                                        <p:tgtEl>
+                                          <p:spTgt spid="8"/>
+                                        </p:tgtEl>
+                                      </p:cBhvr>
+                                    </p:cmd>
+                                  </p:childTnLst>
+                                </p:cTn>
+                              </p:par>
+                            </p:childTnLst>
+                          </p:cTn>
+                        </p:par>
+                      </p:childTnLst>
+                    </p:cTn>
+                  </p:par>
                 </p:childTnLst>
               </p:cTn>
               <p:prevCondLst>
@@ -21575,7 +21955,7 @@
             </p:seq>
             <p:audio>
               <p:cMediaNode vol="21212">
-                <p:cTn id="34" fill="hold" display="0">
+                <p:cTn id="46" fill="hold" display="0">
                   <p:stCondLst>
                     <p:cond delay="indefinite"/>
                   </p:stCondLst>
@@ -21594,7 +21974,7 @@
             </p:audio>
             <p:audio>
               <p:cMediaNode vol="19697">
-                <p:cTn id="35" fill="hold" display="0">
+                <p:cTn id="47" fill="hold" display="0">
                   <p:stCondLst>
                     <p:cond delay="indefinite"/>
                   </p:stCondLst>
@@ -21613,7 +21993,7 @@
             </p:audio>
             <p:audio>
               <p:cMediaNode vol="18182">
-                <p:cTn id="36" fill="hold" display="0">
+                <p:cTn id="48" fill="hold" display="0">
                   <p:stCondLst>
                     <p:cond delay="indefinite"/>
                   </p:stCondLst>
@@ -22404,6 +22784,111 @@
                       </p:childTnLst>
                     </p:cTn>
                   </p:par>
+                  <p:par>
+                    <p:cTn id="27" fill="hold">
+                      <p:stCondLst>
+                        <p:cond delay="indefinite"/>
+                      </p:stCondLst>
+                      <p:childTnLst>
+                        <p:par>
+                          <p:cTn id="28" fill="hold">
+                            <p:stCondLst>
+                              <p:cond delay="0"/>
+                            </p:stCondLst>
+                            <p:childTnLst>
+                              <p:par>
+                                <p:cTn id="29" presetID="1" presetClass="mediacall" presetSubtype="0" fill="hold" nodeType="clickEffect">
+                                  <p:stCondLst>
+                                    <p:cond delay="0"/>
+                                  </p:stCondLst>
+                                  <p:childTnLst>
+                                    <p:cmd type="call" cmd="playFrom(0.0)">
+                                      <p:cBhvr>
+                                        <p:cTn id="30" dur="1000" fill="hold"/>
+                                        <p:tgtEl>
+                                          <p:spTgt spid="7"/>
+                                        </p:tgtEl>
+                                      </p:cBhvr>
+                                    </p:cmd>
+                                  </p:childTnLst>
+                                </p:cTn>
+                              </p:par>
+                            </p:childTnLst>
+                          </p:cTn>
+                        </p:par>
+                      </p:childTnLst>
+                    </p:cTn>
+                  </p:par>
+                  <p:par>
+                    <p:cTn id="31" fill="hold">
+                      <p:stCondLst>
+                        <p:cond delay="indefinite"/>
+                      </p:stCondLst>
+                      <p:childTnLst>
+                        <p:par>
+                          <p:cTn id="32" fill="hold">
+                            <p:stCondLst>
+                              <p:cond delay="0"/>
+                            </p:stCondLst>
+                            <p:childTnLst>
+                              <p:par>
+                                <p:cTn id="33" presetID="1" presetClass="mediacall" presetSubtype="0" fill="hold" nodeType="clickEffect">
+                                  <p:stCondLst>
+                                    <p:cond delay="0"/>
+                                  </p:stCondLst>
+                                  <p:childTnLst>
+                                    <p:cmd type="call" cmd="playFrom(0.0)">
+                                      <p:cBhvr>
+                                        <p:cTn id="34" dur="1000" fill="hold"/>
+                                        <p:tgtEl>
+                                          <p:spTgt spid="8"/>
+                                        </p:tgtEl>
+                                      </p:cBhvr>
+                                    </p:cmd>
+                                  </p:childTnLst>
+                                </p:cTn>
+                              </p:par>
+                            </p:childTnLst>
+                          </p:cTn>
+                        </p:par>
+                      </p:childTnLst>
+                    </p:cTn>
+                  </p:par>
+                  <p:par>
+                    <p:cTn id="35" fill="hold">
+                      <p:stCondLst>
+                        <p:cond delay="indefinite"/>
+                      </p:stCondLst>
+                      <p:childTnLst>
+                        <p:par>
+                          <p:cTn id="36" fill="hold">
+                            <p:stCondLst>
+                              <p:cond delay="0"/>
+                            </p:stCondLst>
+                            <p:childTnLst>
+                              <p:par>
+                                <p:cTn id="37" presetID="1" presetClass="mediacall" presetSubtype="0" fill="hold" nodeType="clickEffect">
+                                  <p:stCondLst>
+                                    <p:cond delay="0"/>
+                                  </p:stCondLst>
+                                  <p:childTnLst>
+                                    <p:cmd type="call" cmd="playFrom(0.0)">
+                                      <p:cBhvr>
+                                        <p:cTn id="38" dur="1000" fill="hold"/>
+                                        <p:tgtEl>
+                                          <p:spTgt spid="13"/>
+                                        </p:tgtEl>
+                                      </p:cBhvr>
+                                    </p:cmd>
+                                  </p:childTnLst>
+                                </p:cTn>
+                              </p:par>
+                            </p:childTnLst>
+                          </p:cTn>
+                        </p:par>
+                      </p:childTnLst>
+                    </p:cTn>
+                  </p:par>
                 </p:childTnLst>
               </p:cTn>
               <p:prevCondLst>
@@ -22422,165 +22907,11 @@
               </p:nextCondLst>
             </p:seq>
             <p:seq concurrent="1" nextAc="seek">
-              <p:cTn id="27" restart="whenNotActive" fill="hold" evtFilter="cancelBubble" nodeType="interactiveSeq">
+              <p:cTn id="39" restart="whenNotActive" fill="hold" evtFilter="cancelBubble" nodeType="interactiveSeq">
                 <p:stCondLst>
                   <p:cond evt="onClick" delay="0">
                     <p:tgtEl>
                       <p:spTgt spid="7"/>
-                    </p:tgtEl>
-                  </p:cond>
-                </p:stCondLst>
-                <p:endSync evt="end" delay="0">
-                  <p:rtn val="all"/>
-                </p:endSync>
-                <p:childTnLst>
-                  <p:par>
-                    <p:cTn id="28" fill="hold">
-                      <p:stCondLst>
-                        <p:cond delay="0"/>
-                      </p:stCondLst>
-                      <p:childTnLst>
-                        <p:par>
-                          <p:cTn id="29" fill="hold">
-                            <p:stCondLst>
-                              <p:cond delay="0"/>
-                            </p:stCondLst>
-                            <p:childTnLst>
-                              <p:par>
-                                <p:cTn id="30" presetID="1" presetClass="mediacall" presetSubtype="0" fill="hold" nodeType="clickEffect">
-                                  <p:stCondLst>
-                                    <p:cond delay="0"/>
-                                  </p:stCondLst>
-                                  <p:childTnLst>
-                                    <p:cmd type="call" cmd="playFrom(0.0)">
-                                      <p:cBhvr>
-                                        <p:cTn id="31" dur="1000" fill="hold"/>
-                                        <p:tgtEl>
-                                          <p:spTgt spid="7"/>
-                                        </p:tgtEl>
-                                      </p:cBhvr>
-                                    </p:cmd>
-                                  </p:childTnLst>
-                                </p:cTn>
-                              </p:par>
-                            </p:childTnLst>
-                          </p:cTn>
-                        </p:par>
-                      </p:childTnLst>
-                    </p:cTn>
-                  </p:par>
-                </p:childTnLst>
-              </p:cTn>
-              <p:nextCondLst>
-                <p:cond evt="onClick" delay="0">
-                  <p:tgtEl>
-                    <p:spTgt spid="7"/>
-                  </p:tgtEl>
-                </p:cond>
-              </p:nextCondLst>
-            </p:seq>
-            <p:audio>
-              <p:cMediaNode vol="45455">
-                <p:cTn id="32" fill="hold" display="0">
-                  <p:stCondLst>
-                    <p:cond delay="indefinite"/>
-                  </p:stCondLst>
-                  <p:endCondLst>
-                    <p:cond evt="onStopAudio" delay="0">
-                      <p:tgtEl>
-                        <p:sldTgt/>
-                      </p:tgtEl>
-                    </p:cond>
-                  </p:endCondLst>
-                </p:cTn>
-                <p:tgtEl>
-                  <p:spTgt spid="7"/>
-                </p:tgtEl>
-              </p:cMediaNode>
-            </p:audio>
-            <p:seq concurrent="1" nextAc="seek">
-              <p:cTn id="33" restart="whenNotActive" fill="hold" evtFilter="cancelBubble" nodeType="interactiveSeq">
-                <p:stCondLst>
-                  <p:cond evt="onClick" delay="0">
-                    <p:tgtEl>
-                      <p:spTgt spid="8"/>
-                    </p:tgtEl>
-                  </p:cond>
-                </p:stCondLst>
-                <p:endSync evt="end" delay="0">
-                  <p:rtn val="all"/>
-                </p:endSync>
-                <p:childTnLst>
-                  <p:par>
-                    <p:cTn id="34" fill="hold">
-                      <p:stCondLst>
-                        <p:cond delay="0"/>
-                      </p:stCondLst>
-                      <p:childTnLst>
-                        <p:par>
-                          <p:cTn id="35" fill="hold">
-                            <p:stCondLst>
-                              <p:cond delay="0"/>
-                            </p:stCondLst>
-                            <p:childTnLst>
-                              <p:par>
-                                <p:cTn id="36" presetID="1" presetClass="mediacall" presetSubtype="0" fill="hold" nodeType="clickEffect">
-                                  <p:stCondLst>
-                                    <p:cond delay="0"/>
-                                  </p:stCondLst>
-                                  <p:childTnLst>
-                                    <p:cmd type="call" cmd="playFrom(0.0)">
-                                      <p:cBhvr>
-                                        <p:cTn id="37" dur="1000" fill="hold"/>
-                                        <p:tgtEl>
-                                          <p:spTgt spid="8"/>
-                                        </p:tgtEl>
-                                      </p:cBhvr>
-                                    </p:cmd>
-                                  </p:childTnLst>
-                                </p:cTn>
-                              </p:par>
-                            </p:childTnLst>
-                          </p:cTn>
-                        </p:par>
-                      </p:childTnLst>
-                    </p:cTn>
-                  </p:par>
-                </p:childTnLst>
-              </p:cTn>
-              <p:nextCondLst>
-                <p:cond evt="onClick" delay="0">
-                  <p:tgtEl>
-                    <p:spTgt spid="8"/>
-                  </p:tgtEl>
-                </p:cond>
-              </p:nextCondLst>
-            </p:seq>
-            <p:audio>
-              <p:cMediaNode vol="60606">
-                <p:cTn id="38" fill="hold" display="0">
-                  <p:stCondLst>
-                    <p:cond delay="indefinite"/>
-                  </p:stCondLst>
-                  <p:endCondLst>
-                    <p:cond evt="onStopAudio" delay="0">
-                      <p:tgtEl>
-                        <p:sldTgt/>
-                      </p:tgtEl>
-                    </p:cond>
-                  </p:endCondLst>
-                </p:cTn>
-                <p:tgtEl>
-                  <p:spTgt spid="8"/>
-                </p:tgtEl>
-              </p:cMediaNode>
-            </p:audio>
-            <p:seq concurrent="1" nextAc="seek">
-              <p:cTn id="39" restart="whenNotActive" fill="hold" evtFilter="cancelBubble" nodeType="interactiveSeq">
-                <p:stCondLst>
-                  <p:cond evt="onClick" delay="0">
-                    <p:tgtEl>
-                      <p:spTgt spid="13"/>
                     </p:tgtEl>
                   </p:cond>
                 </p:stCondLst>
@@ -22610,6 +22941,160 @@
                                       <p:cBhvr>
                                         <p:cTn id="43" dur="1000" fill="hold"/>
                                         <p:tgtEl>
+                                          <p:spTgt spid="7"/>
+                                        </p:tgtEl>
+                                      </p:cBhvr>
+                                    </p:cmd>
+                                  </p:childTnLst>
+                                </p:cTn>
+                              </p:par>
+                            </p:childTnLst>
+                          </p:cTn>
+                        </p:par>
+                      </p:childTnLst>
+                    </p:cTn>
+                  </p:par>
+                </p:childTnLst>
+              </p:cTn>
+              <p:nextCondLst>
+                <p:cond evt="onClick" delay="0">
+                  <p:tgtEl>
+                    <p:spTgt spid="7"/>
+                  </p:tgtEl>
+                </p:cond>
+              </p:nextCondLst>
+            </p:seq>
+            <p:audio>
+              <p:cMediaNode vol="45455">
+                <p:cTn id="44" fill="hold" display="0">
+                  <p:stCondLst>
+                    <p:cond delay="indefinite"/>
+                  </p:stCondLst>
+                  <p:endCondLst>
+                    <p:cond evt="onStopAudio" delay="0">
+                      <p:tgtEl>
+                        <p:sldTgt/>
+                      </p:tgtEl>
+                    </p:cond>
+                  </p:endCondLst>
+                </p:cTn>
+                <p:tgtEl>
+                  <p:spTgt spid="7"/>
+                </p:tgtEl>
+              </p:cMediaNode>
+            </p:audio>
+            <p:seq concurrent="1" nextAc="seek">
+              <p:cTn id="45" restart="whenNotActive" fill="hold" evtFilter="cancelBubble" nodeType="interactiveSeq">
+                <p:stCondLst>
+                  <p:cond evt="onClick" delay="0">
+                    <p:tgtEl>
+                      <p:spTgt spid="8"/>
+                    </p:tgtEl>
+                  </p:cond>
+                </p:stCondLst>
+                <p:endSync evt="end" delay="0">
+                  <p:rtn val="all"/>
+                </p:endSync>
+                <p:childTnLst>
+                  <p:par>
+                    <p:cTn id="46" fill="hold">
+                      <p:stCondLst>
+                        <p:cond delay="0"/>
+                      </p:stCondLst>
+                      <p:childTnLst>
+                        <p:par>
+                          <p:cTn id="47" fill="hold">
+                            <p:stCondLst>
+                              <p:cond delay="0"/>
+                            </p:stCondLst>
+                            <p:childTnLst>
+                              <p:par>
+                                <p:cTn id="48" presetID="1" presetClass="mediacall" presetSubtype="0" fill="hold" nodeType="clickEffect">
+                                  <p:stCondLst>
+                                    <p:cond delay="0"/>
+                                  </p:stCondLst>
+                                  <p:childTnLst>
+                                    <p:cmd type="call" cmd="playFrom(0.0)">
+                                      <p:cBhvr>
+                                        <p:cTn id="49" dur="1000" fill="hold"/>
+                                        <p:tgtEl>
+                                          <p:spTgt spid="8"/>
+                                        </p:tgtEl>
+                                      </p:cBhvr>
+                                    </p:cmd>
+                                  </p:childTnLst>
+                                </p:cTn>
+                              </p:par>
+                            </p:childTnLst>
+                          </p:cTn>
+                        </p:par>
+                      </p:childTnLst>
+                    </p:cTn>
+                  </p:par>
+                </p:childTnLst>
+              </p:cTn>
+              <p:nextCondLst>
+                <p:cond evt="onClick" delay="0">
+                  <p:tgtEl>
+                    <p:spTgt spid="8"/>
+                  </p:tgtEl>
+                </p:cond>
+              </p:nextCondLst>
+            </p:seq>
+            <p:audio>
+              <p:cMediaNode vol="60606">
+                <p:cTn id="50" fill="hold" display="0">
+                  <p:stCondLst>
+                    <p:cond delay="indefinite"/>
+                  </p:stCondLst>
+                  <p:endCondLst>
+                    <p:cond evt="onStopAudio" delay="0">
+                      <p:tgtEl>
+                        <p:sldTgt/>
+                      </p:tgtEl>
+                    </p:cond>
+                  </p:endCondLst>
+                </p:cTn>
+                <p:tgtEl>
+                  <p:spTgt spid="8"/>
+                </p:tgtEl>
+              </p:cMediaNode>
+            </p:audio>
+            <p:seq concurrent="1" nextAc="seek">
+              <p:cTn id="51" restart="whenNotActive" fill="hold" evtFilter="cancelBubble" nodeType="interactiveSeq">
+                <p:stCondLst>
+                  <p:cond evt="onClick" delay="0">
+                    <p:tgtEl>
+                      <p:spTgt spid="13"/>
+                    </p:tgtEl>
+                  </p:cond>
+                </p:stCondLst>
+                <p:endSync evt="end" delay="0">
+                  <p:rtn val="all"/>
+                </p:endSync>
+                <p:childTnLst>
+                  <p:par>
+                    <p:cTn id="52" fill="hold">
+                      <p:stCondLst>
+                        <p:cond delay="0"/>
+                      </p:stCondLst>
+                      <p:childTnLst>
+                        <p:par>
+                          <p:cTn id="53" fill="hold">
+                            <p:stCondLst>
+                              <p:cond delay="0"/>
+                            </p:stCondLst>
+                            <p:childTnLst>
+                              <p:par>
+                                <p:cTn id="54" presetID="1" presetClass="mediacall" presetSubtype="0" fill="hold" nodeType="clickEffect">
+                                  <p:stCondLst>
+                                    <p:cond delay="0"/>
+                                  </p:stCondLst>
+                                  <p:childTnLst>
+                                    <p:cmd type="call" cmd="playFrom(0.0)">
+                                      <p:cBhvr>
+                                        <p:cTn id="55" dur="1000" fill="hold"/>
+                                        <p:tgtEl>
                                           <p:spTgt spid="13"/>
                                         </p:tgtEl>
                                       </p:cBhvr>
@@ -22635,7 +23120,7 @@
             </p:seq>
             <p:audio>
               <p:cMediaNode vol="42424">
-                <p:cTn id="44" fill="hold" display="0">
+                <p:cTn id="56" fill="hold" display="0">
                   <p:stCondLst>
                     <p:cond delay="indefinite"/>
                   </p:stCondLst>
@@ -23432,6 +23917,111 @@
                       </p:childTnLst>
                     </p:cTn>
                   </p:par>
+                  <p:par>
+                    <p:cTn id="27" fill="hold">
+                      <p:stCondLst>
+                        <p:cond delay="indefinite"/>
+                      </p:stCondLst>
+                      <p:childTnLst>
+                        <p:par>
+                          <p:cTn id="28" fill="hold">
+                            <p:stCondLst>
+                              <p:cond delay="0"/>
+                            </p:stCondLst>
+                            <p:childTnLst>
+                              <p:par>
+                                <p:cTn id="29" presetID="1" presetClass="mediacall" presetSubtype="0" fill="hold" nodeType="clickEffect">
+                                  <p:stCondLst>
+                                    <p:cond delay="0"/>
+                                  </p:stCondLst>
+                                  <p:childTnLst>
+                                    <p:cmd type="call" cmd="playFrom(0.0)">
+                                      <p:cBhvr>
+                                        <p:cTn id="30" dur="1000" fill="hold"/>
+                                        <p:tgtEl>
+                                          <p:spTgt spid="10"/>
+                                        </p:tgtEl>
+                                      </p:cBhvr>
+                                    </p:cmd>
+                                  </p:childTnLst>
+                                </p:cTn>
+                              </p:par>
+                            </p:childTnLst>
+                          </p:cTn>
+                        </p:par>
+                      </p:childTnLst>
+                    </p:cTn>
+                  </p:par>
+                  <p:par>
+                    <p:cTn id="31" fill="hold">
+                      <p:stCondLst>
+                        <p:cond delay="indefinite"/>
+                      </p:stCondLst>
+                      <p:childTnLst>
+                        <p:par>
+                          <p:cTn id="32" fill="hold">
+                            <p:stCondLst>
+                              <p:cond delay="0"/>
+                            </p:stCondLst>
+                            <p:childTnLst>
+                              <p:par>
+                                <p:cTn id="33" presetID="1" presetClass="mediacall" presetSubtype="0" fill="hold" nodeType="clickEffect">
+                                  <p:stCondLst>
+                                    <p:cond delay="0"/>
+                                  </p:stCondLst>
+                                  <p:childTnLst>
+                                    <p:cmd type="call" cmd="playFrom(0.0)">
+                                      <p:cBhvr>
+                                        <p:cTn id="34" dur="1000" fill="hold"/>
+                                        <p:tgtEl>
+                                          <p:spTgt spid="13"/>
+                                        </p:tgtEl>
+                                      </p:cBhvr>
+                                    </p:cmd>
+                                  </p:childTnLst>
+                                </p:cTn>
+                              </p:par>
+                            </p:childTnLst>
+                          </p:cTn>
+                        </p:par>
+                      </p:childTnLst>
+                    </p:cTn>
+                  </p:par>
+                  <p:par>
+                    <p:cTn id="35" fill="hold">
+                      <p:stCondLst>
+                        <p:cond delay="indefinite"/>
+                      </p:stCondLst>
+                      <p:childTnLst>
+                        <p:par>
+                          <p:cTn id="36" fill="hold">
+                            <p:stCondLst>
+                              <p:cond delay="0"/>
+                            </p:stCondLst>
+                            <p:childTnLst>
+                              <p:par>
+                                <p:cTn id="37" presetID="1" presetClass="mediacall" presetSubtype="0" fill="hold" nodeType="clickEffect">
+                                  <p:stCondLst>
+                                    <p:cond delay="0"/>
+                                  </p:stCondLst>
+                                  <p:childTnLst>
+                                    <p:cmd type="call" cmd="playFrom(0.0)">
+                                      <p:cBhvr>
+                                        <p:cTn id="38" dur="1000" fill="hold"/>
+                                        <p:tgtEl>
+                                          <p:spTgt spid="14"/>
+                                        </p:tgtEl>
+                                      </p:cBhvr>
+                                    </p:cmd>
+                                  </p:childTnLst>
+                                </p:cTn>
+                              </p:par>
+                            </p:childTnLst>
+                          </p:cTn>
+                        </p:par>
+                      </p:childTnLst>
+                    </p:cTn>
+                  </p:par>
                 </p:childTnLst>
               </p:cTn>
               <p:prevCondLst>
@@ -23450,165 +24040,11 @@
               </p:nextCondLst>
             </p:seq>
             <p:seq concurrent="1" nextAc="seek">
-              <p:cTn id="27" restart="whenNotActive" fill="hold" evtFilter="cancelBubble" nodeType="interactiveSeq">
+              <p:cTn id="39" restart="whenNotActive" fill="hold" evtFilter="cancelBubble" nodeType="interactiveSeq">
                 <p:stCondLst>
                   <p:cond evt="onClick" delay="0">
                     <p:tgtEl>
                       <p:spTgt spid="10"/>
-                    </p:tgtEl>
-                  </p:cond>
-                </p:stCondLst>
-                <p:endSync evt="end" delay="0">
-                  <p:rtn val="all"/>
-                </p:endSync>
-                <p:childTnLst>
-                  <p:par>
-                    <p:cTn id="28" fill="hold">
-                      <p:stCondLst>
-                        <p:cond delay="0"/>
-                      </p:stCondLst>
-                      <p:childTnLst>
-                        <p:par>
-                          <p:cTn id="29" fill="hold">
-                            <p:stCondLst>
-                              <p:cond delay="0"/>
-                            </p:stCondLst>
-                            <p:childTnLst>
-                              <p:par>
-                                <p:cTn id="30" presetID="1" presetClass="mediacall" presetSubtype="0" fill="hold" nodeType="clickEffect">
-                                  <p:stCondLst>
-                                    <p:cond delay="0"/>
-                                  </p:stCondLst>
-                                  <p:childTnLst>
-                                    <p:cmd type="call" cmd="playFrom(0.0)">
-                                      <p:cBhvr>
-                                        <p:cTn id="31" dur="1000" fill="hold"/>
-                                        <p:tgtEl>
-                                          <p:spTgt spid="10"/>
-                                        </p:tgtEl>
-                                      </p:cBhvr>
-                                    </p:cmd>
-                                  </p:childTnLst>
-                                </p:cTn>
-                              </p:par>
-                            </p:childTnLst>
-                          </p:cTn>
-                        </p:par>
-                      </p:childTnLst>
-                    </p:cTn>
-                  </p:par>
-                </p:childTnLst>
-              </p:cTn>
-              <p:nextCondLst>
-                <p:cond evt="onClick" delay="0">
-                  <p:tgtEl>
-                    <p:spTgt spid="10"/>
-                  </p:tgtEl>
-                </p:cond>
-              </p:nextCondLst>
-            </p:seq>
-            <p:audio>
-              <p:cMediaNode vol="37879">
-                <p:cTn id="32" fill="hold" display="0">
-                  <p:stCondLst>
-                    <p:cond delay="indefinite"/>
-                  </p:stCondLst>
-                  <p:endCondLst>
-                    <p:cond evt="onStopAudio" delay="0">
-                      <p:tgtEl>
-                        <p:sldTgt/>
-                      </p:tgtEl>
-                    </p:cond>
-                  </p:endCondLst>
-                </p:cTn>
-                <p:tgtEl>
-                  <p:spTgt spid="10"/>
-                </p:tgtEl>
-              </p:cMediaNode>
-            </p:audio>
-            <p:seq concurrent="1" nextAc="seek">
-              <p:cTn id="33" restart="whenNotActive" fill="hold" evtFilter="cancelBubble" nodeType="interactiveSeq">
-                <p:stCondLst>
-                  <p:cond evt="onClick" delay="0">
-                    <p:tgtEl>
-                      <p:spTgt spid="13"/>
-                    </p:tgtEl>
-                  </p:cond>
-                </p:stCondLst>
-                <p:endSync evt="end" delay="0">
-                  <p:rtn val="all"/>
-                </p:endSync>
-                <p:childTnLst>
-                  <p:par>
-                    <p:cTn id="34" fill="hold">
-                      <p:stCondLst>
-                        <p:cond delay="0"/>
-                      </p:stCondLst>
-                      <p:childTnLst>
-                        <p:par>
-                          <p:cTn id="35" fill="hold">
-                            <p:stCondLst>
-                              <p:cond delay="0"/>
-                            </p:stCondLst>
-                            <p:childTnLst>
-                              <p:par>
-                                <p:cTn id="36" presetID="1" presetClass="mediacall" presetSubtype="0" fill="hold" nodeType="clickEffect">
-                                  <p:stCondLst>
-                                    <p:cond delay="0"/>
-                                  </p:stCondLst>
-                                  <p:childTnLst>
-                                    <p:cmd type="call" cmd="playFrom(0.0)">
-                                      <p:cBhvr>
-                                        <p:cTn id="37" dur="1000" fill="hold"/>
-                                        <p:tgtEl>
-                                          <p:spTgt spid="13"/>
-                                        </p:tgtEl>
-                                      </p:cBhvr>
-                                    </p:cmd>
-                                  </p:childTnLst>
-                                </p:cTn>
-                              </p:par>
-                            </p:childTnLst>
-                          </p:cTn>
-                        </p:par>
-                      </p:childTnLst>
-                    </p:cTn>
-                  </p:par>
-                </p:childTnLst>
-              </p:cTn>
-              <p:nextCondLst>
-                <p:cond evt="onClick" delay="0">
-                  <p:tgtEl>
-                    <p:spTgt spid="13"/>
-                  </p:tgtEl>
-                </p:cond>
-              </p:nextCondLst>
-            </p:seq>
-            <p:audio>
-              <p:cMediaNode vol="42424">
-                <p:cTn id="38" fill="hold" display="0">
-                  <p:stCondLst>
-                    <p:cond delay="indefinite"/>
-                  </p:stCondLst>
-                  <p:endCondLst>
-                    <p:cond evt="onStopAudio" delay="0">
-                      <p:tgtEl>
-                        <p:sldTgt/>
-                      </p:tgtEl>
-                    </p:cond>
-                  </p:endCondLst>
-                </p:cTn>
-                <p:tgtEl>
-                  <p:spTgt spid="13"/>
-                </p:tgtEl>
-              </p:cMediaNode>
-            </p:audio>
-            <p:seq concurrent="1" nextAc="seek">
-              <p:cTn id="39" restart="whenNotActive" fill="hold" evtFilter="cancelBubble" nodeType="interactiveSeq">
-                <p:stCondLst>
-                  <p:cond evt="onClick" delay="0">
-                    <p:tgtEl>
-                      <p:spTgt spid="14"/>
                     </p:tgtEl>
                   </p:cond>
                 </p:stCondLst>
@@ -23638,6 +24074,160 @@
                                       <p:cBhvr>
                                         <p:cTn id="43" dur="1000" fill="hold"/>
                                         <p:tgtEl>
+                                          <p:spTgt spid="10"/>
+                                        </p:tgtEl>
+                                      </p:cBhvr>
+                                    </p:cmd>
+                                  </p:childTnLst>
+                                </p:cTn>
+                              </p:par>
+                            </p:childTnLst>
+                          </p:cTn>
+                        </p:par>
+                      </p:childTnLst>
+                    </p:cTn>
+                  </p:par>
+                </p:childTnLst>
+              </p:cTn>
+              <p:nextCondLst>
+                <p:cond evt="onClick" delay="0">
+                  <p:tgtEl>
+                    <p:spTgt spid="10"/>
+                  </p:tgtEl>
+                </p:cond>
+              </p:nextCondLst>
+            </p:seq>
+            <p:audio>
+              <p:cMediaNode vol="37879">
+                <p:cTn id="44" fill="hold" display="0">
+                  <p:stCondLst>
+                    <p:cond delay="indefinite"/>
+                  </p:stCondLst>
+                  <p:endCondLst>
+                    <p:cond evt="onStopAudio" delay="0">
+                      <p:tgtEl>
+                        <p:sldTgt/>
+                      </p:tgtEl>
+                    </p:cond>
+                  </p:endCondLst>
+                </p:cTn>
+                <p:tgtEl>
+                  <p:spTgt spid="10"/>
+                </p:tgtEl>
+              </p:cMediaNode>
+            </p:audio>
+            <p:seq concurrent="1" nextAc="seek">
+              <p:cTn id="45" restart="whenNotActive" fill="hold" evtFilter="cancelBubble" nodeType="interactiveSeq">
+                <p:stCondLst>
+                  <p:cond evt="onClick" delay="0">
+                    <p:tgtEl>
+                      <p:spTgt spid="13"/>
+                    </p:tgtEl>
+                  </p:cond>
+                </p:stCondLst>
+                <p:endSync evt="end" delay="0">
+                  <p:rtn val="all"/>
+                </p:endSync>
+                <p:childTnLst>
+                  <p:par>
+                    <p:cTn id="46" fill="hold">
+                      <p:stCondLst>
+                        <p:cond delay="0"/>
+                      </p:stCondLst>
+                      <p:childTnLst>
+                        <p:par>
+                          <p:cTn id="47" fill="hold">
+                            <p:stCondLst>
+                              <p:cond delay="0"/>
+                            </p:stCondLst>
+                            <p:childTnLst>
+                              <p:par>
+                                <p:cTn id="48" presetID="1" presetClass="mediacall" presetSubtype="0" fill="hold" nodeType="clickEffect">
+                                  <p:stCondLst>
+                                    <p:cond delay="0"/>
+                                  </p:stCondLst>
+                                  <p:childTnLst>
+                                    <p:cmd type="call" cmd="playFrom(0.0)">
+                                      <p:cBhvr>
+                                        <p:cTn id="49" dur="1000" fill="hold"/>
+                                        <p:tgtEl>
+                                          <p:spTgt spid="13"/>
+                                        </p:tgtEl>
+                                      </p:cBhvr>
+                                    </p:cmd>
+                                  </p:childTnLst>
+                                </p:cTn>
+                              </p:par>
+                            </p:childTnLst>
+                          </p:cTn>
+                        </p:par>
+                      </p:childTnLst>
+                    </p:cTn>
+                  </p:par>
+                </p:childTnLst>
+              </p:cTn>
+              <p:nextCondLst>
+                <p:cond evt="onClick" delay="0">
+                  <p:tgtEl>
+                    <p:spTgt spid="13"/>
+                  </p:tgtEl>
+                </p:cond>
+              </p:nextCondLst>
+            </p:seq>
+            <p:audio>
+              <p:cMediaNode vol="42424">
+                <p:cTn id="50" fill="hold" display="0">
+                  <p:stCondLst>
+                    <p:cond delay="indefinite"/>
+                  </p:stCondLst>
+                  <p:endCondLst>
+                    <p:cond evt="onStopAudio" delay="0">
+                      <p:tgtEl>
+                        <p:sldTgt/>
+                      </p:tgtEl>
+                    </p:cond>
+                  </p:endCondLst>
+                </p:cTn>
+                <p:tgtEl>
+                  <p:spTgt spid="13"/>
+                </p:tgtEl>
+              </p:cMediaNode>
+            </p:audio>
+            <p:seq concurrent="1" nextAc="seek">
+              <p:cTn id="51" restart="whenNotActive" fill="hold" evtFilter="cancelBubble" nodeType="interactiveSeq">
+                <p:stCondLst>
+                  <p:cond evt="onClick" delay="0">
+                    <p:tgtEl>
+                      <p:spTgt spid="14"/>
+                    </p:tgtEl>
+                  </p:cond>
+                </p:stCondLst>
+                <p:endSync evt="end" delay="0">
+                  <p:rtn val="all"/>
+                </p:endSync>
+                <p:childTnLst>
+                  <p:par>
+                    <p:cTn id="52" fill="hold">
+                      <p:stCondLst>
+                        <p:cond delay="0"/>
+                      </p:stCondLst>
+                      <p:childTnLst>
+                        <p:par>
+                          <p:cTn id="53" fill="hold">
+                            <p:stCondLst>
+                              <p:cond delay="0"/>
+                            </p:stCondLst>
+                            <p:childTnLst>
+                              <p:par>
+                                <p:cTn id="54" presetID="1" presetClass="mediacall" presetSubtype="0" fill="hold" nodeType="clickEffect">
+                                  <p:stCondLst>
+                                    <p:cond delay="0"/>
+                                  </p:stCondLst>
+                                  <p:childTnLst>
+                                    <p:cmd type="call" cmd="playFrom(0.0)">
+                                      <p:cBhvr>
+                                        <p:cTn id="55" dur="1000" fill="hold"/>
+                                        <p:tgtEl>
                                           <p:spTgt spid="14"/>
                                         </p:tgtEl>
                                       </p:cBhvr>
@@ -23663,7 +24253,7 @@
             </p:seq>
             <p:audio>
               <p:cMediaNode vol="46970">
-                <p:cTn id="44" fill="hold" display="0">
+                <p:cTn id="56" fill="hold" display="0">
                   <p:stCondLst>
                     <p:cond delay="indefinite"/>
                   </p:stCondLst>
@@ -23781,10 +24371,10 @@
 <file path=ppt/tags/tag15.xml><?xml version="1.0" encoding="utf-8"?>
 <p:tagLst xmlns:a="http://schemas.openxmlformats.org/drawingml/2006/main" xmlns:r="http://schemas.openxmlformats.org/officeDocument/2006/relationships" xmlns:p="http://schemas.openxmlformats.org/presentationml/2006/main">
   <p:tag name="ORIGINALHEIGHT" val="113,2658"/>
-  <p:tag name="ORIGINALWIDTH" val="543,0758"/>
-  <p:tag name="LATEXADDIN" val="\documentclass{article}&#10;\usepackage{amsmath}&#10;\pagestyle{empty}&#10;\begin{document}&#10;$\omega = 2\pi \cdot f$&#10;&#10;&#10;&#10;\end{document}"/>
+  <p:tag name="ORIGINALWIDTH" val="62,25866"/>
+  <p:tag name="LATEXADDIN" val="\documentclass{article}&#10;\usepackage{amsmath}&#10;\pagestyle{empty}&#10;\begin{document}&#10;$f$&#10;&#10;&#10;&#10;\end{document}"/>
   <p:tag name="IGUANATEXSIZE" val="20"/>
-  <p:tag name="IGUANATEXCURSOR" val="90"/>
+  <p:tag name="IGUANATEXCURSOR" val="83"/>
   <p:tag name="TRANSPARENCY" val="Wahr"/>
   <p:tag name="FILENAME" val=""/>
   <p:tag name="INPUTTYPE" val="0"/>
@@ -23811,10 +24401,10 @@
 <file path=ppt/tags/tag17.xml><?xml version="1.0" encoding="utf-8"?>
 <p:tagLst xmlns:a="http://schemas.openxmlformats.org/drawingml/2006/main" xmlns:r="http://schemas.openxmlformats.org/officeDocument/2006/relationships" xmlns:p="http://schemas.openxmlformats.org/presentationml/2006/main">
   <p:tag name="ORIGINALHEIGHT" val="113,2658"/>
-  <p:tag name="ORIGINALWIDTH" val="62,25866"/>
-  <p:tag name="LATEXADDIN" val="\documentclass{article}&#10;\usepackage{amsmath}&#10;\pagestyle{empty}&#10;\begin{document}&#10;$f$&#10;&#10;&#10;&#10;\end{document}"/>
+  <p:tag name="ORIGINALWIDTH" val="543,0758"/>
+  <p:tag name="LATEXADDIN" val="\documentclass{article}&#10;\usepackage{amsmath}&#10;\pagestyle{empty}&#10;\begin{document}&#10;$\omega = 2\pi \cdot f$&#10;&#10;&#10;&#10;\end{document}"/>
   <p:tag name="IGUANATEXSIZE" val="20"/>
-  <p:tag name="IGUANATEXCURSOR" val="83"/>
+  <p:tag name="IGUANATEXCURSOR" val="90"/>
   <p:tag name="TRANSPARENCY" val="Wahr"/>
   <p:tag name="FILENAME" val=""/>
   <p:tag name="INPUTTYPE" val="0"/>

</xml_diff>